<commit_message>
Updates Slides with new graphics and slight restructuring Makes the slides wear fancy pants Adds Logistic Plot Python File
</commit_message>
<xml_diff>
--- a/Blatt02/Aufgabe01/Slides.pptx
+++ b/Blatt02/Aufgabe01/Slides.pptx
@@ -5,20 +5,25 @@
     <p:sldMasterId id="2147483648" r:id="rId1"/>
   </p:sldMasterIdLst>
   <p:notesMasterIdLst>
-    <p:notesMasterId r:id="rId10"/>
+    <p:notesMasterId r:id="rId15"/>
   </p:notesMasterIdLst>
   <p:handoutMasterIdLst>
-    <p:handoutMasterId r:id="rId11"/>
+    <p:handoutMasterId r:id="rId16"/>
   </p:handoutMasterIdLst>
   <p:sldIdLst>
     <p:sldId id="256" r:id="rId2"/>
-    <p:sldId id="260" r:id="rId3"/>
-    <p:sldId id="261" r:id="rId4"/>
-    <p:sldId id="263" r:id="rId5"/>
-    <p:sldId id="262" r:id="rId6"/>
-    <p:sldId id="265" r:id="rId7"/>
-    <p:sldId id="264" r:id="rId8"/>
-    <p:sldId id="266" r:id="rId9"/>
+    <p:sldId id="271" r:id="rId3"/>
+    <p:sldId id="260" r:id="rId4"/>
+    <p:sldId id="261" r:id="rId5"/>
+    <p:sldId id="263" r:id="rId6"/>
+    <p:sldId id="262" r:id="rId7"/>
+    <p:sldId id="265" r:id="rId8"/>
+    <p:sldId id="272" r:id="rId9"/>
+    <p:sldId id="264" r:id="rId10"/>
+    <p:sldId id="266" r:id="rId11"/>
+    <p:sldId id="269" r:id="rId12"/>
+    <p:sldId id="270" r:id="rId13"/>
+    <p:sldId id="268" r:id="rId14"/>
   </p:sldIdLst>
   <p:sldSz cx="9144000" cy="6858000" type="screen4x3"/>
   <p:notesSz cx="6858000" cy="9144000"/>
@@ -2711,7 +2716,6 @@
               <a:rPr lang="en-GB" dirty="0"/>
               <a:t>Andreas Knote</a:t>
             </a:r>
-            <a:endParaRPr lang="en-GB" dirty="0"/>
           </a:p>
           <a:p>
             <a:r>
@@ -2741,6 +2745,1592 @@
     <p:extLst>
       <p:ext uri="{BB962C8B-B14F-4D97-AF65-F5344CB8AC3E}">
         <p14:creationId xmlns:p14="http://schemas.microsoft.com/office/powerpoint/2010/main" val="160074715"/>
+      </p:ext>
+    </p:extLst>
+  </p:cSld>
+  <p:clrMapOvr>
+    <a:masterClrMapping/>
+  </p:clrMapOvr>
+</p:sld>
+</file>
+
+<file path=ppt/slides/slide10.xml><?xml version="1.0" encoding="utf-8"?>
+<p:sld xmlns:a="http://schemas.openxmlformats.org/drawingml/2006/main" xmlns:r="http://schemas.openxmlformats.org/officeDocument/2006/relationships" xmlns:p="http://schemas.openxmlformats.org/presentationml/2006/main">
+  <p:cSld>
+    <p:spTree>
+      <p:nvGrpSpPr>
+        <p:cNvPr id="1" name=""/>
+        <p:cNvGrpSpPr/>
+        <p:nvPr/>
+      </p:nvGrpSpPr>
+      <p:grpSpPr>
+        <a:xfrm>
+          <a:off x="0" y="0"/>
+          <a:ext cx="0" cy="0"/>
+          <a:chOff x="0" y="0"/>
+          <a:chExt cx="0" cy="0"/>
+        </a:xfrm>
+      </p:grpSpPr>
+      <mc:AlternateContent xmlns:mc="http://schemas.openxmlformats.org/markup-compatibility/2006">
+        <mc:Choice xmlns:a14="http://schemas.microsoft.com/office/drawing/2010/main" Requires="a14">
+          <p:sp>
+            <p:nvSpPr>
+              <p:cNvPr id="3" name="Titel 2"/>
+              <p:cNvSpPr>
+                <a:spLocks noGrp="1"/>
+              </p:cNvSpPr>
+              <p:nvPr>
+                <p:ph type="title"/>
+              </p:nvPr>
+            </p:nvSpPr>
+            <p:spPr/>
+            <p:txBody>
+              <a:bodyPr/>
+              <a:lstStyle/>
+              <a:p>
+                <a:pPr/>
+                <a:r>
+                  <a:rPr lang="de-DE" dirty="0"/>
+                  <a:t>Behavior </a:t>
+                </a:r>
+                <a:r>
+                  <a:rPr lang="de-DE" dirty="0" err="1"/>
+                  <a:t>for</a:t>
+                </a:r>
+                <a:r>
+                  <a:rPr lang="de-DE" dirty="0"/>
+                  <a:t> Different Values </a:t>
+                </a:r>
+                <a:r>
+                  <a:rPr lang="de-DE" dirty="0" err="1"/>
+                  <a:t>of</a:t>
+                </a:r>
+                <a:r>
+                  <a:rPr lang="de-DE" dirty="0"/>
+                  <a:t> </a:t>
+                </a:r>
+                <a14:m>
+                  <m:oMath xmlns:m="http://schemas.openxmlformats.org/officeDocument/2006/math">
+                    <m:r>
+                      <a:rPr lang="de-DE" i="1" dirty="0">
+                        <a:latin typeface="Cambria Math" panose="02040503050406030204" pitchFamily="18" charset="0"/>
+                      </a:rPr>
+                      <m:t>𝑅</m:t>
+                    </m:r>
+                    <m:r>
+                      <a:rPr lang="de-DE" i="1" dirty="0">
+                        <a:latin typeface="Cambria Math" panose="02040503050406030204" pitchFamily="18" charset="0"/>
+                      </a:rPr>
+                      <m:t> </m:t>
+                    </m:r>
+                  </m:oMath>
+                </a14:m>
+                <a:br>
+                  <a:rPr lang="en-US" dirty="0"/>
+                </a:br>
+                <a14:m>
+                  <m:oMathPara xmlns:m="http://schemas.openxmlformats.org/officeDocument/2006/math">
+                    <m:oMathParaPr>
+                      <m:jc m:val="left"/>
+                    </m:oMathParaPr>
+                    <m:oMath xmlns:m="http://schemas.openxmlformats.org/officeDocument/2006/math">
+                      <m:r>
+                        <a:rPr lang="en-US" i="1" dirty="0" smtClean="0">
+                          <a:latin typeface="Cambria Math" panose="02040503050406030204" pitchFamily="18" charset="0"/>
+                        </a:rPr>
+                        <m:t>3&lt;</m:t>
+                      </m:r>
+                      <m:r>
+                        <a:rPr lang="en-US" i="1" dirty="0" smtClean="0">
+                          <a:latin typeface="Cambria Math" panose="02040503050406030204" pitchFamily="18" charset="0"/>
+                        </a:rPr>
+                        <m:t>𝑅</m:t>
+                      </m:r>
+                      <m:r>
+                        <a:rPr lang="en-US" i="1" dirty="0" smtClean="0">
+                          <a:latin typeface="Cambria Math" panose="02040503050406030204" pitchFamily="18" charset="0"/>
+                        </a:rPr>
+                        <m:t>&lt;4</m:t>
+                      </m:r>
+                    </m:oMath>
+                  </m:oMathPara>
+                </a14:m>
+                <a:endParaRPr lang="en-US" dirty="0"/>
+              </a:p>
+            </p:txBody>
+          </p:sp>
+        </mc:Choice>
+        <mc:Fallback>
+          <p:sp>
+            <p:nvSpPr>
+              <p:cNvPr id="3" name="Titel 2"/>
+              <p:cNvSpPr>
+                <a:spLocks noGrp="1" noRot="1" noChangeAspect="1" noMove="1" noResize="1" noEditPoints="1" noAdjustHandles="1" noChangeArrowheads="1" noChangeShapeType="1" noTextEdit="1"/>
+              </p:cNvSpPr>
+              <p:nvPr>
+                <p:ph type="title"/>
+              </p:nvPr>
+            </p:nvSpPr>
+            <p:spPr>
+              <a:blipFill>
+                <a:blip r:embed="rId2"/>
+                <a:stretch>
+                  <a:fillRect l="-837"/>
+                </a:stretch>
+              </a:blipFill>
+            </p:spPr>
+            <p:txBody>
+              <a:bodyPr/>
+              <a:lstStyle/>
+              <a:p>
+                <a:r>
+                  <a:rPr lang="en-US">
+                    <a:noFill/>
+                  </a:rPr>
+                  <a:t> </a:t>
+                </a:r>
+              </a:p>
+            </p:txBody>
+          </p:sp>
+        </mc:Fallback>
+      </mc:AlternateContent>
+      <p:sp>
+        <p:nvSpPr>
+          <p:cNvPr id="4" name="Datumsplatzhalter 3"/>
+          <p:cNvSpPr>
+            <a:spLocks noGrp="1"/>
+          </p:cNvSpPr>
+          <p:nvPr>
+            <p:ph type="dt" sz="half" idx="10"/>
+          </p:nvPr>
+        </p:nvSpPr>
+        <p:spPr/>
+        <p:txBody>
+          <a:bodyPr/>
+          <a:lstStyle/>
+          <a:p>
+            <a:pPr>
+              <a:defRPr/>
+            </a:pPr>
+            <a:fld id="{972A6A5B-77CB-4D42-9DB4-CC6D207310B8}" type="datetime1">
+              <a:rPr lang="de-DE" smtClean="0"/>
+              <a:pPr>
+                <a:defRPr/>
+              </a:pPr>
+              <a:t>03.11.2016</a:t>
+            </a:fld>
+            <a:endParaRPr lang="en-GB" dirty="0"/>
+          </a:p>
+        </p:txBody>
+      </p:sp>
+      <p:sp>
+        <p:nvSpPr>
+          <p:cNvPr id="6" name="Foliennummernplatzhalter 5"/>
+          <p:cNvSpPr>
+            <a:spLocks noGrp="1"/>
+          </p:cNvSpPr>
+          <p:nvPr>
+            <p:ph type="sldNum" sz="quarter" idx="12"/>
+          </p:nvPr>
+        </p:nvSpPr>
+        <p:spPr/>
+        <p:txBody>
+          <a:bodyPr/>
+          <a:lstStyle/>
+          <a:p>
+            <a:pPr>
+              <a:defRPr/>
+            </a:pPr>
+            <a:fld id="{E85D1952-A6FC-4ACE-AEE4-EFAF5C32DAC6}" type="slidenum">
+              <a:rPr lang="en-GB" smtClean="0"/>
+              <a:pPr>
+                <a:defRPr/>
+              </a:pPr>
+              <a:t>10</a:t>
+            </a:fld>
+            <a:endParaRPr lang="en-GB" dirty="0"/>
+          </a:p>
+        </p:txBody>
+      </p:sp>
+      <p:pic>
+        <p:nvPicPr>
+          <p:cNvPr id="17" name="Grafik 16"/>
+          <p:cNvPicPr>
+            <a:picLocks noChangeAspect="1"/>
+          </p:cNvPicPr>
+          <p:nvPr/>
+        </p:nvPicPr>
+        <p:blipFill>
+          <a:blip r:embed="rId3"/>
+          <a:stretch>
+            <a:fillRect/>
+          </a:stretch>
+        </p:blipFill>
+        <p:spPr>
+          <a:xfrm>
+            <a:off x="2159731" y="1273455"/>
+            <a:ext cx="4752528" cy="3667713"/>
+          </a:xfrm>
+          <a:prstGeom prst="rect">
+            <a:avLst/>
+          </a:prstGeom>
+        </p:spPr>
+      </p:pic>
+      <mc:AlternateContent xmlns:mc="http://schemas.openxmlformats.org/markup-compatibility/2006">
+        <mc:Choice xmlns:a14="http://schemas.microsoft.com/office/drawing/2010/main" Requires="a14">
+          <p:sp>
+            <p:nvSpPr>
+              <p:cNvPr id="18" name="Rechteck 17"/>
+              <p:cNvSpPr/>
+              <p:nvPr/>
+            </p:nvSpPr>
+            <p:spPr>
+              <a:xfrm>
+                <a:off x="611560" y="4797152"/>
+                <a:ext cx="6454459" cy="1200329"/>
+              </a:xfrm>
+              <a:prstGeom prst="rect">
+                <a:avLst/>
+              </a:prstGeom>
+            </p:spPr>
+            <p:txBody>
+              <a:bodyPr wrap="none">
+                <a:spAutoFit/>
+              </a:bodyPr>
+              <a:lstStyle/>
+              <a:p>
+                <a:pPr marL="342900" indent="-342900">
+                  <a:buFont typeface="Arial" panose="020B0604020202020204" pitchFamily="34" charset="0"/>
+                  <a:buChar char="•"/>
+                </a:pPr>
+                <a:endParaRPr lang="de-DE" dirty="0"/>
+              </a:p>
+              <a:p>
+                <a:pPr marL="342900" indent="-342900">
+                  <a:buFont typeface="Arial" panose="020B0604020202020204" pitchFamily="34" charset="0"/>
+                  <a:buChar char="•"/>
+                </a:pPr>
+                <a:r>
+                  <a:rPr lang="de-DE" dirty="0" err="1"/>
+                  <a:t>For</a:t>
+                </a:r>
+                <a:r>
+                  <a:rPr lang="de-DE" dirty="0"/>
+                  <a:t> </a:t>
+                </a:r>
+                <a14:m>
+                  <m:oMath xmlns:m="http://schemas.openxmlformats.org/officeDocument/2006/math">
+                    <m:r>
+                      <a:rPr lang="de-DE" i="1" dirty="0">
+                        <a:latin typeface="Cambria Math" panose="02040503050406030204" pitchFamily="18" charset="0"/>
+                      </a:rPr>
+                      <m:t>𝑅</m:t>
+                    </m:r>
+                    <m:r>
+                      <a:rPr lang="de-DE" i="1" dirty="0">
+                        <a:latin typeface="Cambria Math" panose="02040503050406030204" pitchFamily="18" charset="0"/>
+                      </a:rPr>
+                      <m:t>=3</m:t>
+                    </m:r>
+                  </m:oMath>
+                </a14:m>
+                <a:r>
+                  <a:rPr lang="de-DE" dirty="0"/>
+                  <a:t>, </a:t>
+                </a:r>
+                <a14:m>
+                  <m:oMath xmlns:m="http://schemas.openxmlformats.org/officeDocument/2006/math">
+                    <m:r>
+                      <a:rPr lang="de-DE" i="1" dirty="0" smtClean="0">
+                        <a:latin typeface="Cambria Math" panose="02040503050406030204" pitchFamily="18" charset="0"/>
+                      </a:rPr>
+                      <m:t>𝑦</m:t>
+                    </m:r>
+                  </m:oMath>
+                </a14:m>
+                <a:r>
+                  <a:rPr lang="de-DE" dirty="0"/>
+                  <a:t> </a:t>
+                </a:r>
+                <a:r>
+                  <a:rPr lang="de-DE" dirty="0" err="1"/>
+                  <a:t>converges</a:t>
+                </a:r>
+                <a:r>
+                  <a:rPr lang="de-DE" dirty="0"/>
+                  <a:t> „</a:t>
+                </a:r>
+                <a:r>
+                  <a:rPr lang="en-US" dirty="0"/>
+                  <a:t>dramatically slow”</a:t>
+                </a:r>
+                <a:endParaRPr lang="de-DE" dirty="0"/>
+              </a:p>
+              <a:p>
+                <a:pPr marL="342900" indent="-342900">
+                  <a:buFont typeface="Arial" panose="020B0604020202020204" pitchFamily="34" charset="0"/>
+                  <a:buChar char="•"/>
+                </a:pPr>
+                <a:r>
+                  <a:rPr lang="de-DE" dirty="0" err="1"/>
+                  <a:t>Bifurcation</a:t>
+                </a:r>
+                <a:r>
+                  <a:rPr lang="de-DE" dirty="0"/>
+                  <a:t> </a:t>
+                </a:r>
+                <a:r>
+                  <a:rPr lang="de-DE" dirty="0" err="1"/>
+                  <a:t>Appears</a:t>
+                </a:r>
+                <a:r>
+                  <a:rPr lang="de-DE" dirty="0"/>
+                  <a:t> </a:t>
+                </a:r>
+                <a:r>
+                  <a:rPr lang="de-DE" dirty="0" err="1"/>
+                  <a:t>for</a:t>
+                </a:r>
+                <a:r>
+                  <a:rPr lang="de-DE" dirty="0"/>
+                  <a:t> </a:t>
+                </a:r>
+                <a14:m>
+                  <m:oMath xmlns:m="http://schemas.openxmlformats.org/officeDocument/2006/math">
+                    <m:r>
+                      <a:rPr lang="de-DE" i="1" dirty="0" smtClean="0">
+                        <a:latin typeface="Cambria Math" panose="02040503050406030204" pitchFamily="18" charset="0"/>
+                      </a:rPr>
+                      <m:t>𝑅</m:t>
+                    </m:r>
+                    <m:r>
+                      <a:rPr lang="de-DE" i="1" dirty="0" smtClean="0">
+                        <a:latin typeface="Cambria Math" panose="02040503050406030204" pitchFamily="18" charset="0"/>
+                      </a:rPr>
+                      <m:t> &gt; 3</m:t>
+                    </m:r>
+                  </m:oMath>
+                </a14:m>
+                <a:endParaRPr lang="de-DE" dirty="0"/>
+              </a:p>
+            </p:txBody>
+          </p:sp>
+        </mc:Choice>
+        <mc:Fallback>
+          <p:sp>
+            <p:nvSpPr>
+              <p:cNvPr id="18" name="Rechteck 17"/>
+              <p:cNvSpPr>
+                <a:spLocks noRot="1" noChangeAspect="1" noMove="1" noResize="1" noEditPoints="1" noAdjustHandles="1" noChangeArrowheads="1" noChangeShapeType="1" noTextEdit="1"/>
+              </p:cNvSpPr>
+              <p:nvPr/>
+            </p:nvSpPr>
+            <p:spPr>
+              <a:xfrm>
+                <a:off x="611560" y="4797152"/>
+                <a:ext cx="6454459" cy="1200329"/>
+              </a:xfrm>
+              <a:prstGeom prst="rect">
+                <a:avLst/>
+              </a:prstGeom>
+              <a:blipFill>
+                <a:blip r:embed="rId4"/>
+                <a:stretch>
+                  <a:fillRect l="-1228" b="-11168"/>
+                </a:stretch>
+              </a:blipFill>
+            </p:spPr>
+            <p:txBody>
+              <a:bodyPr/>
+              <a:lstStyle/>
+              <a:p>
+                <a:r>
+                  <a:rPr lang="en-US">
+                    <a:noFill/>
+                  </a:rPr>
+                  <a:t> </a:t>
+                </a:r>
+              </a:p>
+            </p:txBody>
+          </p:sp>
+        </mc:Fallback>
+      </mc:AlternateContent>
+    </p:spTree>
+    <p:extLst>
+      <p:ext uri="{BB962C8B-B14F-4D97-AF65-F5344CB8AC3E}">
+        <p14:creationId xmlns:p14="http://schemas.microsoft.com/office/powerpoint/2010/main" val="2396758352"/>
+      </p:ext>
+    </p:extLst>
+  </p:cSld>
+  <p:clrMapOvr>
+    <a:masterClrMapping/>
+  </p:clrMapOvr>
+</p:sld>
+</file>
+
+<file path=ppt/slides/slide11.xml><?xml version="1.0" encoding="utf-8"?>
+<p:sld xmlns:a="http://schemas.openxmlformats.org/drawingml/2006/main" xmlns:r="http://schemas.openxmlformats.org/officeDocument/2006/relationships" xmlns:p="http://schemas.openxmlformats.org/presentationml/2006/main">
+  <p:cSld>
+    <p:spTree>
+      <p:nvGrpSpPr>
+        <p:cNvPr id="1" name=""/>
+        <p:cNvGrpSpPr/>
+        <p:nvPr/>
+      </p:nvGrpSpPr>
+      <p:grpSpPr>
+        <a:xfrm>
+          <a:off x="0" y="0"/>
+          <a:ext cx="0" cy="0"/>
+          <a:chOff x="0" y="0"/>
+          <a:chExt cx="0" cy="0"/>
+        </a:xfrm>
+      </p:grpSpPr>
+      <p:pic>
+        <p:nvPicPr>
+          <p:cNvPr id="7" name="Grafik 6"/>
+          <p:cNvPicPr>
+            <a:picLocks noChangeAspect="1"/>
+          </p:cNvPicPr>
+          <p:nvPr/>
+        </p:nvPicPr>
+        <p:blipFill>
+          <a:blip r:embed="rId2"/>
+          <a:stretch>
+            <a:fillRect/>
+          </a:stretch>
+        </p:blipFill>
+        <p:spPr>
+          <a:xfrm>
+            <a:off x="2270700" y="1340768"/>
+            <a:ext cx="4530589" cy="3528392"/>
+          </a:xfrm>
+          <a:prstGeom prst="rect">
+            <a:avLst/>
+          </a:prstGeom>
+        </p:spPr>
+      </p:pic>
+      <mc:AlternateContent xmlns:mc="http://schemas.openxmlformats.org/markup-compatibility/2006">
+        <mc:Choice xmlns:a14="http://schemas.microsoft.com/office/drawing/2010/main" Requires="a14">
+          <p:sp>
+            <p:nvSpPr>
+              <p:cNvPr id="3" name="Titel 2"/>
+              <p:cNvSpPr>
+                <a:spLocks noGrp="1"/>
+              </p:cNvSpPr>
+              <p:nvPr>
+                <p:ph type="title"/>
+              </p:nvPr>
+            </p:nvSpPr>
+            <p:spPr/>
+            <p:txBody>
+              <a:bodyPr/>
+              <a:lstStyle/>
+              <a:p>
+                <a:pPr/>
+                <a:r>
+                  <a:rPr lang="de-DE" dirty="0"/>
+                  <a:t>Behavior </a:t>
+                </a:r>
+                <a:r>
+                  <a:rPr lang="de-DE" dirty="0" err="1"/>
+                  <a:t>for</a:t>
+                </a:r>
+                <a:r>
+                  <a:rPr lang="de-DE" dirty="0"/>
+                  <a:t> Different Values </a:t>
+                </a:r>
+                <a:r>
+                  <a:rPr lang="de-DE" dirty="0" err="1"/>
+                  <a:t>of</a:t>
+                </a:r>
+                <a:r>
+                  <a:rPr lang="de-DE" dirty="0"/>
+                  <a:t> </a:t>
+                </a:r>
+                <a14:m>
+                  <m:oMath xmlns:m="http://schemas.openxmlformats.org/officeDocument/2006/math">
+                    <m:r>
+                      <a:rPr lang="de-DE" i="1" dirty="0">
+                        <a:latin typeface="Cambria Math" panose="02040503050406030204" pitchFamily="18" charset="0"/>
+                      </a:rPr>
+                      <m:t>𝑅</m:t>
+                    </m:r>
+                    <m:r>
+                      <a:rPr lang="de-DE" i="1" dirty="0">
+                        <a:latin typeface="Cambria Math" panose="02040503050406030204" pitchFamily="18" charset="0"/>
+                      </a:rPr>
+                      <m:t> </m:t>
+                    </m:r>
+                  </m:oMath>
+                </a14:m>
+                <a:br>
+                  <a:rPr lang="en-US" dirty="0"/>
+                </a:br>
+                <a14:m>
+                  <m:oMathPara xmlns:m="http://schemas.openxmlformats.org/officeDocument/2006/math">
+                    <m:oMathParaPr>
+                      <m:jc m:val="left"/>
+                    </m:oMathParaPr>
+                    <m:oMath xmlns:m="http://schemas.openxmlformats.org/officeDocument/2006/math">
+                      <m:r>
+                        <a:rPr lang="en-US" i="1" dirty="0">
+                          <a:latin typeface="Cambria Math" panose="02040503050406030204" pitchFamily="18" charset="0"/>
+                        </a:rPr>
+                        <m:t>3</m:t>
+                      </m:r>
+                      <m:r>
+                        <a:rPr lang="en-US" b="0" i="1" dirty="0" smtClean="0">
+                          <a:latin typeface="Cambria Math" panose="02040503050406030204" pitchFamily="18" charset="0"/>
+                        </a:rPr>
+                        <m:t>.4</m:t>
+                      </m:r>
+                      <m:r>
+                        <a:rPr lang="en-US" i="1" dirty="0">
+                          <a:latin typeface="Cambria Math" panose="02040503050406030204" pitchFamily="18" charset="0"/>
+                        </a:rPr>
+                        <m:t>&lt;</m:t>
+                      </m:r>
+                      <m:r>
+                        <a:rPr lang="en-US" i="1" dirty="0">
+                          <a:latin typeface="Cambria Math" panose="02040503050406030204" pitchFamily="18" charset="0"/>
+                        </a:rPr>
+                        <m:t>𝑅</m:t>
+                      </m:r>
+                      <m:r>
+                        <a:rPr lang="en-US" i="1" dirty="0">
+                          <a:latin typeface="Cambria Math" panose="02040503050406030204" pitchFamily="18" charset="0"/>
+                        </a:rPr>
+                        <m:t>&lt;3.7</m:t>
+                      </m:r>
+                    </m:oMath>
+                  </m:oMathPara>
+                </a14:m>
+                <a:endParaRPr lang="en-US" dirty="0"/>
+              </a:p>
+            </p:txBody>
+          </p:sp>
+        </mc:Choice>
+        <mc:Fallback>
+          <p:sp>
+            <p:nvSpPr>
+              <p:cNvPr id="3" name="Titel 2"/>
+              <p:cNvSpPr>
+                <a:spLocks noGrp="1" noRot="1" noChangeAspect="1" noMove="1" noResize="1" noEditPoints="1" noAdjustHandles="1" noChangeArrowheads="1" noChangeShapeType="1" noTextEdit="1"/>
+              </p:cNvSpPr>
+              <p:nvPr>
+                <p:ph type="title"/>
+              </p:nvPr>
+            </p:nvSpPr>
+            <p:spPr>
+              <a:blipFill>
+                <a:blip r:embed="rId3"/>
+                <a:stretch>
+                  <a:fillRect l="-837"/>
+                </a:stretch>
+              </a:blipFill>
+            </p:spPr>
+            <p:txBody>
+              <a:bodyPr/>
+              <a:lstStyle/>
+              <a:p>
+                <a:r>
+                  <a:rPr lang="en-US">
+                    <a:noFill/>
+                  </a:rPr>
+                  <a:t> </a:t>
+                </a:r>
+              </a:p>
+            </p:txBody>
+          </p:sp>
+        </mc:Fallback>
+      </mc:AlternateContent>
+      <p:sp>
+        <p:nvSpPr>
+          <p:cNvPr id="4" name="Datumsplatzhalter 3"/>
+          <p:cNvSpPr>
+            <a:spLocks noGrp="1"/>
+          </p:cNvSpPr>
+          <p:nvPr>
+            <p:ph type="dt" sz="half" idx="10"/>
+          </p:nvPr>
+        </p:nvSpPr>
+        <p:spPr/>
+        <p:txBody>
+          <a:bodyPr/>
+          <a:lstStyle/>
+          <a:p>
+            <a:pPr>
+              <a:defRPr/>
+            </a:pPr>
+            <a:fld id="{972A6A5B-77CB-4D42-9DB4-CC6D207310B8}" type="datetime1">
+              <a:rPr lang="de-DE" smtClean="0"/>
+              <a:pPr>
+                <a:defRPr/>
+              </a:pPr>
+              <a:t>03.11.2016</a:t>
+            </a:fld>
+            <a:endParaRPr lang="en-GB" dirty="0"/>
+          </a:p>
+        </p:txBody>
+      </p:sp>
+      <p:sp>
+        <p:nvSpPr>
+          <p:cNvPr id="6" name="Foliennummernplatzhalter 5"/>
+          <p:cNvSpPr>
+            <a:spLocks noGrp="1"/>
+          </p:cNvSpPr>
+          <p:nvPr>
+            <p:ph type="sldNum" sz="quarter" idx="12"/>
+          </p:nvPr>
+        </p:nvSpPr>
+        <p:spPr/>
+        <p:txBody>
+          <a:bodyPr/>
+          <a:lstStyle/>
+          <a:p>
+            <a:pPr>
+              <a:defRPr/>
+            </a:pPr>
+            <a:fld id="{E85D1952-A6FC-4ACE-AEE4-EFAF5C32DAC6}" type="slidenum">
+              <a:rPr lang="en-GB" smtClean="0"/>
+              <a:pPr>
+                <a:defRPr/>
+              </a:pPr>
+              <a:t>11</a:t>
+            </a:fld>
+            <a:endParaRPr lang="en-GB" dirty="0"/>
+          </a:p>
+        </p:txBody>
+      </p:sp>
+      <mc:AlternateContent xmlns:mc="http://schemas.openxmlformats.org/markup-compatibility/2006">
+        <mc:Choice xmlns:a14="http://schemas.microsoft.com/office/drawing/2010/main" Requires="a14">
+          <p:sp>
+            <p:nvSpPr>
+              <p:cNvPr id="8" name="Rechteck 7"/>
+              <p:cNvSpPr/>
+              <p:nvPr/>
+            </p:nvSpPr>
+            <p:spPr>
+              <a:xfrm>
+                <a:off x="611560" y="4869160"/>
+                <a:ext cx="6157455" cy="1200329"/>
+              </a:xfrm>
+              <a:prstGeom prst="rect">
+                <a:avLst/>
+              </a:prstGeom>
+            </p:spPr>
+            <p:txBody>
+              <a:bodyPr wrap="none">
+                <a:spAutoFit/>
+              </a:bodyPr>
+              <a:lstStyle/>
+              <a:p>
+                <a:pPr marL="342900" indent="-342900">
+                  <a:buFont typeface="Arial" panose="020B0604020202020204" pitchFamily="34" charset="0"/>
+                  <a:buChar char="•"/>
+                </a:pPr>
+                <a14:m>
+                  <m:oMath xmlns:m="http://schemas.openxmlformats.org/officeDocument/2006/math">
+                    <m:r>
+                      <a:rPr lang="de-DE" i="1" dirty="0">
+                        <a:latin typeface="Cambria Math" panose="02040503050406030204" pitchFamily="18" charset="0"/>
+                      </a:rPr>
+                      <m:t>2, 4, 8, 16</m:t>
+                    </m:r>
+                  </m:oMath>
+                </a14:m>
+                <a:r>
+                  <a:rPr lang="de-DE" dirty="0"/>
+                  <a:t>… </a:t>
+                </a:r>
+                <a:r>
+                  <a:rPr lang="de-DE" dirty="0" err="1"/>
+                  <a:t>oscillation</a:t>
+                </a:r>
+                <a:r>
+                  <a:rPr lang="de-DE" dirty="0"/>
+                  <a:t> </a:t>
+                </a:r>
+                <a:r>
+                  <a:rPr lang="de-DE" dirty="0" err="1"/>
+                  <a:t>points</a:t>
+                </a:r>
+                <a:endParaRPr lang="de-DE" dirty="0"/>
+              </a:p>
+              <a:p>
+                <a:pPr marL="342900" indent="-342900">
+                  <a:buFont typeface="Arial" panose="020B0604020202020204" pitchFamily="34" charset="0"/>
+                  <a:buChar char="•"/>
+                </a:pPr>
+                <a:r>
+                  <a:rPr lang="de-DE" dirty="0" err="1"/>
+                  <a:t>Chaotic</a:t>
+                </a:r>
+                <a:r>
+                  <a:rPr lang="de-DE" dirty="0"/>
+                  <a:t> </a:t>
+                </a:r>
+                <a:r>
+                  <a:rPr lang="de-DE" dirty="0" err="1"/>
+                  <a:t>behavior</a:t>
+                </a:r>
+                <a:r>
+                  <a:rPr lang="de-DE" dirty="0"/>
+                  <a:t> </a:t>
+                </a:r>
+                <a:r>
+                  <a:rPr lang="de-DE" dirty="0" err="1"/>
+                  <a:t>starts</a:t>
+                </a:r>
+                <a:r>
+                  <a:rPr lang="de-DE" dirty="0"/>
+                  <a:t> </a:t>
+                </a:r>
+                <a:r>
+                  <a:rPr lang="de-DE" dirty="0" err="1"/>
+                  <a:t>to</a:t>
+                </a:r>
+                <a:r>
+                  <a:rPr lang="de-DE" dirty="0"/>
+                  <a:t> </a:t>
+                </a:r>
+                <a:r>
+                  <a:rPr lang="de-DE" dirty="0" err="1"/>
+                  <a:t>appear</a:t>
+                </a:r>
+                <a:endParaRPr lang="de-DE" dirty="0"/>
+              </a:p>
+              <a:p>
+                <a:pPr marL="342900" indent="-342900">
+                  <a:buFont typeface="Arial" panose="020B0604020202020204" pitchFamily="34" charset="0"/>
+                  <a:buChar char="•"/>
+                </a:pPr>
+                <a:r>
+                  <a:rPr lang="de-DE" dirty="0"/>
+                  <a:t>Fun Fact: Parts </a:t>
+                </a:r>
+                <a:r>
+                  <a:rPr lang="de-DE" dirty="0" err="1"/>
+                  <a:t>of</a:t>
+                </a:r>
+                <a:r>
+                  <a:rPr lang="de-DE" dirty="0"/>
+                  <a:t> </a:t>
+                </a:r>
+                <a:r>
+                  <a:rPr lang="de-DE" dirty="0" err="1"/>
+                  <a:t>the</a:t>
+                </a:r>
+                <a:r>
+                  <a:rPr lang="de-DE" dirty="0"/>
+                  <a:t> </a:t>
+                </a:r>
+                <a:r>
+                  <a:rPr lang="de-DE" dirty="0" err="1"/>
+                  <a:t>plot</a:t>
+                </a:r>
+                <a:r>
+                  <a:rPr lang="de-DE" dirty="0"/>
+                  <a:t> </a:t>
+                </a:r>
+                <a:r>
+                  <a:rPr lang="de-DE" dirty="0" err="1"/>
+                  <a:t>are</a:t>
+                </a:r>
+                <a:r>
+                  <a:rPr lang="de-DE" dirty="0"/>
+                  <a:t> </a:t>
+                </a:r>
+                <a:r>
+                  <a:rPr lang="de-DE" dirty="0" err="1"/>
+                  <a:t>self-similar</a:t>
+                </a:r>
+                <a:endParaRPr lang="de-DE" dirty="0"/>
+              </a:p>
+            </p:txBody>
+          </p:sp>
+        </mc:Choice>
+        <mc:Fallback>
+          <p:sp>
+            <p:nvSpPr>
+              <p:cNvPr id="8" name="Rechteck 7"/>
+              <p:cNvSpPr>
+                <a:spLocks noRot="1" noChangeAspect="1" noMove="1" noResize="1" noEditPoints="1" noAdjustHandles="1" noChangeArrowheads="1" noChangeShapeType="1" noTextEdit="1"/>
+              </p:cNvSpPr>
+              <p:nvPr/>
+            </p:nvSpPr>
+            <p:spPr>
+              <a:xfrm>
+                <a:off x="611560" y="4869160"/>
+                <a:ext cx="6157455" cy="1200329"/>
+              </a:xfrm>
+              <a:prstGeom prst="rect">
+                <a:avLst/>
+              </a:prstGeom>
+              <a:blipFill>
+                <a:blip r:embed="rId4"/>
+                <a:stretch>
+                  <a:fillRect l="-1287" t="-3553" r="-891" b="-11168"/>
+                </a:stretch>
+              </a:blipFill>
+            </p:spPr>
+            <p:txBody>
+              <a:bodyPr/>
+              <a:lstStyle/>
+              <a:p>
+                <a:r>
+                  <a:rPr lang="en-US">
+                    <a:noFill/>
+                  </a:rPr>
+                  <a:t> </a:t>
+                </a:r>
+              </a:p>
+            </p:txBody>
+          </p:sp>
+        </mc:Fallback>
+      </mc:AlternateContent>
+      <p:sp>
+        <p:nvSpPr>
+          <p:cNvPr id="14" name="Fußzeilenplatzhalter 4"/>
+          <p:cNvSpPr>
+            <a:spLocks noGrp="1"/>
+          </p:cNvSpPr>
+          <p:nvPr>
+            <p:ph type="ftr" sz="quarter" idx="11"/>
+          </p:nvPr>
+        </p:nvSpPr>
+        <p:spPr>
+          <a:xfrm>
+            <a:off x="3131840" y="6309320"/>
+            <a:ext cx="4824536" cy="454025"/>
+          </a:xfrm>
+        </p:spPr>
+        <p:txBody>
+          <a:bodyPr/>
+          <a:lstStyle/>
+          <a:p>
+            <a:pPr>
+              <a:defRPr/>
+            </a:pPr>
+            <a:r>
+              <a:rPr lang="en-GB" dirty="0"/>
+              <a:t>https://en.wikipedia.org/wiki/Logistic_map</a:t>
+            </a:r>
+          </a:p>
+        </p:txBody>
+      </p:sp>
+    </p:spTree>
+    <p:extLst>
+      <p:ext uri="{BB962C8B-B14F-4D97-AF65-F5344CB8AC3E}">
+        <p14:creationId xmlns:p14="http://schemas.microsoft.com/office/powerpoint/2010/main" val="3396493693"/>
+      </p:ext>
+    </p:extLst>
+  </p:cSld>
+  <p:clrMapOvr>
+    <a:masterClrMapping/>
+  </p:clrMapOvr>
+</p:sld>
+</file>
+
+<file path=ppt/slides/slide12.xml><?xml version="1.0" encoding="utf-8"?>
+<p:sld xmlns:a="http://schemas.openxmlformats.org/drawingml/2006/main" xmlns:r="http://schemas.openxmlformats.org/officeDocument/2006/relationships" xmlns:p="http://schemas.openxmlformats.org/presentationml/2006/main">
+  <p:cSld>
+    <p:spTree>
+      <p:nvGrpSpPr>
+        <p:cNvPr id="1" name=""/>
+        <p:cNvGrpSpPr/>
+        <p:nvPr/>
+      </p:nvGrpSpPr>
+      <p:grpSpPr>
+        <a:xfrm>
+          <a:off x="0" y="0"/>
+          <a:ext cx="0" cy="0"/>
+          <a:chOff x="0" y="0"/>
+          <a:chExt cx="0" cy="0"/>
+        </a:xfrm>
+      </p:grpSpPr>
+      <mc:AlternateContent xmlns:mc="http://schemas.openxmlformats.org/markup-compatibility/2006">
+        <mc:Choice xmlns:a14="http://schemas.microsoft.com/office/drawing/2010/main" Requires="a14">
+          <p:sp>
+            <p:nvSpPr>
+              <p:cNvPr id="3" name="Titel 2"/>
+              <p:cNvSpPr>
+                <a:spLocks noGrp="1"/>
+              </p:cNvSpPr>
+              <p:nvPr>
+                <p:ph type="title"/>
+              </p:nvPr>
+            </p:nvSpPr>
+            <p:spPr/>
+            <p:txBody>
+              <a:bodyPr/>
+              <a:lstStyle/>
+              <a:p>
+                <a:pPr/>
+                <a:r>
+                  <a:rPr lang="de-DE" dirty="0"/>
+                  <a:t>Behavior </a:t>
+                </a:r>
+                <a:r>
+                  <a:rPr lang="de-DE" dirty="0" err="1"/>
+                  <a:t>for</a:t>
+                </a:r>
+                <a:r>
+                  <a:rPr lang="de-DE" dirty="0"/>
+                  <a:t> Different Values </a:t>
+                </a:r>
+                <a:r>
+                  <a:rPr lang="de-DE" dirty="0" err="1"/>
+                  <a:t>of</a:t>
+                </a:r>
+                <a:r>
+                  <a:rPr lang="de-DE" dirty="0"/>
+                  <a:t> </a:t>
+                </a:r>
+                <a14:m>
+                  <m:oMath xmlns:m="http://schemas.openxmlformats.org/officeDocument/2006/math">
+                    <m:r>
+                      <a:rPr lang="de-DE" i="1" dirty="0">
+                        <a:latin typeface="Cambria Math" panose="02040503050406030204" pitchFamily="18" charset="0"/>
+                      </a:rPr>
+                      <m:t>𝑅</m:t>
+                    </m:r>
+                    <m:r>
+                      <a:rPr lang="de-DE" i="1" dirty="0">
+                        <a:latin typeface="Cambria Math" panose="02040503050406030204" pitchFamily="18" charset="0"/>
+                      </a:rPr>
+                      <m:t> </m:t>
+                    </m:r>
+                  </m:oMath>
+                </a14:m>
+                <a:br>
+                  <a:rPr lang="en-US" dirty="0"/>
+                </a:br>
+                <a14:m>
+                  <m:oMathPara xmlns:m="http://schemas.openxmlformats.org/officeDocument/2006/math">
+                    <m:oMathParaPr>
+                      <m:jc m:val="left"/>
+                    </m:oMathParaPr>
+                    <m:oMath xmlns:m="http://schemas.openxmlformats.org/officeDocument/2006/math">
+                      <m:r>
+                        <a:rPr lang="en-US" i="1" dirty="0">
+                          <a:latin typeface="Cambria Math" panose="02040503050406030204" pitchFamily="18" charset="0"/>
+                        </a:rPr>
+                        <m:t>3</m:t>
+                      </m:r>
+                      <m:r>
+                        <a:rPr lang="en-US" b="0" i="1" dirty="0" smtClean="0">
+                          <a:latin typeface="Cambria Math" panose="02040503050406030204" pitchFamily="18" charset="0"/>
+                        </a:rPr>
+                        <m:t>.7</m:t>
+                      </m:r>
+                      <m:r>
+                        <a:rPr lang="en-US" i="1" dirty="0">
+                          <a:latin typeface="Cambria Math" panose="02040503050406030204" pitchFamily="18" charset="0"/>
+                        </a:rPr>
+                        <m:t>&lt;</m:t>
+                      </m:r>
+                      <m:r>
+                        <a:rPr lang="en-US" i="1" dirty="0">
+                          <a:latin typeface="Cambria Math" panose="02040503050406030204" pitchFamily="18" charset="0"/>
+                        </a:rPr>
+                        <m:t>𝑅</m:t>
+                      </m:r>
+                      <m:r>
+                        <a:rPr lang="en-US" i="1" dirty="0">
+                          <a:latin typeface="Cambria Math" panose="02040503050406030204" pitchFamily="18" charset="0"/>
+                        </a:rPr>
+                        <m:t>&lt;4</m:t>
+                      </m:r>
+                    </m:oMath>
+                  </m:oMathPara>
+                </a14:m>
+                <a:endParaRPr lang="en-US" dirty="0"/>
+              </a:p>
+            </p:txBody>
+          </p:sp>
+        </mc:Choice>
+        <mc:Fallback>
+          <p:sp>
+            <p:nvSpPr>
+              <p:cNvPr id="3" name="Titel 2"/>
+              <p:cNvSpPr>
+                <a:spLocks noGrp="1" noRot="1" noChangeAspect="1" noMove="1" noResize="1" noEditPoints="1" noAdjustHandles="1" noChangeArrowheads="1" noChangeShapeType="1" noTextEdit="1"/>
+              </p:cNvSpPr>
+              <p:nvPr>
+                <p:ph type="title"/>
+              </p:nvPr>
+            </p:nvSpPr>
+            <p:spPr>
+              <a:blipFill>
+                <a:blip r:embed="rId2"/>
+                <a:stretch>
+                  <a:fillRect l="-837"/>
+                </a:stretch>
+              </a:blipFill>
+            </p:spPr>
+            <p:txBody>
+              <a:bodyPr/>
+              <a:lstStyle/>
+              <a:p>
+                <a:r>
+                  <a:rPr lang="en-US">
+                    <a:noFill/>
+                  </a:rPr>
+                  <a:t> </a:t>
+                </a:r>
+              </a:p>
+            </p:txBody>
+          </p:sp>
+        </mc:Fallback>
+      </mc:AlternateContent>
+      <p:sp>
+        <p:nvSpPr>
+          <p:cNvPr id="4" name="Datumsplatzhalter 3"/>
+          <p:cNvSpPr>
+            <a:spLocks noGrp="1"/>
+          </p:cNvSpPr>
+          <p:nvPr>
+            <p:ph type="dt" sz="half" idx="10"/>
+          </p:nvPr>
+        </p:nvSpPr>
+        <p:spPr/>
+        <p:txBody>
+          <a:bodyPr/>
+          <a:lstStyle/>
+          <a:p>
+            <a:pPr>
+              <a:defRPr/>
+            </a:pPr>
+            <a:fld id="{972A6A5B-77CB-4D42-9DB4-CC6D207310B8}" type="datetime1">
+              <a:rPr lang="de-DE" smtClean="0"/>
+              <a:pPr>
+                <a:defRPr/>
+              </a:pPr>
+              <a:t>03.11.2016</a:t>
+            </a:fld>
+            <a:endParaRPr lang="en-GB" dirty="0"/>
+          </a:p>
+        </p:txBody>
+      </p:sp>
+      <p:sp>
+        <p:nvSpPr>
+          <p:cNvPr id="6" name="Foliennummernplatzhalter 5"/>
+          <p:cNvSpPr>
+            <a:spLocks noGrp="1"/>
+          </p:cNvSpPr>
+          <p:nvPr>
+            <p:ph type="sldNum" sz="quarter" idx="12"/>
+          </p:nvPr>
+        </p:nvSpPr>
+        <p:spPr/>
+        <p:txBody>
+          <a:bodyPr/>
+          <a:lstStyle/>
+          <a:p>
+            <a:pPr>
+              <a:defRPr/>
+            </a:pPr>
+            <a:fld id="{E85D1952-A6FC-4ACE-AEE4-EFAF5C32DAC6}" type="slidenum">
+              <a:rPr lang="en-GB" smtClean="0"/>
+              <a:pPr>
+                <a:defRPr/>
+              </a:pPr>
+              <a:t>12</a:t>
+            </a:fld>
+            <a:endParaRPr lang="en-GB" dirty="0"/>
+          </a:p>
+        </p:txBody>
+      </p:sp>
+      <p:pic>
+        <p:nvPicPr>
+          <p:cNvPr id="2" name="Grafik 1"/>
+          <p:cNvPicPr>
+            <a:picLocks noChangeAspect="1"/>
+          </p:cNvPicPr>
+          <p:nvPr/>
+        </p:nvPicPr>
+        <p:blipFill>
+          <a:blip r:embed="rId3"/>
+          <a:stretch>
+            <a:fillRect/>
+          </a:stretch>
+        </p:blipFill>
+        <p:spPr>
+          <a:xfrm>
+            <a:off x="2015714" y="1052736"/>
+            <a:ext cx="5040562" cy="3865490"/>
+          </a:xfrm>
+          <a:prstGeom prst="rect">
+            <a:avLst/>
+          </a:prstGeom>
+        </p:spPr>
+      </p:pic>
+      <p:sp>
+        <p:nvSpPr>
+          <p:cNvPr id="12" name="Rechteck 11"/>
+          <p:cNvSpPr/>
+          <p:nvPr/>
+        </p:nvSpPr>
+        <p:spPr>
+          <a:xfrm>
+            <a:off x="611560" y="4797152"/>
+            <a:ext cx="4302781" cy="830997"/>
+          </a:xfrm>
+          <a:prstGeom prst="rect">
+            <a:avLst/>
+          </a:prstGeom>
+        </p:spPr>
+        <p:txBody>
+          <a:bodyPr wrap="none">
+            <a:spAutoFit/>
+          </a:bodyPr>
+          <a:lstStyle/>
+          <a:p>
+            <a:pPr marL="342900" indent="-342900">
+              <a:buFont typeface="Arial" panose="020B0604020202020204" pitchFamily="34" charset="0"/>
+              <a:buChar char="•"/>
+            </a:pPr>
+            <a:endParaRPr lang="de-DE" dirty="0"/>
+          </a:p>
+          <a:p>
+            <a:pPr marL="342900" indent="-342900">
+              <a:buFont typeface="Arial" panose="020B0604020202020204" pitchFamily="34" charset="0"/>
+              <a:buChar char="•"/>
+            </a:pPr>
+            <a:r>
+              <a:rPr lang="de-DE" dirty="0" err="1"/>
+              <a:t>Certain</a:t>
+            </a:r>
+            <a:r>
+              <a:rPr lang="de-DE" dirty="0"/>
+              <a:t> „Islands </a:t>
+            </a:r>
+            <a:r>
+              <a:rPr lang="de-DE" dirty="0" err="1"/>
+              <a:t>of</a:t>
+            </a:r>
+            <a:r>
+              <a:rPr lang="de-DE" dirty="0"/>
+              <a:t> </a:t>
+            </a:r>
+            <a:r>
+              <a:rPr lang="de-DE" dirty="0" err="1"/>
+              <a:t>Stability</a:t>
+            </a:r>
+            <a:r>
+              <a:rPr lang="de-DE" dirty="0"/>
+              <a:t>“</a:t>
+            </a:r>
+          </a:p>
+        </p:txBody>
+      </p:sp>
+      <p:sp>
+        <p:nvSpPr>
+          <p:cNvPr id="14" name="Fußzeilenplatzhalter 4"/>
+          <p:cNvSpPr>
+            <a:spLocks noGrp="1"/>
+          </p:cNvSpPr>
+          <p:nvPr>
+            <p:ph type="ftr" sz="quarter" idx="11"/>
+          </p:nvPr>
+        </p:nvSpPr>
+        <p:spPr>
+          <a:xfrm>
+            <a:off x="3131840" y="6309320"/>
+            <a:ext cx="4824536" cy="454025"/>
+          </a:xfrm>
+        </p:spPr>
+        <p:txBody>
+          <a:bodyPr/>
+          <a:lstStyle/>
+          <a:p>
+            <a:pPr>
+              <a:defRPr/>
+            </a:pPr>
+            <a:r>
+              <a:rPr lang="en-GB" dirty="0"/>
+              <a:t>https://en.wikipedia.org/wiki/Logistic_map</a:t>
+            </a:r>
+          </a:p>
+        </p:txBody>
+      </p:sp>
+    </p:spTree>
+    <p:extLst>
+      <p:ext uri="{BB962C8B-B14F-4D97-AF65-F5344CB8AC3E}">
+        <p14:creationId xmlns:p14="http://schemas.microsoft.com/office/powerpoint/2010/main" val="4125852198"/>
+      </p:ext>
+    </p:extLst>
+  </p:cSld>
+  <p:clrMapOvr>
+    <a:masterClrMapping/>
+  </p:clrMapOvr>
+</p:sld>
+</file>
+
+<file path=ppt/slides/slide13.xml><?xml version="1.0" encoding="utf-8"?>
+<p:sld xmlns:a="http://schemas.openxmlformats.org/drawingml/2006/main" xmlns:r="http://schemas.openxmlformats.org/officeDocument/2006/relationships" xmlns:p="http://schemas.openxmlformats.org/presentationml/2006/main">
+  <p:cSld>
+    <p:spTree>
+      <p:nvGrpSpPr>
+        <p:cNvPr id="1" name=""/>
+        <p:cNvGrpSpPr/>
+        <p:nvPr/>
+      </p:nvGrpSpPr>
+      <p:grpSpPr>
+        <a:xfrm>
+          <a:off x="0" y="0"/>
+          <a:ext cx="0" cy="0"/>
+          <a:chOff x="0" y="0"/>
+          <a:chExt cx="0" cy="0"/>
+        </a:xfrm>
+      </p:grpSpPr>
+      <mc:AlternateContent xmlns:mc="http://schemas.openxmlformats.org/markup-compatibility/2006">
+        <mc:Choice xmlns:a14="http://schemas.microsoft.com/office/drawing/2010/main" Requires="a14">
+          <p:sp>
+            <p:nvSpPr>
+              <p:cNvPr id="7" name="Inhaltsplatzhalter 6"/>
+              <p:cNvSpPr>
+                <a:spLocks noGrp="1"/>
+              </p:cNvSpPr>
+              <p:nvPr>
+                <p:ph idx="1"/>
+              </p:nvPr>
+            </p:nvSpPr>
+            <p:spPr/>
+            <p:txBody>
+              <a:bodyPr/>
+              <a:lstStyle/>
+              <a:p>
+                <a:r>
+                  <a:rPr lang="en-US" dirty="0"/>
+                  <a:t>For </a:t>
+                </a:r>
+                <a14:m>
+                  <m:oMath xmlns:m="http://schemas.openxmlformats.org/officeDocument/2006/math">
+                    <m:r>
+                      <a:rPr lang="en-US" i="1" dirty="0">
+                        <a:latin typeface="Cambria Math" panose="02040503050406030204" pitchFamily="18" charset="0"/>
+                      </a:rPr>
+                      <m:t>𝑅</m:t>
+                    </m:r>
+                    <m:r>
+                      <a:rPr lang="en-US" i="1" dirty="0">
+                        <a:latin typeface="Cambria Math" panose="02040503050406030204" pitchFamily="18" charset="0"/>
+                      </a:rPr>
+                      <m:t>&gt;4</m:t>
+                    </m:r>
+                  </m:oMath>
+                </a14:m>
+                <a:r>
+                  <a:rPr lang="en-US" dirty="0"/>
+                  <a:t>, </a:t>
+                </a:r>
+                <a14:m>
+                  <m:oMath xmlns:m="http://schemas.openxmlformats.org/officeDocument/2006/math">
+                    <m:r>
+                      <a:rPr lang="en-US" i="1" dirty="0">
+                        <a:latin typeface="Cambria Math" panose="02040503050406030204" pitchFamily="18" charset="0"/>
+                      </a:rPr>
+                      <m:t>𝑦</m:t>
+                    </m:r>
+                  </m:oMath>
+                </a14:m>
+                <a:r>
+                  <a:rPr lang="en-US" dirty="0"/>
+                  <a:t> will exceed </a:t>
+                </a:r>
+                <a14:m>
+                  <m:oMath xmlns:m="http://schemas.openxmlformats.org/officeDocument/2006/math">
+                    <m:r>
+                      <a:rPr lang="en-US" i="1" dirty="0">
+                        <a:latin typeface="Cambria Math" panose="02040503050406030204" pitchFamily="18" charset="0"/>
+                      </a:rPr>
+                      <m:t>[0,1]</m:t>
+                    </m:r>
+                  </m:oMath>
+                </a14:m>
+                <a:r>
+                  <a:rPr lang="de-DE" dirty="0"/>
+                  <a:t> </a:t>
+                </a:r>
+                <a:r>
+                  <a:rPr lang="de-DE" dirty="0" err="1"/>
+                  <a:t>quickly</a:t>
+                </a:r>
+                <a:r>
+                  <a:rPr lang="de-DE" dirty="0"/>
+                  <a:t> (</a:t>
+                </a:r>
+                <a:r>
+                  <a:rPr lang="de-DE" dirty="0" err="1"/>
+                  <a:t>no</a:t>
+                </a:r>
+                <a:r>
+                  <a:rPr lang="de-DE" dirty="0"/>
+                  <a:t> </a:t>
+                </a:r>
+                <a:r>
+                  <a:rPr lang="de-DE" dirty="0" err="1"/>
+                  <a:t>plotting</a:t>
+                </a:r>
+                <a:r>
+                  <a:rPr lang="de-DE" dirty="0"/>
+                  <a:t> </a:t>
+                </a:r>
+                <a:r>
+                  <a:rPr lang="de-DE" dirty="0" err="1"/>
+                  <a:t>possible</a:t>
+                </a:r>
+                <a:r>
+                  <a:rPr lang="de-DE" dirty="0"/>
+                  <a:t>)</a:t>
+                </a:r>
+              </a:p>
+              <a:p>
+                <a:endParaRPr lang="en-US" dirty="0"/>
+              </a:p>
+            </p:txBody>
+          </p:sp>
+        </mc:Choice>
+        <mc:Fallback>
+          <p:sp>
+            <p:nvSpPr>
+              <p:cNvPr id="7" name="Inhaltsplatzhalter 6"/>
+              <p:cNvSpPr>
+                <a:spLocks noGrp="1" noRot="1" noChangeAspect="1" noMove="1" noResize="1" noEditPoints="1" noAdjustHandles="1" noChangeArrowheads="1" noChangeShapeType="1" noTextEdit="1"/>
+              </p:cNvSpPr>
+              <p:nvPr>
+                <p:ph idx="1"/>
+              </p:nvPr>
+            </p:nvSpPr>
+            <p:spPr>
+              <a:blipFill>
+                <a:blip r:embed="rId2"/>
+                <a:stretch>
+                  <a:fillRect l="-669" t="-521"/>
+                </a:stretch>
+              </a:blipFill>
+            </p:spPr>
+            <p:txBody>
+              <a:bodyPr/>
+              <a:lstStyle/>
+              <a:p>
+                <a:r>
+                  <a:rPr lang="en-US">
+                    <a:noFill/>
+                  </a:rPr>
+                  <a:t> </a:t>
+                </a:r>
+              </a:p>
+            </p:txBody>
+          </p:sp>
+        </mc:Fallback>
+      </mc:AlternateContent>
+      <mc:AlternateContent xmlns:mc="http://schemas.openxmlformats.org/markup-compatibility/2006">
+        <mc:Choice xmlns:a14="http://schemas.microsoft.com/office/drawing/2010/main" Requires="a14">
+          <p:sp>
+            <p:nvSpPr>
+              <p:cNvPr id="3" name="Titel 2"/>
+              <p:cNvSpPr>
+                <a:spLocks noGrp="1"/>
+              </p:cNvSpPr>
+              <p:nvPr>
+                <p:ph type="title"/>
+              </p:nvPr>
+            </p:nvSpPr>
+            <p:spPr/>
+            <p:txBody>
+              <a:bodyPr/>
+              <a:lstStyle/>
+              <a:p>
+                <a:pPr/>
+                <a:r>
+                  <a:rPr lang="de-DE" dirty="0"/>
+                  <a:t>Behavior </a:t>
+                </a:r>
+                <a:r>
+                  <a:rPr lang="de-DE" dirty="0" err="1"/>
+                  <a:t>for</a:t>
+                </a:r>
+                <a:r>
+                  <a:rPr lang="de-DE" dirty="0"/>
+                  <a:t> Different Values </a:t>
+                </a:r>
+                <a:r>
+                  <a:rPr lang="de-DE" dirty="0" err="1"/>
+                  <a:t>of</a:t>
+                </a:r>
+                <a:r>
+                  <a:rPr lang="de-DE" dirty="0"/>
+                  <a:t> </a:t>
+                </a:r>
+                <a14:m>
+                  <m:oMath xmlns:m="http://schemas.openxmlformats.org/officeDocument/2006/math">
+                    <m:r>
+                      <a:rPr lang="de-DE" i="1" dirty="0">
+                        <a:latin typeface="Cambria Math" panose="02040503050406030204" pitchFamily="18" charset="0"/>
+                      </a:rPr>
+                      <m:t>𝑅</m:t>
+                    </m:r>
+                    <m:r>
+                      <a:rPr lang="de-DE" i="1" dirty="0">
+                        <a:latin typeface="Cambria Math" panose="02040503050406030204" pitchFamily="18" charset="0"/>
+                      </a:rPr>
+                      <m:t> </m:t>
+                    </m:r>
+                  </m:oMath>
+                </a14:m>
+                <a:br>
+                  <a:rPr lang="en-US" dirty="0"/>
+                </a:br>
+                <a14:m>
+                  <m:oMathPara xmlns:m="http://schemas.openxmlformats.org/officeDocument/2006/math">
+                    <m:oMathParaPr>
+                      <m:jc m:val="left"/>
+                    </m:oMathParaPr>
+                    <m:oMath xmlns:m="http://schemas.openxmlformats.org/officeDocument/2006/math">
+                      <m:r>
+                        <a:rPr lang="en-US" b="0" i="1" smtClean="0">
+                          <a:latin typeface="Cambria Math" panose="02040503050406030204" pitchFamily="18" charset="0"/>
+                        </a:rPr>
+                        <m:t>𝑅</m:t>
+                      </m:r>
+                      <m:r>
+                        <a:rPr lang="en-US" b="0" i="1" smtClean="0">
+                          <a:latin typeface="Cambria Math" panose="02040503050406030204" pitchFamily="18" charset="0"/>
+                        </a:rPr>
+                        <m:t>&gt;4</m:t>
+                      </m:r>
+                    </m:oMath>
+                  </m:oMathPara>
+                </a14:m>
+                <a:endParaRPr lang="en-US" dirty="0"/>
+              </a:p>
+            </p:txBody>
+          </p:sp>
+        </mc:Choice>
+        <mc:Fallback>
+          <p:sp>
+            <p:nvSpPr>
+              <p:cNvPr id="3" name="Titel 2"/>
+              <p:cNvSpPr>
+                <a:spLocks noGrp="1" noRot="1" noChangeAspect="1" noMove="1" noResize="1" noEditPoints="1" noAdjustHandles="1" noChangeArrowheads="1" noChangeShapeType="1" noTextEdit="1"/>
+              </p:cNvSpPr>
+              <p:nvPr>
+                <p:ph type="title"/>
+              </p:nvPr>
+            </p:nvSpPr>
+            <p:spPr>
+              <a:blipFill>
+                <a:blip r:embed="rId3"/>
+                <a:stretch>
+                  <a:fillRect l="-837"/>
+                </a:stretch>
+              </a:blipFill>
+            </p:spPr>
+            <p:txBody>
+              <a:bodyPr/>
+              <a:lstStyle/>
+              <a:p>
+                <a:r>
+                  <a:rPr lang="en-US">
+                    <a:noFill/>
+                  </a:rPr>
+                  <a:t> </a:t>
+                </a:r>
+              </a:p>
+            </p:txBody>
+          </p:sp>
+        </mc:Fallback>
+      </mc:AlternateContent>
+      <p:sp>
+        <p:nvSpPr>
+          <p:cNvPr id="4" name="Datumsplatzhalter 3"/>
+          <p:cNvSpPr>
+            <a:spLocks noGrp="1"/>
+          </p:cNvSpPr>
+          <p:nvPr>
+            <p:ph type="dt" sz="half" idx="10"/>
+          </p:nvPr>
+        </p:nvSpPr>
+        <p:spPr/>
+        <p:txBody>
+          <a:bodyPr/>
+          <a:lstStyle/>
+          <a:p>
+            <a:pPr>
+              <a:defRPr/>
+            </a:pPr>
+            <a:fld id="{972A6A5B-77CB-4D42-9DB4-CC6D207310B8}" type="datetime1">
+              <a:rPr lang="de-DE" smtClean="0"/>
+              <a:pPr>
+                <a:defRPr/>
+              </a:pPr>
+              <a:t>03.11.2016</a:t>
+            </a:fld>
+            <a:endParaRPr lang="en-GB" dirty="0"/>
+          </a:p>
+        </p:txBody>
+      </p:sp>
+      <p:sp>
+        <p:nvSpPr>
+          <p:cNvPr id="5" name="Fußzeilenplatzhalter 4"/>
+          <p:cNvSpPr>
+            <a:spLocks noGrp="1"/>
+          </p:cNvSpPr>
+          <p:nvPr>
+            <p:ph type="ftr" sz="quarter" idx="11"/>
+          </p:nvPr>
+        </p:nvSpPr>
+        <p:spPr/>
+        <p:txBody>
+          <a:bodyPr/>
+          <a:lstStyle/>
+          <a:p>
+            <a:pPr>
+              <a:defRPr/>
+            </a:pPr>
+            <a:r>
+              <a:rPr lang="en-GB" dirty="0"/>
+              <a:t>https://en.wikipedia.org/wiki/Logistic_map</a:t>
+            </a:r>
+          </a:p>
+        </p:txBody>
+      </p:sp>
+      <p:sp>
+        <p:nvSpPr>
+          <p:cNvPr id="6" name="Foliennummernplatzhalter 5"/>
+          <p:cNvSpPr>
+            <a:spLocks noGrp="1"/>
+          </p:cNvSpPr>
+          <p:nvPr>
+            <p:ph type="sldNum" sz="quarter" idx="12"/>
+          </p:nvPr>
+        </p:nvSpPr>
+        <p:spPr/>
+        <p:txBody>
+          <a:bodyPr/>
+          <a:lstStyle/>
+          <a:p>
+            <a:pPr>
+              <a:defRPr/>
+            </a:pPr>
+            <a:fld id="{E85D1952-A6FC-4ACE-AEE4-EFAF5C32DAC6}" type="slidenum">
+              <a:rPr lang="en-GB" smtClean="0"/>
+              <a:pPr>
+                <a:defRPr/>
+              </a:pPr>
+              <a:t>13</a:t>
+            </a:fld>
+            <a:endParaRPr lang="en-GB" dirty="0"/>
+          </a:p>
+        </p:txBody>
+      </p:sp>
+    </p:spTree>
+    <p:extLst>
+      <p:ext uri="{BB962C8B-B14F-4D97-AF65-F5344CB8AC3E}">
+        <p14:creationId xmlns:p14="http://schemas.microsoft.com/office/powerpoint/2010/main" val="1947057861"/>
       </p:ext>
     </p:extLst>
   </p:cSld>
@@ -2769,12 +4359,12 @@
       </p:grpSpPr>
       <p:sp>
         <p:nvSpPr>
-          <p:cNvPr id="7" name="Inhaltsplatzhalter 6"/>
+          <p:cNvPr id="2" name="Titel 1"/>
           <p:cNvSpPr>
             <a:spLocks noGrp="1"/>
           </p:cNvSpPr>
           <p:nvPr>
-            <p:ph idx="1"/>
+            <p:ph type="title"/>
           </p:nvPr>
         </p:nvSpPr>
         <p:spPr/>
@@ -2782,125 +4372,13 @@
           <a:bodyPr/>
           <a:lstStyle/>
           <a:p>
-            <a:pPr marL="0" indent="0">
-              <a:buNone/>
-            </a:pPr>
-            <a:r>
-              <a:rPr lang="en-US" dirty="0">
-                <a:latin typeface="Consolas" panose="020B0609020204030204" pitchFamily="49" charset="0"/>
-              </a:rPr>
-              <a:t>;; the initialization makes sure y-current and y-new are</a:t>
-            </a:r>
-          </a:p>
-          <a:p>
-            <a:pPr marL="0" indent="0">
-              <a:buNone/>
-            </a:pPr>
-            <a:r>
-              <a:rPr lang="en-US" dirty="0">
-                <a:latin typeface="Consolas" panose="020B0609020204030204" pitchFamily="49" charset="0"/>
-              </a:rPr>
-              <a:t>;; set to y(0) and y(1), respectively</a:t>
-            </a:r>
-          </a:p>
-          <a:p>
-            <a:pPr marL="0" indent="0">
-              <a:buNone/>
-            </a:pPr>
-            <a:r>
-              <a:rPr lang="en-US" dirty="0">
-                <a:latin typeface="Consolas" panose="020B0609020204030204" pitchFamily="49" charset="0"/>
-              </a:rPr>
-              <a:t>;; PRE: none</a:t>
-            </a:r>
-          </a:p>
-          <a:p>
-            <a:pPr marL="0" indent="0">
-              <a:buNone/>
-            </a:pPr>
-            <a:r>
-              <a:rPr lang="en-US" dirty="0">
-                <a:latin typeface="Consolas" panose="020B0609020204030204" pitchFamily="49" charset="0"/>
-              </a:rPr>
-              <a:t>;; POST: y-current equals y(0); y-new equals y(1)</a:t>
-            </a:r>
-          </a:p>
-          <a:p>
-            <a:pPr marL="0" indent="0">
-              <a:buNone/>
-            </a:pPr>
-            <a:r>
-              <a:rPr lang="en-US" dirty="0">
-                <a:latin typeface="Consolas" panose="020B0609020204030204" pitchFamily="49" charset="0"/>
-              </a:rPr>
-              <a:t>to initialize</a:t>
-            </a:r>
-          </a:p>
-          <a:p>
-            <a:pPr marL="0" indent="0">
-              <a:buNone/>
-            </a:pPr>
-            <a:r>
-              <a:rPr lang="en-US" dirty="0">
-                <a:latin typeface="Consolas" panose="020B0609020204030204" pitchFamily="49" charset="0"/>
-              </a:rPr>
-              <a:t>  set y-current y0</a:t>
-            </a:r>
-          </a:p>
-          <a:p>
-            <a:pPr marL="0" indent="0">
-              <a:buNone/>
-            </a:pPr>
-            <a:r>
-              <a:rPr lang="en-US" dirty="0">
-                <a:latin typeface="Consolas" panose="020B0609020204030204" pitchFamily="49" charset="0"/>
-              </a:rPr>
-              <a:t>  set y-new </a:t>
-            </a:r>
-            <a:r>
-              <a:rPr lang="en-US" dirty="0" err="1">
-                <a:latin typeface="Consolas" panose="020B0609020204030204" pitchFamily="49" charset="0"/>
-              </a:rPr>
-              <a:t>logisticMap</a:t>
-            </a:r>
-            <a:r>
-              <a:rPr lang="en-US" dirty="0">
-                <a:latin typeface="Consolas" panose="020B0609020204030204" pitchFamily="49" charset="0"/>
-              </a:rPr>
-              <a:t> R y-current</a:t>
-            </a:r>
-          </a:p>
-          <a:p>
-            <a:pPr marL="0" indent="0">
-              <a:buNone/>
-            </a:pPr>
-            <a:r>
-              <a:rPr lang="en-US" dirty="0">
-                <a:latin typeface="Consolas" panose="020B0609020204030204" pitchFamily="49" charset="0"/>
-              </a:rPr>
-              <a:t>end</a:t>
-            </a:r>
-          </a:p>
-        </p:txBody>
-      </p:sp>
-      <p:sp>
-        <p:nvSpPr>
-          <p:cNvPr id="6" name="Titel 5"/>
-          <p:cNvSpPr>
-            <a:spLocks noGrp="1"/>
-          </p:cNvSpPr>
-          <p:nvPr>
-            <p:ph type="title"/>
-          </p:nvPr>
-        </p:nvSpPr>
-        <p:spPr/>
-        <p:txBody>
-          <a:bodyPr/>
-          <a:lstStyle/>
-          <a:p>
+            <a:r>
+              <a:rPr lang="en-US" dirty="0" err="1"/>
+              <a:t>Netlogo</a:t>
+            </a:r>
             <a:r>
               <a:rPr lang="en-US" dirty="0"/>
-              <a:t>Initialization</a:t>
+              <a:t> Code</a:t>
             </a:r>
           </a:p>
         </p:txBody>
@@ -2988,7 +4466,7 @@
     </p:spTree>
     <p:extLst>
       <p:ext uri="{BB962C8B-B14F-4D97-AF65-F5344CB8AC3E}">
-        <p14:creationId xmlns:p14="http://schemas.microsoft.com/office/powerpoint/2010/main" val="2085110305"/>
+        <p14:creationId xmlns:p14="http://schemas.microsoft.com/office/powerpoint/2010/main" val="4174642701"/>
       </p:ext>
     </p:extLst>
   </p:cSld>
@@ -3025,7 +4503,11 @@
             <p:ph idx="1"/>
           </p:nvPr>
         </p:nvSpPr>
-        <p:spPr/>
+        <p:spPr>
+          <a:solidFill>
+            <a:schemeClr val="tx1"/>
+          </a:solidFill>
+        </p:spPr>
         <p:txBody>
           <a:bodyPr/>
           <a:lstStyle/>
@@ -3035,9 +4517,12 @@
             </a:pPr>
             <a:r>
               <a:rPr lang="en-US" dirty="0">
+                <a:solidFill>
+                  <a:schemeClr val="bg1"/>
+                </a:solidFill>
                 <a:latin typeface="Consolas" panose="020B0609020204030204" pitchFamily="49" charset="0"/>
               </a:rPr>
-              <a:t>;; The transformation function performs exactly</a:t>
+              <a:t>;; the initialization makes sure y-current and y-new are</a:t>
             </a:r>
           </a:p>
           <a:p>
@@ -3046,9 +4531,12 @@
             </a:pPr>
             <a:r>
               <a:rPr lang="en-US" dirty="0">
+                <a:solidFill>
+                  <a:schemeClr val="bg1"/>
+                </a:solidFill>
                 <a:latin typeface="Consolas" panose="020B0609020204030204" pitchFamily="49" charset="0"/>
               </a:rPr>
-              <a:t>;; one step in the logistic map</a:t>
+              <a:t>;; set to y(0) and y(1), respectively</a:t>
             </a:r>
           </a:p>
           <a:p>
@@ -3057,9 +4545,12 @@
             </a:pPr>
             <a:r>
               <a:rPr lang="en-US" dirty="0">
+                <a:solidFill>
+                  <a:schemeClr val="bg1"/>
+                </a:solidFill>
                 <a:latin typeface="Consolas" panose="020B0609020204030204" pitchFamily="49" charset="0"/>
               </a:rPr>
-              <a:t>;; PRE: y-current equals y(t); y-new equals y(t+1)</a:t>
+              <a:t>;; PRE: none</a:t>
             </a:r>
           </a:p>
           <a:p>
@@ -3068,9 +4559,12 @@
             </a:pPr>
             <a:r>
               <a:rPr lang="en-US" dirty="0">
+                <a:solidFill>
+                  <a:schemeClr val="bg1"/>
+                </a:solidFill>
                 <a:latin typeface="Consolas" panose="020B0609020204030204" pitchFamily="49" charset="0"/>
               </a:rPr>
-              <a:t>;; POST: y-current equals y(t+1); y-new equals y(t+2)</a:t>
+              <a:t>;; POST: y-current equals y(0); y-new equals y(1)</a:t>
             </a:r>
           </a:p>
           <a:p>
@@ -3079,19 +4573,27 @@
             </a:pPr>
             <a:r>
               <a:rPr lang="en-US" dirty="0">
+                <a:solidFill>
+                  <a:schemeClr val="bg1"/>
+                </a:solidFill>
                 <a:latin typeface="Consolas" panose="020B0609020204030204" pitchFamily="49" charset="0"/>
               </a:rPr>
-              <a:t>to </a:t>
-            </a:r>
-            <a:r>
-              <a:rPr lang="en-US" dirty="0" err="1">
+              <a:t>to initialize</a:t>
+            </a:r>
+          </a:p>
+          <a:p>
+            <a:pPr marL="0" indent="0">
+              <a:buNone/>
+            </a:pPr>
+            <a:r>
+              <a:rPr lang="en-US" dirty="0">
+                <a:solidFill>
+                  <a:schemeClr val="bg1"/>
+                </a:solidFill>
                 <a:latin typeface="Consolas" panose="020B0609020204030204" pitchFamily="49" charset="0"/>
               </a:rPr>
-              <a:t>transformFunc</a:t>
-            </a:r>
-            <a:endParaRPr lang="en-US" dirty="0">
-              <a:latin typeface="Consolas" panose="020B0609020204030204" pitchFamily="49" charset="0"/>
-            </a:endParaRPr>
+              <a:t>  set y-current y0</a:t>
+            </a:r>
           </a:p>
           <a:p>
             <a:pPr marL="0" indent="0">
@@ -3099,29 +4601,27 @@
             </a:pPr>
             <a:r>
               <a:rPr lang="en-US" dirty="0">
-                <a:latin typeface="Consolas" panose="020B0609020204030204" pitchFamily="49" charset="0"/>
-              </a:rPr>
-              <a:t>  set y-current y-new</a:t>
-            </a:r>
-          </a:p>
-          <a:p>
-            <a:pPr marL="0" indent="0">
-              <a:buNone/>
-            </a:pPr>
-            <a:r>
-              <a:rPr lang="en-US" dirty="0">
+                <a:solidFill>
+                  <a:schemeClr val="bg1"/>
+                </a:solidFill>
                 <a:latin typeface="Consolas" panose="020B0609020204030204" pitchFamily="49" charset="0"/>
               </a:rPr>
               <a:t>  set y-new </a:t>
             </a:r>
             <a:r>
               <a:rPr lang="en-US" dirty="0" err="1">
+                <a:solidFill>
+                  <a:schemeClr val="bg1"/>
+                </a:solidFill>
                 <a:latin typeface="Consolas" panose="020B0609020204030204" pitchFamily="49" charset="0"/>
               </a:rPr>
               <a:t>logisticMap</a:t>
             </a:r>
             <a:r>
               <a:rPr lang="en-US" dirty="0">
+                <a:solidFill>
+                  <a:schemeClr val="bg1"/>
+                </a:solidFill>
                 <a:latin typeface="Consolas" panose="020B0609020204030204" pitchFamily="49" charset="0"/>
               </a:rPr>
               <a:t> R y-current</a:t>
@@ -3133,13 +4633,13 @@
             </a:pPr>
             <a:r>
               <a:rPr lang="en-US" dirty="0">
+                <a:solidFill>
+                  <a:schemeClr val="bg1"/>
+                </a:solidFill>
                 <a:latin typeface="Consolas" panose="020B0609020204030204" pitchFamily="49" charset="0"/>
               </a:rPr>
               <a:t>end</a:t>
             </a:r>
-            <a:endParaRPr lang="en-US" dirty="0">
-              <a:latin typeface="Consolas" panose="020B0609020204030204" pitchFamily="49" charset="0"/>
-            </a:endParaRPr>
           </a:p>
         </p:txBody>
       </p:sp>
@@ -3160,7 +4660,7 @@
           <a:p>
             <a:r>
               <a:rPr lang="en-US" dirty="0"/>
-              <a:t>Transform Function</a:t>
+              <a:t>Initialization</a:t>
             </a:r>
           </a:p>
         </p:txBody>
@@ -3248,7 +4748,7 @@
     </p:spTree>
     <p:extLst>
       <p:ext uri="{BB962C8B-B14F-4D97-AF65-F5344CB8AC3E}">
-        <p14:creationId xmlns:p14="http://schemas.microsoft.com/office/powerpoint/2010/main" val="582188984"/>
+        <p14:creationId xmlns:p14="http://schemas.microsoft.com/office/powerpoint/2010/main" val="2085110305"/>
       </p:ext>
     </p:extLst>
   </p:cSld>
@@ -3285,7 +4785,11 @@
             <p:ph idx="1"/>
           </p:nvPr>
         </p:nvSpPr>
-        <p:spPr/>
+        <p:spPr>
+          <a:solidFill>
+            <a:schemeClr val="tx1"/>
+          </a:solidFill>
+        </p:spPr>
         <p:txBody>
           <a:bodyPr/>
           <a:lstStyle/>
@@ -3295,9 +4799,12 @@
             </a:pPr>
             <a:r>
               <a:rPr lang="en-US" dirty="0">
+                <a:solidFill>
+                  <a:schemeClr val="bg1"/>
+                </a:solidFill>
                 <a:latin typeface="Consolas" panose="020B0609020204030204" pitchFamily="49" charset="0"/>
               </a:rPr>
-              <a:t>;; PRE R_ in [0, 4.0), y in [0, 1]</a:t>
+              <a:t>;; The transformation function performs exactly</a:t>
             </a:r>
           </a:p>
           <a:p>
@@ -3306,9 +4813,12 @@
             </a:pPr>
             <a:r>
               <a:rPr lang="en-US" dirty="0">
+                <a:solidFill>
+                  <a:schemeClr val="bg1"/>
+                </a:solidFill>
                 <a:latin typeface="Consolas" panose="020B0609020204030204" pitchFamily="49" charset="0"/>
               </a:rPr>
-              <a:t>;; POST Result of logistic map</a:t>
+              <a:t>;; one step in the logistic map</a:t>
             </a:r>
           </a:p>
           <a:p>
@@ -3317,21 +4827,101 @@
             </a:pPr>
             <a:r>
               <a:rPr lang="en-US" dirty="0">
+                <a:solidFill>
+                  <a:schemeClr val="bg1"/>
+                </a:solidFill>
                 <a:latin typeface="Consolas" panose="020B0609020204030204" pitchFamily="49" charset="0"/>
               </a:rPr>
-              <a:t>to-report </a:t>
+              <a:t>;; PRE: y-current equals y(t); y-new equals y(t+1)</a:t>
+            </a:r>
+          </a:p>
+          <a:p>
+            <a:pPr marL="0" indent="0">
+              <a:buNone/>
+            </a:pPr>
+            <a:r>
+              <a:rPr lang="en-US" dirty="0">
+                <a:solidFill>
+                  <a:schemeClr val="bg1"/>
+                </a:solidFill>
+                <a:latin typeface="Consolas" panose="020B0609020204030204" pitchFamily="49" charset="0"/>
+              </a:rPr>
+              <a:t>;; POST: y-current equals y(t+1); y-new equals y(t+2)</a:t>
+            </a:r>
+          </a:p>
+          <a:p>
+            <a:pPr marL="0" indent="0">
+              <a:buNone/>
+            </a:pPr>
+            <a:r>
+              <a:rPr lang="en-US" dirty="0">
+                <a:solidFill>
+                  <a:schemeClr val="bg1"/>
+                </a:solidFill>
+                <a:latin typeface="Consolas" panose="020B0609020204030204" pitchFamily="49" charset="0"/>
+              </a:rPr>
+              <a:t>to </a:t>
             </a:r>
             <a:r>
               <a:rPr lang="en-US" dirty="0" err="1">
+                <a:solidFill>
+                  <a:schemeClr val="bg1"/>
+                </a:solidFill>
+                <a:latin typeface="Consolas" panose="020B0609020204030204" pitchFamily="49" charset="0"/>
+              </a:rPr>
+              <a:t>transformFunc</a:t>
+            </a:r>
+            <a:endParaRPr lang="en-US" dirty="0">
+              <a:solidFill>
+                <a:schemeClr val="bg1"/>
+              </a:solidFill>
+              <a:latin typeface="Consolas" panose="020B0609020204030204" pitchFamily="49" charset="0"/>
+            </a:endParaRPr>
+          </a:p>
+          <a:p>
+            <a:pPr marL="0" indent="0">
+              <a:buNone/>
+            </a:pPr>
+            <a:r>
+              <a:rPr lang="en-US" dirty="0">
+                <a:solidFill>
+                  <a:schemeClr val="bg1"/>
+                </a:solidFill>
+                <a:latin typeface="Consolas" panose="020B0609020204030204" pitchFamily="49" charset="0"/>
+              </a:rPr>
+              <a:t>  set y-current y-new</a:t>
+            </a:r>
+          </a:p>
+          <a:p>
+            <a:pPr marL="0" indent="0">
+              <a:buNone/>
+            </a:pPr>
+            <a:r>
+              <a:rPr lang="en-US" dirty="0">
+                <a:solidFill>
+                  <a:schemeClr val="bg1"/>
+                </a:solidFill>
+                <a:latin typeface="Consolas" panose="020B0609020204030204" pitchFamily="49" charset="0"/>
+              </a:rPr>
+              <a:t>  set y-new </a:t>
+            </a:r>
+            <a:r>
+              <a:rPr lang="en-US" dirty="0" err="1">
+                <a:solidFill>
+                  <a:schemeClr val="bg1"/>
+                </a:solidFill>
                 <a:latin typeface="Consolas" panose="020B0609020204030204" pitchFamily="49" charset="0"/>
               </a:rPr>
               <a:t>logisticMap</a:t>
             </a:r>
             <a:r>
               <a:rPr lang="en-US" dirty="0">
+                <a:solidFill>
+                  <a:schemeClr val="bg1"/>
+                </a:solidFill>
                 <a:latin typeface="Consolas" panose="020B0609020204030204" pitchFamily="49" charset="0"/>
               </a:rPr>
-              <a:t> [R_ y]</a:t>
+              <a:t> R y-current</a:t>
             </a:r>
           </a:p>
           <a:p>
@@ -3340,30 +4930,14 @@
             </a:pPr>
             <a:r>
               <a:rPr lang="en-US" dirty="0">
-                <a:latin typeface="Consolas" panose="020B0609020204030204" pitchFamily="49" charset="0"/>
-              </a:rPr>
-              <a:t> report R_ * y * (1 - y)</a:t>
-            </a:r>
-          </a:p>
-          <a:p>
-            <a:pPr marL="0" indent="0">
-              <a:buNone/>
-            </a:pPr>
-            <a:r>
-              <a:rPr lang="en-US" dirty="0">
+                <a:solidFill>
+                  <a:schemeClr val="bg1"/>
+                </a:solidFill>
                 <a:latin typeface="Consolas" panose="020B0609020204030204" pitchFamily="49" charset="0"/>
               </a:rPr>
               <a:t>end</a:t>
             </a:r>
           </a:p>
-          <a:p>
-            <a:pPr marL="0" indent="0">
-              <a:buNone/>
-            </a:pPr>
-            <a:endParaRPr lang="en-US" dirty="0">
-              <a:latin typeface="Consolas" panose="020B0609020204030204" pitchFamily="49" charset="0"/>
-            </a:endParaRPr>
-          </a:p>
         </p:txBody>
       </p:sp>
       <p:sp>
@@ -3383,9 +4957,8 @@
           <a:p>
             <a:r>
               <a:rPr lang="en-US" dirty="0"/>
-              <a:t>Logistic Map Function</a:t>
-            </a:r>
-            <a:endParaRPr lang="en-US" dirty="0"/>
+              <a:t>Transform Function</a:t>
+            </a:r>
           </a:p>
         </p:txBody>
       </p:sp>
@@ -3472,7 +5045,7 @@
     </p:spTree>
     <p:extLst>
       <p:ext uri="{BB962C8B-B14F-4D97-AF65-F5344CB8AC3E}">
-        <p14:creationId xmlns:p14="http://schemas.microsoft.com/office/powerpoint/2010/main" val="1382463161"/>
+        <p14:creationId xmlns:p14="http://schemas.microsoft.com/office/powerpoint/2010/main" val="582188984"/>
       </p:ext>
     </p:extLst>
   </p:cSld>
@@ -3509,7 +5082,11 @@
             <p:ph idx="1"/>
           </p:nvPr>
         </p:nvSpPr>
-        <p:spPr/>
+        <p:spPr>
+          <a:solidFill>
+            <a:schemeClr val="tx1"/>
+          </a:solidFill>
+        </p:spPr>
         <p:txBody>
           <a:bodyPr/>
           <a:lstStyle/>
@@ -3519,9 +5096,9 @@
             </a:pPr>
             <a:r>
               <a:rPr lang="en-US" dirty="0">
-                <a:highlight>
-                  <a:srgbClr val="FFFF00"/>
-                </a:highlight>
+                <a:solidFill>
+                  <a:schemeClr val="bg1"/>
+                </a:solidFill>
                 <a:latin typeface="Consolas" panose="020B0609020204030204" pitchFamily="49" charset="0"/>
               </a:rPr>
               <a:t>;; PRE R_ in [0, 4.0), y in [0, 1]</a:t>
@@ -3533,6 +5110,9 @@
             </a:pPr>
             <a:r>
               <a:rPr lang="en-US" dirty="0">
+                <a:solidFill>
+                  <a:schemeClr val="bg1"/>
+                </a:solidFill>
                 <a:latin typeface="Consolas" panose="020B0609020204030204" pitchFamily="49" charset="0"/>
               </a:rPr>
               <a:t>;; POST Result of logistic map</a:t>
@@ -3544,18 +5124,27 @@
             </a:pPr>
             <a:r>
               <a:rPr lang="en-US" dirty="0">
+                <a:solidFill>
+                  <a:schemeClr val="bg1"/>
+                </a:solidFill>
                 <a:latin typeface="Consolas" panose="020B0609020204030204" pitchFamily="49" charset="0"/>
               </a:rPr>
               <a:t>to-report </a:t>
             </a:r>
             <a:r>
               <a:rPr lang="en-US" dirty="0" err="1">
+                <a:solidFill>
+                  <a:schemeClr val="bg1"/>
+                </a:solidFill>
                 <a:latin typeface="Consolas" panose="020B0609020204030204" pitchFamily="49" charset="0"/>
               </a:rPr>
               <a:t>logisticMap</a:t>
             </a:r>
             <a:r>
               <a:rPr lang="en-US" dirty="0">
+                <a:solidFill>
+                  <a:schemeClr val="bg1"/>
+                </a:solidFill>
                 <a:latin typeface="Consolas" panose="020B0609020204030204" pitchFamily="49" charset="0"/>
               </a:rPr>
               <a:t> [R_ y]</a:t>
@@ -3567,6 +5156,9 @@
             </a:pPr>
             <a:r>
               <a:rPr lang="en-US" dirty="0">
+                <a:solidFill>
+                  <a:schemeClr val="bg1"/>
+                </a:solidFill>
                 <a:latin typeface="Consolas" panose="020B0609020204030204" pitchFamily="49" charset="0"/>
               </a:rPr>
               <a:t> report R_ * y * (1 - y)</a:t>
@@ -3578,6 +5170,9 @@
             </a:pPr>
             <a:r>
               <a:rPr lang="en-US" dirty="0">
+                <a:solidFill>
+                  <a:schemeClr val="bg1"/>
+                </a:solidFill>
                 <a:latin typeface="Consolas" panose="020B0609020204030204" pitchFamily="49" charset="0"/>
               </a:rPr>
               <a:t>end</a:t>
@@ -3588,51 +5183,11 @@
               <a:buNone/>
             </a:pPr>
             <a:endParaRPr lang="en-US" dirty="0">
+              <a:solidFill>
+                <a:schemeClr val="bg1"/>
+              </a:solidFill>
               <a:latin typeface="Consolas" panose="020B0609020204030204" pitchFamily="49" charset="0"/>
             </a:endParaRPr>
-          </a:p>
-          <a:p>
-            <a:pPr marL="0" indent="0">
-              <a:buNone/>
-            </a:pPr>
-            <a:r>
-              <a:rPr lang="en-US" b="1" dirty="0"/>
-              <a:t>Note: Value </a:t>
-            </a:r>
-            <a:r>
-              <a:rPr lang="en-US" dirty="0">
-                <a:latin typeface="Consolas" panose="020B0609020204030204" pitchFamily="49" charset="0"/>
-              </a:rPr>
-              <a:t>4.0</a:t>
-            </a:r>
-            <a:r>
-              <a:rPr lang="en-US" b="1" dirty="0"/>
-              <a:t> is excluded by the precondition! (However, this is not a mathematically illegal value.)</a:t>
-            </a:r>
-          </a:p>
-          <a:p>
-            <a:r>
-              <a:rPr lang="en-US" dirty="0"/>
-              <a:t>Clamp R to [0,4.0) in method calls (leads to inconsistency!)</a:t>
-            </a:r>
-          </a:p>
-          <a:p>
-            <a:r>
-              <a:rPr lang="en-US" dirty="0"/>
-              <a:t>Fail explicitly if R &gt;= 4 (is frustrating!)</a:t>
-            </a:r>
-          </a:p>
-          <a:p>
-            <a:r>
-              <a:rPr lang="en-US" dirty="0"/>
-              <a:t>Limit the GUI slider to the last value before 4.0 according to the increment (boring!)</a:t>
-            </a:r>
-          </a:p>
-          <a:p>
-            <a:r>
-              <a:rPr lang="en-US" dirty="0"/>
-              <a:t>Ignore precondition (what we did!)</a:t>
-            </a:r>
           </a:p>
         </p:txBody>
       </p:sp>
@@ -3741,7 +5296,7 @@
     </p:spTree>
     <p:extLst>
       <p:ext uri="{BB962C8B-B14F-4D97-AF65-F5344CB8AC3E}">
-        <p14:creationId xmlns:p14="http://schemas.microsoft.com/office/powerpoint/2010/main" val="3685266292"/>
+        <p14:creationId xmlns:p14="http://schemas.microsoft.com/office/powerpoint/2010/main" val="1382463161"/>
       </p:ext>
     </p:extLst>
   </p:cSld>
@@ -3770,29 +5325,152 @@
       </p:grpSpPr>
       <p:sp>
         <p:nvSpPr>
-          <p:cNvPr id="7" name="Titel 6"/>
+          <p:cNvPr id="7" name="Inhaltsplatzhalter 6"/>
           <p:cNvSpPr>
             <a:spLocks noGrp="1"/>
           </p:cNvSpPr>
           <p:nvPr>
-            <p:ph type="title"/>
-          </p:nvPr>
-        </p:nvSpPr>
-        <p:spPr/>
+            <p:ph idx="1"/>
+          </p:nvPr>
+        </p:nvSpPr>
+        <p:spPr>
+          <a:xfrm>
+            <a:off x="467545" y="1268760"/>
+            <a:ext cx="8208912" cy="2160240"/>
+          </a:xfrm>
+          <a:solidFill>
+            <a:schemeClr val="tx1"/>
+          </a:solidFill>
+        </p:spPr>
         <p:txBody>
           <a:bodyPr/>
           <a:lstStyle/>
           <a:p>
+            <a:pPr marL="0" indent="0">
+              <a:buNone/>
+            </a:pPr>
+            <a:r>
+              <a:rPr lang="en-US" dirty="0">
+                <a:highlight>
+                  <a:srgbClr val="FFFF00"/>
+                </a:highlight>
+                <a:latin typeface="Consolas" panose="020B0609020204030204" pitchFamily="49" charset="0"/>
+              </a:rPr>
+              <a:t>;; PRE R_ in [0, 4.0), y in [0, 1]</a:t>
+            </a:r>
+          </a:p>
+          <a:p>
+            <a:pPr marL="0" indent="0">
+              <a:buNone/>
+            </a:pPr>
+            <a:r>
+              <a:rPr lang="en-US" dirty="0">
+                <a:solidFill>
+                  <a:schemeClr val="bg1"/>
+                </a:solidFill>
+                <a:latin typeface="Consolas" panose="020B0609020204030204" pitchFamily="49" charset="0"/>
+              </a:rPr>
+              <a:t>;; POST Result of logistic map</a:t>
+            </a:r>
+          </a:p>
+          <a:p>
+            <a:pPr marL="0" indent="0">
+              <a:buNone/>
+            </a:pPr>
+            <a:r>
+              <a:rPr lang="en-US" dirty="0">
+                <a:solidFill>
+                  <a:schemeClr val="bg1"/>
+                </a:solidFill>
+                <a:latin typeface="Consolas" panose="020B0609020204030204" pitchFamily="49" charset="0"/>
+              </a:rPr>
+              <a:t>to-report </a:t>
+            </a:r>
+            <a:r>
+              <a:rPr lang="en-US" dirty="0" err="1">
+                <a:solidFill>
+                  <a:schemeClr val="bg1"/>
+                </a:solidFill>
+                <a:latin typeface="Consolas" panose="020B0609020204030204" pitchFamily="49" charset="0"/>
+              </a:rPr>
+              <a:t>logisticMap</a:t>
+            </a:r>
+            <a:r>
+              <a:rPr lang="en-US" dirty="0">
+                <a:solidFill>
+                  <a:schemeClr val="bg1"/>
+                </a:solidFill>
+                <a:latin typeface="Consolas" panose="020B0609020204030204" pitchFamily="49" charset="0"/>
+              </a:rPr>
+              <a:t> [R_ y]</a:t>
+            </a:r>
+          </a:p>
+          <a:p>
+            <a:pPr marL="0" indent="0">
+              <a:buNone/>
+            </a:pPr>
+            <a:r>
+              <a:rPr lang="en-US" dirty="0">
+                <a:solidFill>
+                  <a:schemeClr val="bg1"/>
+                </a:solidFill>
+                <a:latin typeface="Consolas" panose="020B0609020204030204" pitchFamily="49" charset="0"/>
+              </a:rPr>
+              <a:t> report R_ * y * (1 - y)</a:t>
+            </a:r>
+          </a:p>
+          <a:p>
+            <a:pPr marL="0" indent="0">
+              <a:buNone/>
+            </a:pPr>
+            <a:r>
+              <a:rPr lang="en-US" dirty="0">
+                <a:solidFill>
+                  <a:schemeClr val="bg1"/>
+                </a:solidFill>
+                <a:latin typeface="Consolas" panose="020B0609020204030204" pitchFamily="49" charset="0"/>
+              </a:rPr>
+              <a:t>end</a:t>
+            </a:r>
+          </a:p>
+          <a:p>
+            <a:pPr marL="0" indent="0">
+              <a:buNone/>
+            </a:pPr>
+            <a:endParaRPr lang="en-US" dirty="0">
+              <a:solidFill>
+                <a:schemeClr val="bg1"/>
+              </a:solidFill>
+              <a:latin typeface="Consolas" panose="020B0609020204030204" pitchFamily="49" charset="0"/>
+            </a:endParaRPr>
+          </a:p>
+        </p:txBody>
+      </p:sp>
+      <p:sp>
+        <p:nvSpPr>
+          <p:cNvPr id="6" name="Titel 5"/>
+          <p:cNvSpPr>
+            <a:spLocks noGrp="1"/>
+          </p:cNvSpPr>
+          <p:nvPr>
+            <p:ph type="title"/>
+          </p:nvPr>
+        </p:nvSpPr>
+        <p:spPr/>
+        <p:txBody>
+          <a:bodyPr/>
+          <a:lstStyle/>
+          <a:p>
             <a:r>
               <a:rPr lang="en-US" dirty="0"/>
-              <a:t>Demonstration</a:t>
-            </a:r>
-          </a:p>
-        </p:txBody>
-      </p:sp>
-      <p:sp>
-        <p:nvSpPr>
-          <p:cNvPr id="4" name="Datumsplatzhalter 3"/>
+              <a:t>Logistic Map Function</a:t>
+            </a:r>
+          </a:p>
+        </p:txBody>
+      </p:sp>
+      <p:sp>
+        <p:nvSpPr>
+          <p:cNvPr id="3" name="Datumsplatzhalter 2"/>
           <p:cNvSpPr>
             <a:spLocks noGrp="1"/>
           </p:cNvSpPr>
@@ -3821,7 +5499,7 @@
       </p:sp>
       <p:sp>
         <p:nvSpPr>
-          <p:cNvPr id="5" name="Fußzeilenplatzhalter 4"/>
+          <p:cNvPr id="4" name="Fußzeilenplatzhalter 3"/>
           <p:cNvSpPr>
             <a:spLocks noGrp="1"/>
           </p:cNvSpPr>
@@ -3843,7 +5521,7 @@
       </p:sp>
       <p:sp>
         <p:nvSpPr>
-          <p:cNvPr id="6" name="Foliennummernplatzhalter 5"/>
+          <p:cNvPr id="5" name="Foliennummernplatzhalter 4"/>
           <p:cNvSpPr>
             <a:spLocks noGrp="1"/>
           </p:cNvSpPr>
@@ -3865,6 +5543,406 @@
                 <a:defRPr/>
               </a:pPr>
               <a:t>6</a:t>
+            </a:fld>
+            <a:endParaRPr lang="en-GB" dirty="0"/>
+          </a:p>
+        </p:txBody>
+      </p:sp>
+      <mc:AlternateContent xmlns:mc="http://schemas.openxmlformats.org/markup-compatibility/2006">
+        <mc:Choice xmlns:a14="http://schemas.microsoft.com/office/drawing/2010/main" Requires="a14">
+          <p:sp>
+            <p:nvSpPr>
+              <p:cNvPr id="8" name="Inhaltsplatzhalter 6"/>
+              <p:cNvSpPr txBox="1">
+                <a:spLocks/>
+              </p:cNvSpPr>
+              <p:nvPr/>
+            </p:nvSpPr>
+            <p:spPr>
+              <a:xfrm>
+                <a:off x="467545" y="3501008"/>
+                <a:ext cx="8208912" cy="2463430"/>
+              </a:xfrm>
+              <a:prstGeom prst="rect">
+                <a:avLst/>
+              </a:prstGeom>
+            </p:spPr>
+            <p:txBody>
+              <a:bodyPr/>
+              <a:lstStyle>
+                <a:lvl1pPr marL="342900" indent="-342900" algn="l" rtl="0" eaLnBrk="1" fontAlgn="base" hangingPunct="1">
+                  <a:spcBef>
+                    <a:spcPct val="20000"/>
+                  </a:spcBef>
+                  <a:spcAft>
+                    <a:spcPct val="0"/>
+                  </a:spcAft>
+                  <a:buChar char="•"/>
+                  <a:defRPr sz="2000" baseline="0">
+                    <a:solidFill>
+                      <a:schemeClr val="tx1"/>
+                    </a:solidFill>
+                    <a:latin typeface="+mn-lt"/>
+                    <a:ea typeface="+mn-ea"/>
+                    <a:cs typeface="+mn-cs"/>
+                  </a:defRPr>
+                </a:lvl1pPr>
+                <a:lvl2pPr marL="742950" indent="-285750" algn="l" rtl="0" eaLnBrk="1" fontAlgn="base" hangingPunct="1">
+                  <a:spcBef>
+                    <a:spcPct val="20000"/>
+                  </a:spcBef>
+                  <a:spcAft>
+                    <a:spcPct val="0"/>
+                  </a:spcAft>
+                  <a:buChar char="–"/>
+                  <a:defRPr sz="2000" baseline="0">
+                    <a:solidFill>
+                      <a:schemeClr val="tx1"/>
+                    </a:solidFill>
+                    <a:latin typeface="+mn-lt"/>
+                    <a:ea typeface="+mn-ea"/>
+                  </a:defRPr>
+                </a:lvl2pPr>
+                <a:lvl3pPr marL="1143000" indent="-228600" algn="l" rtl="0" eaLnBrk="1" fontAlgn="base" hangingPunct="1">
+                  <a:spcBef>
+                    <a:spcPct val="20000"/>
+                  </a:spcBef>
+                  <a:spcAft>
+                    <a:spcPct val="0"/>
+                  </a:spcAft>
+                  <a:buChar char="•"/>
+                  <a:defRPr sz="2000" baseline="0">
+                    <a:solidFill>
+                      <a:schemeClr val="tx1"/>
+                    </a:solidFill>
+                    <a:latin typeface="+mn-lt"/>
+                    <a:ea typeface="+mn-ea"/>
+                  </a:defRPr>
+                </a:lvl3pPr>
+                <a:lvl4pPr marL="1371600" indent="0" algn="l" rtl="0" eaLnBrk="1" fontAlgn="base" hangingPunct="1">
+                  <a:spcBef>
+                    <a:spcPct val="20000"/>
+                  </a:spcBef>
+                  <a:spcAft>
+                    <a:spcPct val="0"/>
+                  </a:spcAft>
+                  <a:buNone/>
+                  <a:defRPr sz="2000" baseline="0">
+                    <a:solidFill>
+                      <a:schemeClr val="tx1"/>
+                    </a:solidFill>
+                    <a:latin typeface="+mn-lt"/>
+                    <a:ea typeface="+mn-ea"/>
+                  </a:defRPr>
+                </a:lvl4pPr>
+                <a:lvl5pPr marL="2057400" indent="-228600" algn="l" rtl="0" eaLnBrk="1" fontAlgn="base" hangingPunct="1">
+                  <a:spcBef>
+                    <a:spcPct val="20000"/>
+                  </a:spcBef>
+                  <a:spcAft>
+                    <a:spcPct val="0"/>
+                  </a:spcAft>
+                  <a:buChar char="»"/>
+                  <a:defRPr sz="2000">
+                    <a:solidFill>
+                      <a:schemeClr val="tx1"/>
+                    </a:solidFill>
+                    <a:latin typeface="+mn-lt"/>
+                    <a:ea typeface="+mn-ea"/>
+                  </a:defRPr>
+                </a:lvl5pPr>
+                <a:lvl6pPr marL="2514600" indent="-228600" algn="l" rtl="0" eaLnBrk="1" fontAlgn="base" hangingPunct="1">
+                  <a:spcBef>
+                    <a:spcPct val="20000"/>
+                  </a:spcBef>
+                  <a:spcAft>
+                    <a:spcPct val="0"/>
+                  </a:spcAft>
+                  <a:buChar char="»"/>
+                  <a:defRPr sz="2000">
+                    <a:solidFill>
+                      <a:schemeClr val="tx1"/>
+                    </a:solidFill>
+                    <a:latin typeface="+mn-lt"/>
+                    <a:ea typeface="+mn-ea"/>
+                  </a:defRPr>
+                </a:lvl6pPr>
+                <a:lvl7pPr marL="2971800" indent="-228600" algn="l" rtl="0" eaLnBrk="1" fontAlgn="base" hangingPunct="1">
+                  <a:spcBef>
+                    <a:spcPct val="20000"/>
+                  </a:spcBef>
+                  <a:spcAft>
+                    <a:spcPct val="0"/>
+                  </a:spcAft>
+                  <a:buChar char="»"/>
+                  <a:defRPr sz="2000">
+                    <a:solidFill>
+                      <a:schemeClr val="tx1"/>
+                    </a:solidFill>
+                    <a:latin typeface="+mn-lt"/>
+                    <a:ea typeface="+mn-ea"/>
+                  </a:defRPr>
+                </a:lvl7pPr>
+                <a:lvl8pPr marL="3429000" indent="-228600" algn="l" rtl="0" eaLnBrk="1" fontAlgn="base" hangingPunct="1">
+                  <a:spcBef>
+                    <a:spcPct val="20000"/>
+                  </a:spcBef>
+                  <a:spcAft>
+                    <a:spcPct val="0"/>
+                  </a:spcAft>
+                  <a:buChar char="»"/>
+                  <a:defRPr sz="2000">
+                    <a:solidFill>
+                      <a:schemeClr val="tx1"/>
+                    </a:solidFill>
+                    <a:latin typeface="+mn-lt"/>
+                    <a:ea typeface="+mn-ea"/>
+                  </a:defRPr>
+                </a:lvl8pPr>
+                <a:lvl9pPr marL="3886200" indent="-228600" algn="l" rtl="0" eaLnBrk="1" fontAlgn="base" hangingPunct="1">
+                  <a:spcBef>
+                    <a:spcPct val="20000"/>
+                  </a:spcBef>
+                  <a:spcAft>
+                    <a:spcPct val="0"/>
+                  </a:spcAft>
+                  <a:buChar char="»"/>
+                  <a:defRPr sz="2000">
+                    <a:solidFill>
+                      <a:schemeClr val="tx1"/>
+                    </a:solidFill>
+                    <a:latin typeface="+mn-lt"/>
+                    <a:ea typeface="+mn-ea"/>
+                  </a:defRPr>
+                </a:lvl9pPr>
+              </a:lstStyle>
+              <a:p>
+                <a:pPr marL="0" indent="0">
+                  <a:buFontTx/>
+                  <a:buNone/>
+                </a:pPr>
+                <a:r>
+                  <a:rPr lang="en-US" b="1" kern="0" dirty="0"/>
+                  <a:t>Note: Value </a:t>
+                </a:r>
+                <a:r>
+                  <a:rPr lang="en-US" kern="0" dirty="0">
+                    <a:latin typeface="Consolas" panose="020B0609020204030204" pitchFamily="49" charset="0"/>
+                  </a:rPr>
+                  <a:t>4.0</a:t>
+                </a:r>
+                <a:r>
+                  <a:rPr lang="en-US" b="1" kern="0" dirty="0"/>
+                  <a:t> is excluded by the precondition! (However, this is not a mathematically illegal value.)</a:t>
+                </a:r>
+              </a:p>
+              <a:p>
+                <a:r>
+                  <a:rPr lang="en-US" kern="0" dirty="0"/>
+                  <a:t>Clamp R to [0,4.0) in method calls (leads to inconsistency!)</a:t>
+                </a:r>
+              </a:p>
+              <a:p>
+                <a:r>
+                  <a:rPr lang="en-US" kern="0" dirty="0"/>
+                  <a:t>Fail explicitly if R = 4 (is frustrating!)</a:t>
+                </a:r>
+              </a:p>
+              <a:p>
+                <a:r>
+                  <a:rPr lang="en-US" kern="0" dirty="0"/>
+                  <a:t>Limit the GUI slider to the last value before 4.0 according to the increment (boring!)</a:t>
+                </a:r>
+              </a:p>
+              <a:p>
+                <a:r>
+                  <a:rPr lang="en-US" kern="0" dirty="0"/>
+                  <a:t>“Adjust” precondition to </a:t>
+                </a:r>
+                <a14:m>
+                  <m:oMath xmlns:m="http://schemas.openxmlformats.org/officeDocument/2006/math">
+                    <m:r>
+                      <a:rPr lang="en-US" i="1" kern="0" dirty="0" smtClean="0">
+                        <a:latin typeface="Cambria Math" panose="02040503050406030204" pitchFamily="18" charset="0"/>
+                      </a:rPr>
+                      <m:t>[0,4]</m:t>
+                    </m:r>
+                  </m:oMath>
+                </a14:m>
+                <a:r>
+                  <a:rPr lang="en-US" kern="0" dirty="0"/>
+                  <a:t> (what we did!)</a:t>
+                </a:r>
+              </a:p>
+            </p:txBody>
+          </p:sp>
+        </mc:Choice>
+        <mc:Fallback>
+          <p:sp>
+            <p:nvSpPr>
+              <p:cNvPr id="8" name="Inhaltsplatzhalter 6"/>
+              <p:cNvSpPr txBox="1">
+                <a:spLocks noRot="1" noChangeAspect="1" noMove="1" noResize="1" noEditPoints="1" noAdjustHandles="1" noChangeArrowheads="1" noChangeShapeType="1" noTextEdit="1"/>
+              </p:cNvSpPr>
+              <p:nvPr/>
+            </p:nvSpPr>
+            <p:spPr>
+              <a:xfrm>
+                <a:off x="467545" y="3501008"/>
+                <a:ext cx="8208912" cy="2463430"/>
+              </a:xfrm>
+              <a:prstGeom prst="rect">
+                <a:avLst/>
+              </a:prstGeom>
+              <a:blipFill>
+                <a:blip r:embed="rId2"/>
+                <a:stretch>
+                  <a:fillRect l="-817" t="-1238" r="-520" b="-4950"/>
+                </a:stretch>
+              </a:blipFill>
+            </p:spPr>
+            <p:txBody>
+              <a:bodyPr/>
+              <a:lstStyle/>
+              <a:p>
+                <a:r>
+                  <a:rPr lang="en-US">
+                    <a:noFill/>
+                  </a:rPr>
+                  <a:t> </a:t>
+                </a:r>
+              </a:p>
+            </p:txBody>
+          </p:sp>
+        </mc:Fallback>
+      </mc:AlternateContent>
+    </p:spTree>
+    <p:extLst>
+      <p:ext uri="{BB962C8B-B14F-4D97-AF65-F5344CB8AC3E}">
+        <p14:creationId xmlns:p14="http://schemas.microsoft.com/office/powerpoint/2010/main" val="3685266292"/>
+      </p:ext>
+    </p:extLst>
+  </p:cSld>
+  <p:clrMapOvr>
+    <a:masterClrMapping/>
+  </p:clrMapOvr>
+</p:sld>
+</file>
+
+<file path=ppt/slides/slide7.xml><?xml version="1.0" encoding="utf-8"?>
+<p:sld xmlns:a="http://schemas.openxmlformats.org/drawingml/2006/main" xmlns:r="http://schemas.openxmlformats.org/officeDocument/2006/relationships" xmlns:p="http://schemas.openxmlformats.org/presentationml/2006/main">
+  <p:cSld>
+    <p:spTree>
+      <p:nvGrpSpPr>
+        <p:cNvPr id="1" name=""/>
+        <p:cNvGrpSpPr/>
+        <p:nvPr/>
+      </p:nvGrpSpPr>
+      <p:grpSpPr>
+        <a:xfrm>
+          <a:off x="0" y="0"/>
+          <a:ext cx="0" cy="0"/>
+          <a:chOff x="0" y="0"/>
+          <a:chExt cx="0" cy="0"/>
+        </a:xfrm>
+      </p:grpSpPr>
+      <p:sp>
+        <p:nvSpPr>
+          <p:cNvPr id="7" name="Titel 6"/>
+          <p:cNvSpPr>
+            <a:spLocks noGrp="1"/>
+          </p:cNvSpPr>
+          <p:nvPr>
+            <p:ph type="title"/>
+          </p:nvPr>
+        </p:nvSpPr>
+        <p:spPr/>
+        <p:txBody>
+          <a:bodyPr/>
+          <a:lstStyle/>
+          <a:p>
+            <a:r>
+              <a:rPr lang="en-US" dirty="0"/>
+              <a:t>Demonstration</a:t>
+            </a:r>
+          </a:p>
+        </p:txBody>
+      </p:sp>
+      <p:sp>
+        <p:nvSpPr>
+          <p:cNvPr id="4" name="Datumsplatzhalter 3"/>
+          <p:cNvSpPr>
+            <a:spLocks noGrp="1"/>
+          </p:cNvSpPr>
+          <p:nvPr>
+            <p:ph type="dt" sz="half" idx="10"/>
+          </p:nvPr>
+        </p:nvSpPr>
+        <p:spPr/>
+        <p:txBody>
+          <a:bodyPr/>
+          <a:lstStyle/>
+          <a:p>
+            <a:pPr>
+              <a:defRPr/>
+            </a:pPr>
+            <a:fld id="{972A6A5B-77CB-4D42-9DB4-CC6D207310B8}" type="datetime1">
+              <a:rPr lang="de-DE" smtClean="0"/>
+              <a:pPr>
+                <a:defRPr/>
+              </a:pPr>
+              <a:t>03.11.2016</a:t>
+            </a:fld>
+            <a:endParaRPr lang="en-GB" dirty="0"/>
+          </a:p>
+        </p:txBody>
+      </p:sp>
+      <p:sp>
+        <p:nvSpPr>
+          <p:cNvPr id="5" name="Fußzeilenplatzhalter 4"/>
+          <p:cNvSpPr>
+            <a:spLocks noGrp="1"/>
+          </p:cNvSpPr>
+          <p:nvPr>
+            <p:ph type="ftr" sz="quarter" idx="11"/>
+          </p:nvPr>
+        </p:nvSpPr>
+        <p:spPr/>
+        <p:txBody>
+          <a:bodyPr/>
+          <a:lstStyle/>
+          <a:p>
+            <a:pPr>
+              <a:defRPr/>
+            </a:pPr>
+            <a:endParaRPr lang="en-GB" dirty="0"/>
+          </a:p>
+        </p:txBody>
+      </p:sp>
+      <p:sp>
+        <p:nvSpPr>
+          <p:cNvPr id="6" name="Foliennummernplatzhalter 5"/>
+          <p:cNvSpPr>
+            <a:spLocks noGrp="1"/>
+          </p:cNvSpPr>
+          <p:nvPr>
+            <p:ph type="sldNum" sz="quarter" idx="12"/>
+          </p:nvPr>
+        </p:nvSpPr>
+        <p:spPr/>
+        <p:txBody>
+          <a:bodyPr/>
+          <a:lstStyle/>
+          <a:p>
+            <a:pPr>
+              <a:defRPr/>
+            </a:pPr>
+            <a:fld id="{E85D1952-A6FC-4ACE-AEE4-EFAF5C32DAC6}" type="slidenum">
+              <a:rPr lang="en-GB" smtClean="0"/>
+              <a:pPr>
+                <a:defRPr/>
+              </a:pPr>
+              <a:t>7</a:t>
             </a:fld>
             <a:endParaRPr lang="en-GB" dirty="0"/>
           </a:p>
@@ -3883,7 +5961,154 @@
 </p:sld>
 </file>
 
-<file path=ppt/slides/slide7.xml><?xml version="1.0" encoding="utf-8"?>
+<file path=ppt/slides/slide8.xml><?xml version="1.0" encoding="utf-8"?>
+<p:sld xmlns:a="http://schemas.openxmlformats.org/drawingml/2006/main" xmlns:r="http://schemas.openxmlformats.org/officeDocument/2006/relationships" xmlns:p="http://schemas.openxmlformats.org/presentationml/2006/main">
+  <p:cSld>
+    <p:spTree>
+      <p:nvGrpSpPr>
+        <p:cNvPr id="1" name=""/>
+        <p:cNvGrpSpPr/>
+        <p:nvPr/>
+      </p:nvGrpSpPr>
+      <p:grpSpPr>
+        <a:xfrm>
+          <a:off x="0" y="0"/>
+          <a:ext cx="0" cy="0"/>
+          <a:chOff x="0" y="0"/>
+          <a:chExt cx="0" cy="0"/>
+        </a:xfrm>
+      </p:grpSpPr>
+      <p:sp>
+        <p:nvSpPr>
+          <p:cNvPr id="2" name="Titel 1"/>
+          <p:cNvSpPr>
+            <a:spLocks noGrp="1"/>
+          </p:cNvSpPr>
+          <p:nvPr>
+            <p:ph type="title"/>
+          </p:nvPr>
+        </p:nvSpPr>
+        <p:spPr/>
+        <p:txBody>
+          <a:bodyPr/>
+          <a:lstStyle/>
+          <a:p>
+            <a:r>
+              <a:rPr lang="en-US" dirty="0"/>
+              <a:t>Behavior of </a:t>
+            </a:r>
+            <a:r>
+              <a:rPr lang="en-US" dirty="0" err="1"/>
+              <a:t>logisticMap</a:t>
+            </a:r>
+            <a:r>
+              <a:rPr lang="en-US" dirty="0"/>
+              <a:t> </a:t>
+            </a:r>
+            <a:br>
+              <a:rPr lang="en-US" dirty="0"/>
+            </a:br>
+            <a:r>
+              <a:rPr lang="en-US" dirty="0"/>
+              <a:t>for different Values of R</a:t>
+            </a:r>
+          </a:p>
+        </p:txBody>
+      </p:sp>
+      <p:sp>
+        <p:nvSpPr>
+          <p:cNvPr id="3" name="Datumsplatzhalter 2"/>
+          <p:cNvSpPr>
+            <a:spLocks noGrp="1"/>
+          </p:cNvSpPr>
+          <p:nvPr>
+            <p:ph type="dt" sz="half" idx="10"/>
+          </p:nvPr>
+        </p:nvSpPr>
+        <p:spPr/>
+        <p:txBody>
+          <a:bodyPr/>
+          <a:lstStyle/>
+          <a:p>
+            <a:pPr>
+              <a:defRPr/>
+            </a:pPr>
+            <a:fld id="{972A6A5B-77CB-4D42-9DB4-CC6D207310B8}" type="datetime1">
+              <a:rPr lang="de-DE" smtClean="0"/>
+              <a:pPr>
+                <a:defRPr/>
+              </a:pPr>
+              <a:t>03.11.2016</a:t>
+            </a:fld>
+            <a:endParaRPr lang="en-GB" dirty="0"/>
+          </a:p>
+        </p:txBody>
+      </p:sp>
+      <p:sp>
+        <p:nvSpPr>
+          <p:cNvPr id="4" name="Fußzeilenplatzhalter 3"/>
+          <p:cNvSpPr>
+            <a:spLocks noGrp="1"/>
+          </p:cNvSpPr>
+          <p:nvPr>
+            <p:ph type="ftr" sz="quarter" idx="11"/>
+          </p:nvPr>
+        </p:nvSpPr>
+        <p:spPr/>
+        <p:txBody>
+          <a:bodyPr/>
+          <a:lstStyle/>
+          <a:p>
+            <a:pPr>
+              <a:defRPr/>
+            </a:pPr>
+            <a:endParaRPr lang="en-GB" dirty="0"/>
+          </a:p>
+        </p:txBody>
+      </p:sp>
+      <p:sp>
+        <p:nvSpPr>
+          <p:cNvPr id="5" name="Foliennummernplatzhalter 4"/>
+          <p:cNvSpPr>
+            <a:spLocks noGrp="1"/>
+          </p:cNvSpPr>
+          <p:nvPr>
+            <p:ph type="sldNum" sz="quarter" idx="12"/>
+          </p:nvPr>
+        </p:nvSpPr>
+        <p:spPr/>
+        <p:txBody>
+          <a:bodyPr/>
+          <a:lstStyle/>
+          <a:p>
+            <a:pPr>
+              <a:defRPr/>
+            </a:pPr>
+            <a:fld id="{E85D1952-A6FC-4ACE-AEE4-EFAF5C32DAC6}" type="slidenum">
+              <a:rPr lang="en-GB" smtClean="0"/>
+              <a:pPr>
+                <a:defRPr/>
+              </a:pPr>
+              <a:t>8</a:t>
+            </a:fld>
+            <a:endParaRPr lang="en-GB" dirty="0"/>
+          </a:p>
+        </p:txBody>
+      </p:sp>
+    </p:spTree>
+    <p:extLst>
+      <p:ext uri="{BB962C8B-B14F-4D97-AF65-F5344CB8AC3E}">
+        <p14:creationId xmlns:p14="http://schemas.microsoft.com/office/powerpoint/2010/main" val="3771868445"/>
+      </p:ext>
+    </p:extLst>
+  </p:cSld>
+  <p:clrMapOvr>
+    <a:masterClrMapping/>
+  </p:clrMapOvr>
+</p:sld>
+</file>
+
+<file path=ppt/slides/slide9.xml><?xml version="1.0" encoding="utf-8"?>
 <p:sld xmlns:a="http://schemas.openxmlformats.org/drawingml/2006/main" xmlns:r="http://schemas.openxmlformats.org/officeDocument/2006/relationships" xmlns:p="http://schemas.openxmlformats.org/presentationml/2006/main">
   <p:cSld>
     <p:spTree>
@@ -3914,12 +6139,12 @@
             </p:nvSpPr>
             <p:spPr>
               <a:xfrm>
-                <a:off x="467544" y="3789040"/>
-                <a:ext cx="8208912" cy="2448272"/>
+                <a:off x="467544" y="4814512"/>
+                <a:ext cx="8208912" cy="1422799"/>
               </a:xfrm>
             </p:spPr>
             <p:txBody>
-              <a:bodyPr/>
+              <a:bodyPr numCol="2"/>
               <a:lstStyle/>
               <a:p>
                 <a:r>
@@ -3964,6 +6189,37 @@
                 <a:pPr lvl="1"/>
                 <a14:m>
                   <m:oMath xmlns:m="http://schemas.openxmlformats.org/officeDocument/2006/math">
+                    <m:sSub>
+                      <m:sSubPr>
+                        <m:ctrlPr>
+                          <a:rPr lang="en-US" b="0" i="1" dirty="0" smtClean="0">
+                            <a:latin typeface="Cambria Math" panose="02040503050406030204" pitchFamily="18" charset="0"/>
+                          </a:rPr>
+                        </m:ctrlPr>
+                      </m:sSubPr>
+                      <m:e>
+                        <m:r>
+                          <a:rPr lang="en-US" b="0" i="1" dirty="0" smtClean="0">
+                            <a:latin typeface="Cambria Math" panose="02040503050406030204" pitchFamily="18" charset="0"/>
+                          </a:rPr>
+                          <m:t>𝑓</m:t>
+                        </m:r>
+                      </m:e>
+                      <m:sub>
+                        <m:r>
+                          <a:rPr lang="en-US" b="0" i="1" dirty="0" smtClean="0">
+                            <a:latin typeface="Cambria Math" panose="02040503050406030204" pitchFamily="18" charset="0"/>
+                          </a:rPr>
+                          <m:t>𝑦</m:t>
+                        </m:r>
+                      </m:sub>
+                    </m:sSub>
+                    <m:r>
+                      <a:rPr lang="en-US" b="0" i="1" dirty="0" smtClean="0">
+                        <a:latin typeface="Cambria Math" panose="02040503050406030204" pitchFamily="18" charset="0"/>
+                      </a:rPr>
+                      <m:t>=</m:t>
+                    </m:r>
                     <m:r>
                       <a:rPr lang="de-DE" i="1" dirty="0" smtClean="0">
                         <a:latin typeface="Cambria Math" panose="02040503050406030204" pitchFamily="18" charset="0"/>
@@ -4004,6 +6260,14 @@
                   <a:rPr lang="de-DE" dirty="0"/>
                   <a:t> </a:t>
                 </a:r>
+              </a:p>
+              <a:p>
+                <a:pPr lvl="1"/>
+                <a:endParaRPr lang="de-DE" dirty="0"/>
+              </a:p>
+              <a:p>
+                <a:pPr lvl="1"/>
+                <a:endParaRPr lang="de-DE" dirty="0"/>
               </a:p>
               <a:p>
                 <a:r>
@@ -4136,37 +6400,6 @@
                 </a14:m>
                 <a:endParaRPr lang="de-DE" dirty="0"/>
               </a:p>
-              <a:p>
-                <a14:m>
-                  <m:oMath xmlns:m="http://schemas.openxmlformats.org/officeDocument/2006/math">
-                    <m:r>
-                      <a:rPr lang="de-DE" i="1" dirty="0" smtClean="0">
-                        <a:latin typeface="Cambria Math" panose="02040503050406030204" pitchFamily="18" charset="0"/>
-                      </a:rPr>
-                      <m:t>𝑅</m:t>
-                    </m:r>
-                    <m:r>
-                      <a:rPr lang="de-DE" i="1" dirty="0" smtClean="0">
-                        <a:latin typeface="Cambria Math" panose="02040503050406030204" pitchFamily="18" charset="0"/>
-                      </a:rPr>
-                      <m:t> = 3  </m:t>
-                    </m:r>
-                  </m:oMath>
-                </a14:m>
-                <a:r>
-                  <a:rPr lang="de-DE" dirty="0" err="1"/>
-                  <a:t>converges</a:t>
-                </a:r>
-                <a:r>
-                  <a:rPr lang="de-DE" dirty="0"/>
-                  <a:t> „</a:t>
-                </a:r>
-                <a:r>
-                  <a:rPr lang="en-US" dirty="0"/>
-                  <a:t>dramatically slow”</a:t>
-                </a:r>
-                <a:endParaRPr lang="de-DE" dirty="0"/>
-              </a:p>
             </p:txBody>
           </p:sp>
         </mc:Choice>
@@ -4183,13 +6416,13 @@
             </p:nvSpPr>
             <p:spPr>
               <a:xfrm>
-                <a:off x="467544" y="3789040"/>
-                <a:ext cx="8208912" cy="2448272"/>
+                <a:off x="467544" y="4814512"/>
+                <a:ext cx="8208912" cy="1422799"/>
               </a:xfrm>
               <a:blipFill>
                 <a:blip r:embed="rId2"/>
                 <a:stretch>
-                  <a:fillRect l="-743" t="-1247"/>
+                  <a:fillRect l="-669" t="-2146" b="-9013"/>
                 </a:stretch>
               </a:blipFill>
             </p:spPr>
@@ -4208,8 +6441,8 @@
           </p:sp>
         </mc:Fallback>
       </mc:AlternateContent>
-      <mc:AlternateContent xmlns:mc="http://schemas.openxmlformats.org/markup-compatibility/2006">
-        <mc:Choice xmlns:a14="http://schemas.microsoft.com/office/drawing/2010/main" Requires="a14">
+      <mc:AlternateContent xmlns:mc="http://schemas.openxmlformats.org/markup-compatibility/2006" xmlns:a14="http://schemas.microsoft.com/office/drawing/2010/main">
+        <mc:Choice Requires="a14">
           <p:sp>
             <p:nvSpPr>
               <p:cNvPr id="3" name="Titel 2"/>
@@ -4266,7 +6499,7 @@
             </p:txBody>
           </p:sp>
         </mc:Choice>
-        <mc:Fallback>
+        <mc:Fallback xmlns="">
           <p:sp>
             <p:nvSpPr>
               <p:cNvPr id="3" name="Titel 2"/>
@@ -4351,7 +6584,6 @@
               <a:rPr lang="en-GB" dirty="0"/>
               <a:t>https://en.wikipedia.org/wiki/Logistic_map</a:t>
             </a:r>
-            <a:endParaRPr lang="en-GB" dirty="0"/>
           </a:p>
         </p:txBody>
       </p:sp>
@@ -4378,7 +6610,7 @@
               <a:pPr>
                 <a:defRPr/>
               </a:pPr>
-              <a:t>7</a:t>
+              <a:t>9</a:t>
             </a:fld>
             <a:endParaRPr lang="en-GB" dirty="0"/>
           </a:p>
@@ -4386,28 +6618,22 @@
       </p:sp>
       <p:pic>
         <p:nvPicPr>
-          <p:cNvPr id="8" name="Grafik 7"/>
+          <p:cNvPr id="13" name="Grafik 12"/>
           <p:cNvPicPr>
             <a:picLocks noChangeAspect="1"/>
           </p:cNvPicPr>
           <p:nvPr/>
         </p:nvPicPr>
         <p:blipFill>
-          <a:blip r:embed="rId4">
-            <a:extLst>
-              <a:ext uri="{28A0092B-C50C-407E-A947-70E740481C1C}">
-                <a14:useLocalDpi xmlns:a14="http://schemas.microsoft.com/office/drawing/2010/main" val="0"/>
-              </a:ext>
-            </a:extLst>
-          </a:blip>
+          <a:blip r:embed="rId4"/>
           <a:stretch>
             <a:fillRect/>
           </a:stretch>
         </p:blipFill>
         <p:spPr>
           <a:xfrm>
-            <a:off x="2555776" y="1193577"/>
-            <a:ext cx="3744416" cy="2582027"/>
+            <a:off x="2339752" y="1124744"/>
+            <a:ext cx="4464496" cy="3473745"/>
           </a:xfrm>
           <a:prstGeom prst="rect">
             <a:avLst/>
@@ -4418,526 +6644,6 @@
     <p:extLst>
       <p:ext uri="{BB962C8B-B14F-4D97-AF65-F5344CB8AC3E}">
         <p14:creationId xmlns:p14="http://schemas.microsoft.com/office/powerpoint/2010/main" val="189323410"/>
-      </p:ext>
-    </p:extLst>
-  </p:cSld>
-  <p:clrMapOvr>
-    <a:masterClrMapping/>
-  </p:clrMapOvr>
-</p:sld>
-</file>
-
-<file path=ppt/slides/slide8.xml><?xml version="1.0" encoding="utf-8"?>
-<p:sld xmlns:a="http://schemas.openxmlformats.org/drawingml/2006/main" xmlns:r="http://schemas.openxmlformats.org/officeDocument/2006/relationships" xmlns:p="http://schemas.openxmlformats.org/presentationml/2006/main">
-  <p:cSld>
-    <p:spTree>
-      <p:nvGrpSpPr>
-        <p:cNvPr id="1" name=""/>
-        <p:cNvGrpSpPr/>
-        <p:nvPr/>
-      </p:nvGrpSpPr>
-      <p:grpSpPr>
-        <a:xfrm>
-          <a:off x="0" y="0"/>
-          <a:ext cx="0" cy="0"/>
-          <a:chOff x="0" y="0"/>
-          <a:chExt cx="0" cy="0"/>
-        </a:xfrm>
-      </p:grpSpPr>
-      <mc:AlternateContent xmlns:mc="http://schemas.openxmlformats.org/markup-compatibility/2006">
-        <mc:Choice xmlns:a14="http://schemas.microsoft.com/office/drawing/2010/main" Requires="a14">
-          <p:sp>
-            <p:nvSpPr>
-              <p:cNvPr id="2" name="Inhaltsplatzhalter 1"/>
-              <p:cNvSpPr>
-                <a:spLocks noGrp="1"/>
-              </p:cNvSpPr>
-              <p:nvPr>
-                <p:ph idx="1"/>
-              </p:nvPr>
-            </p:nvSpPr>
-            <p:spPr>
-              <a:xfrm>
-                <a:off x="467544" y="3933056"/>
-                <a:ext cx="8208912" cy="2016224"/>
-              </a:xfrm>
-            </p:spPr>
-            <p:txBody>
-              <a:bodyPr/>
-              <a:lstStyle/>
-              <a:p>
-                <a:r>
-                  <a:rPr lang="de-DE" dirty="0" err="1"/>
-                  <a:t>Bifurcation</a:t>
-                </a:r>
-                <a:r>
-                  <a:rPr lang="de-DE" dirty="0"/>
-                  <a:t> </a:t>
-                </a:r>
-                <a:r>
-                  <a:rPr lang="de-DE" dirty="0" err="1"/>
-                  <a:t>for</a:t>
-                </a:r>
-                <a:r>
-                  <a:rPr lang="de-DE" dirty="0"/>
-                  <a:t> </a:t>
-                </a:r>
-                <a14:m>
-                  <m:oMath xmlns:m="http://schemas.openxmlformats.org/officeDocument/2006/math">
-                    <m:r>
-                      <a:rPr lang="de-DE" i="1" dirty="0" smtClean="0">
-                        <a:latin typeface="Cambria Math" panose="02040503050406030204" pitchFamily="18" charset="0"/>
-                      </a:rPr>
-                      <m:t>3&lt;</m:t>
-                    </m:r>
-                    <m:r>
-                      <a:rPr lang="de-DE" i="1" dirty="0" smtClean="0">
-                        <a:latin typeface="Cambria Math" panose="02040503050406030204" pitchFamily="18" charset="0"/>
-                      </a:rPr>
-                      <m:t>𝑅</m:t>
-                    </m:r>
-                    <m:r>
-                      <a:rPr lang="de-DE" i="1" dirty="0" smtClean="0">
-                        <a:latin typeface="Cambria Math" panose="02040503050406030204" pitchFamily="18" charset="0"/>
-                      </a:rPr>
-                      <m:t>&lt;4</m:t>
-                    </m:r>
-                  </m:oMath>
-                </a14:m>
-                <a:endParaRPr lang="de-DE" dirty="0"/>
-              </a:p>
-              <a:p>
-                <a:pPr lvl="1"/>
-                <a14:m>
-                  <m:oMath xmlns:m="http://schemas.openxmlformats.org/officeDocument/2006/math">
-                    <m:r>
-                      <a:rPr lang="de-DE" i="1" dirty="0" smtClean="0">
-                        <a:latin typeface="Cambria Math" panose="02040503050406030204" pitchFamily="18" charset="0"/>
-                      </a:rPr>
-                      <m:t>2, 4, 8, 16</m:t>
-                    </m:r>
-                  </m:oMath>
-                </a14:m>
-                <a:r>
-                  <a:rPr lang="de-DE" dirty="0"/>
-                  <a:t>… </a:t>
-                </a:r>
-                <a:r>
-                  <a:rPr lang="de-DE" dirty="0" err="1"/>
-                  <a:t>oscillation</a:t>
-                </a:r>
-                <a:r>
-                  <a:rPr lang="de-DE" dirty="0"/>
-                  <a:t> </a:t>
-                </a:r>
-                <a:r>
-                  <a:rPr lang="de-DE" dirty="0" err="1"/>
-                  <a:t>points</a:t>
-                </a:r>
-                <a:endParaRPr lang="de-DE" dirty="0"/>
-              </a:p>
-              <a:p>
-                <a:pPr lvl="1"/>
-                <a:r>
-                  <a:rPr lang="de-DE" dirty="0" err="1"/>
-                  <a:t>Chaotic</a:t>
-                </a:r>
-                <a:r>
-                  <a:rPr lang="de-DE" dirty="0"/>
-                  <a:t> </a:t>
-                </a:r>
-                <a:r>
-                  <a:rPr lang="de-DE" dirty="0" err="1"/>
-                  <a:t>behavior</a:t>
-                </a:r>
-                <a:r>
-                  <a:rPr lang="de-DE" dirty="0"/>
-                  <a:t> </a:t>
-                </a:r>
-                <a:r>
-                  <a:rPr lang="de-DE" dirty="0" err="1"/>
-                  <a:t>starts</a:t>
-                </a:r>
-                <a:r>
-                  <a:rPr lang="de-DE" dirty="0"/>
-                  <a:t> </a:t>
-                </a:r>
-                <a:r>
-                  <a:rPr lang="de-DE" dirty="0" err="1"/>
-                  <a:t>to</a:t>
-                </a:r>
-                <a:r>
-                  <a:rPr lang="de-DE" dirty="0"/>
-                  <a:t> </a:t>
-                </a:r>
-                <a:r>
-                  <a:rPr lang="de-DE" dirty="0" err="1"/>
-                  <a:t>appear</a:t>
-                </a:r>
-                <a:endParaRPr lang="de-DE" dirty="0"/>
-              </a:p>
-              <a:p>
-                <a:r>
-                  <a:rPr lang="de-DE" dirty="0" err="1"/>
-                  <a:t>For</a:t>
-                </a:r>
-                <a:r>
-                  <a:rPr lang="de-DE" dirty="0"/>
-                  <a:t> </a:t>
-                </a:r>
-                <a14:m>
-                  <m:oMath xmlns:m="http://schemas.openxmlformats.org/officeDocument/2006/math">
-                    <m:r>
-                      <a:rPr lang="de-DE" i="1" dirty="0" smtClean="0">
-                        <a:latin typeface="Cambria Math" panose="02040503050406030204" pitchFamily="18" charset="0"/>
-                      </a:rPr>
-                      <m:t>𝑅</m:t>
-                    </m:r>
-                    <m:r>
-                      <a:rPr lang="de-DE" i="1" dirty="0" smtClean="0">
-                        <a:latin typeface="Cambria Math" panose="02040503050406030204" pitchFamily="18" charset="0"/>
-                      </a:rPr>
-                      <m:t>=4</m:t>
-                    </m:r>
-                  </m:oMath>
-                </a14:m>
-                <a:r>
-                  <a:rPr lang="de-DE" dirty="0"/>
-                  <a:t>, </a:t>
-                </a:r>
-                <a14:m>
-                  <m:oMath xmlns:m="http://schemas.openxmlformats.org/officeDocument/2006/math">
-                    <m:r>
-                      <a:rPr lang="de-DE" i="1" dirty="0" smtClean="0">
-                        <a:latin typeface="Cambria Math" panose="02040503050406030204" pitchFamily="18" charset="0"/>
-                      </a:rPr>
-                      <m:t>𝑦</m:t>
-                    </m:r>
-                  </m:oMath>
-                </a14:m>
-                <a:r>
-                  <a:rPr lang="de-DE" dirty="0"/>
-                  <a:t> </a:t>
-                </a:r>
-                <a:r>
-                  <a:rPr lang="de-DE" dirty="0" err="1"/>
-                  <a:t>exhibits</a:t>
-                </a:r>
-                <a:r>
-                  <a:rPr lang="de-DE" dirty="0"/>
-                  <a:t> c</a:t>
-                </a:r>
-                <a:r>
-                  <a:rPr lang="en-US" dirty="0" err="1"/>
-                  <a:t>haotic</a:t>
-                </a:r>
-                <a:r>
-                  <a:rPr lang="en-US" dirty="0"/>
-                  <a:t> behavior</a:t>
-                </a:r>
-              </a:p>
-              <a:p>
-                <a:r>
-                  <a:rPr lang="en-US" dirty="0"/>
-                  <a:t>For </a:t>
-                </a:r>
-                <a14:m>
-                  <m:oMath xmlns:m="http://schemas.openxmlformats.org/officeDocument/2006/math">
-                    <m:r>
-                      <a:rPr lang="en-US" i="1" dirty="0" smtClean="0">
-                        <a:latin typeface="Cambria Math" panose="02040503050406030204" pitchFamily="18" charset="0"/>
-                      </a:rPr>
-                      <m:t>𝑅</m:t>
-                    </m:r>
-                    <m:r>
-                      <a:rPr lang="en-US" i="1" dirty="0" smtClean="0">
-                        <a:latin typeface="Cambria Math" panose="02040503050406030204" pitchFamily="18" charset="0"/>
-                      </a:rPr>
-                      <m:t>&gt;4</m:t>
-                    </m:r>
-                  </m:oMath>
-                </a14:m>
-                <a:r>
-                  <a:rPr lang="en-US" dirty="0"/>
-                  <a:t>, </a:t>
-                </a:r>
-                <a14:m>
-                  <m:oMath xmlns:m="http://schemas.openxmlformats.org/officeDocument/2006/math">
-                    <m:r>
-                      <a:rPr lang="en-US" i="1" dirty="0" smtClean="0">
-                        <a:latin typeface="Cambria Math" panose="02040503050406030204" pitchFamily="18" charset="0"/>
-                      </a:rPr>
-                      <m:t>𝑦</m:t>
-                    </m:r>
-                  </m:oMath>
-                </a14:m>
-                <a:r>
-                  <a:rPr lang="en-US" dirty="0"/>
-                  <a:t> will exceed </a:t>
-                </a:r>
-                <a14:m>
-                  <m:oMath xmlns:m="http://schemas.openxmlformats.org/officeDocument/2006/math">
-                    <m:r>
-                      <a:rPr lang="en-US" i="1" dirty="0" smtClean="0">
-                        <a:latin typeface="Cambria Math" panose="02040503050406030204" pitchFamily="18" charset="0"/>
-                      </a:rPr>
-                      <m:t>[0,1] </m:t>
-                    </m:r>
-                  </m:oMath>
-                </a14:m>
-                <a:endParaRPr lang="de-DE" dirty="0"/>
-              </a:p>
-            </p:txBody>
-          </p:sp>
-        </mc:Choice>
-        <mc:Fallback>
-          <p:sp>
-            <p:nvSpPr>
-              <p:cNvPr id="2" name="Inhaltsplatzhalter 1"/>
-              <p:cNvSpPr>
-                <a:spLocks noGrp="1" noRot="1" noChangeAspect="1" noMove="1" noResize="1" noEditPoints="1" noAdjustHandles="1" noChangeArrowheads="1" noChangeShapeType="1" noTextEdit="1"/>
-              </p:cNvSpPr>
-              <p:nvPr>
-                <p:ph idx="1"/>
-              </p:nvPr>
-            </p:nvSpPr>
-            <p:spPr>
-              <a:xfrm>
-                <a:off x="467544" y="3933056"/>
-                <a:ext cx="8208912" cy="2016224"/>
-              </a:xfrm>
-              <a:blipFill>
-                <a:blip r:embed="rId2"/>
-                <a:stretch>
-                  <a:fillRect l="-669" t="-1208"/>
-                </a:stretch>
-              </a:blipFill>
-            </p:spPr>
-            <p:txBody>
-              <a:bodyPr/>
-              <a:lstStyle/>
-              <a:p>
-                <a:r>
-                  <a:rPr lang="en-US">
-                    <a:noFill/>
-                  </a:rPr>
-                  <a:t> </a:t>
-                </a:r>
-              </a:p>
-            </p:txBody>
-          </p:sp>
-        </mc:Fallback>
-      </mc:AlternateContent>
-      <mc:AlternateContent xmlns:mc="http://schemas.openxmlformats.org/markup-compatibility/2006">
-        <mc:Choice xmlns:a14="http://schemas.microsoft.com/office/drawing/2010/main" Requires="a14">
-          <p:sp>
-            <p:nvSpPr>
-              <p:cNvPr id="3" name="Titel 2"/>
-              <p:cNvSpPr>
-                <a:spLocks noGrp="1"/>
-              </p:cNvSpPr>
-              <p:nvPr>
-                <p:ph type="title"/>
-              </p:nvPr>
-            </p:nvSpPr>
-            <p:spPr/>
-            <p:txBody>
-              <a:bodyPr/>
-              <a:lstStyle/>
-              <a:p>
-                <a:r>
-                  <a:rPr lang="de-DE" dirty="0"/>
-                  <a:t>Behavior </a:t>
-                </a:r>
-                <a:r>
-                  <a:rPr lang="de-DE" dirty="0" err="1"/>
-                  <a:t>for</a:t>
-                </a:r>
-                <a:r>
-                  <a:rPr lang="de-DE" dirty="0"/>
-                  <a:t> Different Values </a:t>
-                </a:r>
-                <a:r>
-                  <a:rPr lang="de-DE" dirty="0" err="1"/>
-                  <a:t>of</a:t>
-                </a:r>
-                <a:r>
-                  <a:rPr lang="de-DE" dirty="0"/>
-                  <a:t> </a:t>
-                </a:r>
-                <a14:m>
-                  <m:oMath xmlns:m="http://schemas.openxmlformats.org/officeDocument/2006/math">
-                    <m:r>
-                      <a:rPr lang="de-DE" i="1" dirty="0">
-                        <a:latin typeface="Cambria Math" panose="02040503050406030204" pitchFamily="18" charset="0"/>
-                      </a:rPr>
-                      <m:t>𝑅</m:t>
-                    </m:r>
-                    <m:r>
-                      <a:rPr lang="de-DE" i="1" dirty="0">
-                        <a:latin typeface="Cambria Math" panose="02040503050406030204" pitchFamily="18" charset="0"/>
-                      </a:rPr>
-                      <m:t> </m:t>
-                    </m:r>
-                  </m:oMath>
-                </a14:m>
-                <a:endParaRPr lang="en-US" dirty="0"/>
-              </a:p>
-            </p:txBody>
-          </p:sp>
-        </mc:Choice>
-        <mc:Fallback>
-          <p:sp>
-            <p:nvSpPr>
-              <p:cNvPr id="3" name="Titel 2"/>
-              <p:cNvSpPr>
-                <a:spLocks noGrp="1" noRot="1" noChangeAspect="1" noMove="1" noResize="1" noEditPoints="1" noAdjustHandles="1" noChangeArrowheads="1" noChangeShapeType="1" noTextEdit="1"/>
-              </p:cNvSpPr>
-              <p:nvPr>
-                <p:ph type="title"/>
-              </p:nvPr>
-            </p:nvSpPr>
-            <p:spPr>
-              <a:blipFill>
-                <a:blip r:embed="rId3"/>
-                <a:stretch>
-                  <a:fillRect l="-837"/>
-                </a:stretch>
-              </a:blipFill>
-            </p:spPr>
-            <p:txBody>
-              <a:bodyPr/>
-              <a:lstStyle/>
-              <a:p>
-                <a:r>
-                  <a:rPr lang="en-US">
-                    <a:noFill/>
-                  </a:rPr>
-                  <a:t> </a:t>
-                </a:r>
-              </a:p>
-            </p:txBody>
-          </p:sp>
-        </mc:Fallback>
-      </mc:AlternateContent>
-      <p:sp>
-        <p:nvSpPr>
-          <p:cNvPr id="4" name="Datumsplatzhalter 3"/>
-          <p:cNvSpPr>
-            <a:spLocks noGrp="1"/>
-          </p:cNvSpPr>
-          <p:nvPr>
-            <p:ph type="dt" sz="half" idx="10"/>
-          </p:nvPr>
-        </p:nvSpPr>
-        <p:spPr/>
-        <p:txBody>
-          <a:bodyPr/>
-          <a:lstStyle/>
-          <a:p>
-            <a:pPr>
-              <a:defRPr/>
-            </a:pPr>
-            <a:fld id="{972A6A5B-77CB-4D42-9DB4-CC6D207310B8}" type="datetime1">
-              <a:rPr lang="de-DE" smtClean="0"/>
-              <a:pPr>
-                <a:defRPr/>
-              </a:pPr>
-              <a:t>03.11.2016</a:t>
-            </a:fld>
-            <a:endParaRPr lang="en-GB" dirty="0"/>
-          </a:p>
-        </p:txBody>
-      </p:sp>
-      <p:sp>
-        <p:nvSpPr>
-          <p:cNvPr id="5" name="Fußzeilenplatzhalter 4"/>
-          <p:cNvSpPr>
-            <a:spLocks noGrp="1"/>
-          </p:cNvSpPr>
-          <p:nvPr>
-            <p:ph type="ftr" sz="quarter" idx="11"/>
-          </p:nvPr>
-        </p:nvSpPr>
-        <p:spPr/>
-        <p:txBody>
-          <a:bodyPr/>
-          <a:lstStyle/>
-          <a:p>
-            <a:pPr>
-              <a:defRPr/>
-            </a:pPr>
-            <a:r>
-              <a:rPr lang="en-GB" dirty="0"/>
-              <a:t>https://en.wikipedia.org/wiki/Logistic_map</a:t>
-            </a:r>
-            <a:endParaRPr lang="en-GB" dirty="0"/>
-          </a:p>
-        </p:txBody>
-      </p:sp>
-      <p:sp>
-        <p:nvSpPr>
-          <p:cNvPr id="6" name="Foliennummernplatzhalter 5"/>
-          <p:cNvSpPr>
-            <a:spLocks noGrp="1"/>
-          </p:cNvSpPr>
-          <p:nvPr>
-            <p:ph type="sldNum" sz="quarter" idx="12"/>
-          </p:nvPr>
-        </p:nvSpPr>
-        <p:spPr/>
-        <p:txBody>
-          <a:bodyPr/>
-          <a:lstStyle/>
-          <a:p>
-            <a:pPr>
-              <a:defRPr/>
-            </a:pPr>
-            <a:fld id="{E85D1952-A6FC-4ACE-AEE4-EFAF5C32DAC6}" type="slidenum">
-              <a:rPr lang="en-GB" smtClean="0"/>
-              <a:pPr>
-                <a:defRPr/>
-              </a:pPr>
-              <a:t>8</a:t>
-            </a:fld>
-            <a:endParaRPr lang="en-GB" dirty="0"/>
-          </a:p>
-        </p:txBody>
-      </p:sp>
-      <p:pic>
-        <p:nvPicPr>
-          <p:cNvPr id="8" name="Grafik 7"/>
-          <p:cNvPicPr>
-            <a:picLocks noChangeAspect="1"/>
-          </p:cNvPicPr>
-          <p:nvPr/>
-        </p:nvPicPr>
-        <p:blipFill>
-          <a:blip r:embed="rId4">
-            <a:extLst>
-              <a:ext uri="{28A0092B-C50C-407E-A947-70E740481C1C}">
-                <a14:useLocalDpi xmlns:a14="http://schemas.microsoft.com/office/drawing/2010/main" val="0"/>
-              </a:ext>
-            </a:extLst>
-          </a:blip>
-          <a:stretch>
-            <a:fillRect/>
-          </a:stretch>
-        </p:blipFill>
-        <p:spPr>
-          <a:xfrm>
-            <a:off x="2555776" y="1193577"/>
-            <a:ext cx="3744416" cy="2582027"/>
-          </a:xfrm>
-          <a:prstGeom prst="rect">
-            <a:avLst/>
-          </a:prstGeom>
-        </p:spPr>
-      </p:pic>
-    </p:spTree>
-    <p:extLst>
-      <p:ext uri="{BB962C8B-B14F-4D97-AF65-F5344CB8AC3E}">
-        <p14:creationId xmlns:p14="http://schemas.microsoft.com/office/powerpoint/2010/main" val="2396758352"/>
       </p:ext>
     </p:extLst>
   </p:cSld>

</xml_diff>

<commit_message>
Adds Aufgabenstellung at beginning Adds PDF
</commit_message>
<xml_diff>
--- a/Blatt02/Aufgabe01/Slides.pptx
+++ b/Blatt02/Aufgabe01/Slides.pptx
@@ -5,25 +5,26 @@
     <p:sldMasterId id="2147483648" r:id="rId1"/>
   </p:sldMasterIdLst>
   <p:notesMasterIdLst>
-    <p:notesMasterId r:id="rId15"/>
+    <p:notesMasterId r:id="rId16"/>
   </p:notesMasterIdLst>
   <p:handoutMasterIdLst>
-    <p:handoutMasterId r:id="rId16"/>
+    <p:handoutMasterId r:id="rId17"/>
   </p:handoutMasterIdLst>
   <p:sldIdLst>
     <p:sldId id="256" r:id="rId2"/>
-    <p:sldId id="271" r:id="rId3"/>
-    <p:sldId id="260" r:id="rId4"/>
-    <p:sldId id="261" r:id="rId5"/>
-    <p:sldId id="263" r:id="rId6"/>
-    <p:sldId id="262" r:id="rId7"/>
-    <p:sldId id="265" r:id="rId8"/>
-    <p:sldId id="272" r:id="rId9"/>
-    <p:sldId id="264" r:id="rId10"/>
-    <p:sldId id="266" r:id="rId11"/>
-    <p:sldId id="269" r:id="rId12"/>
-    <p:sldId id="270" r:id="rId13"/>
-    <p:sldId id="268" r:id="rId14"/>
+    <p:sldId id="273" r:id="rId3"/>
+    <p:sldId id="271" r:id="rId4"/>
+    <p:sldId id="260" r:id="rId5"/>
+    <p:sldId id="261" r:id="rId6"/>
+    <p:sldId id="263" r:id="rId7"/>
+    <p:sldId id="262" r:id="rId8"/>
+    <p:sldId id="265" r:id="rId9"/>
+    <p:sldId id="272" r:id="rId10"/>
+    <p:sldId id="264" r:id="rId11"/>
+    <p:sldId id="266" r:id="rId12"/>
+    <p:sldId id="269" r:id="rId13"/>
+    <p:sldId id="270" r:id="rId14"/>
+    <p:sldId id="268" r:id="rId15"/>
   </p:sldIdLst>
   <p:sldSz cx="9144000" cy="6858000" type="screen4x3"/>
   <p:notesSz cx="6858000" cy="9144000"/>
@@ -322,7 +323,7 @@
           <a:p>
             <a:fld id="{0B018CD8-1E08-4D54-BA91-1F31C42F5811}" type="slidenum">
               <a:rPr lang="en-GB" smtClean="0"/>
-              <a:t>‹#›</a:t>
+              <a:t>‹Nr.›</a:t>
             </a:fld>
             <a:endParaRPr lang="en-GB"/>
           </a:p>
@@ -747,7 +748,7 @@
               <a:pPr>
                 <a:defRPr/>
               </a:pPr>
-              <a:t>‹#›</a:t>
+              <a:t>‹Nr.›</a:t>
             </a:fld>
             <a:endParaRPr lang="de-DE"/>
           </a:p>
@@ -1197,7 +1198,7 @@
               <a:pPr>
                 <a:defRPr/>
               </a:pPr>
-              <a:t>‹#›</a:t>
+              <a:t>‹Nr.›</a:t>
             </a:fld>
             <a:endParaRPr lang="en-GB" dirty="0"/>
           </a:p>
@@ -1400,7 +1401,7 @@
               <a:pPr>
                 <a:defRPr/>
               </a:pPr>
-              <a:t>‹#›</a:t>
+              <a:t>‹Nr.›</a:t>
             </a:fld>
             <a:endParaRPr lang="en-GB" dirty="0"/>
           </a:p>
@@ -1679,7 +1680,7 @@
               <a:pPr>
                 <a:defRPr/>
               </a:pPr>
-              <a:t>‹#›</a:t>
+              <a:t>‹Nr.›</a:t>
             </a:fld>
             <a:endParaRPr lang="en-GB" dirty="0"/>
           </a:p>
@@ -1805,7 +1806,7 @@
               <a:pPr>
                 <a:defRPr/>
               </a:pPr>
-              <a:t>‹#›</a:t>
+              <a:t>‹Nr.›</a:t>
             </a:fld>
             <a:endParaRPr lang="en-GB" dirty="0"/>
           </a:p>
@@ -1999,7 +2000,7 @@
               <a:pPr>
                 <a:defRPr/>
               </a:pPr>
-              <a:t>‹#›</a:t>
+              <a:t>‹Nr.›</a:t>
             </a:fld>
             <a:endParaRPr lang="en-GB" dirty="0"/>
           </a:p>
@@ -2678,12 +2679,8 @@
               <a:t>, adaptive </a:t>
             </a:r>
             <a:r>
-              <a:rPr lang="en-GB" dirty="0" err="1" smtClean="0"/>
+              <a:rPr lang="en-GB" dirty="0" err="1"/>
               <a:t>Systeme</a:t>
-            </a:r>
-            <a:r>
-              <a:rPr lang="en-GB" dirty="0"/>
-              <a:t/>
             </a:r>
             <a:br>
               <a:rPr lang="en-GB" dirty="0"/>
@@ -2759,17 +2756,555 @@
   <p:clrMapOvr>
     <a:masterClrMapping/>
   </p:clrMapOvr>
-  <p:timing>
-    <p:tnLst>
-      <p:par>
-        <p:cTn id="1" dur="indefinite" restart="never" nodeType="tmRoot"/>
-      </p:par>
-    </p:tnLst>
-  </p:timing>
 </p:sld>
 </file>
 
 <file path=ppt/slides/slide10.xml><?xml version="1.0" encoding="utf-8"?>
+<p:sld xmlns:a="http://schemas.openxmlformats.org/drawingml/2006/main" xmlns:r="http://schemas.openxmlformats.org/officeDocument/2006/relationships" xmlns:p="http://schemas.openxmlformats.org/presentationml/2006/main">
+  <p:cSld>
+    <p:spTree>
+      <p:nvGrpSpPr>
+        <p:cNvPr id="1" name=""/>
+        <p:cNvGrpSpPr/>
+        <p:nvPr/>
+      </p:nvGrpSpPr>
+      <p:grpSpPr>
+        <a:xfrm>
+          <a:off x="0" y="0"/>
+          <a:ext cx="0" cy="0"/>
+          <a:chOff x="0" y="0"/>
+          <a:chExt cx="0" cy="0"/>
+        </a:xfrm>
+      </p:grpSpPr>
+      <mc:AlternateContent xmlns:mc="http://schemas.openxmlformats.org/markup-compatibility/2006" xmlns:a14="http://schemas.microsoft.com/office/drawing/2010/main">
+        <mc:Choice Requires="a14">
+          <p:sp>
+            <p:nvSpPr>
+              <p:cNvPr id="2" name="Inhaltsplatzhalter 1"/>
+              <p:cNvSpPr>
+                <a:spLocks noGrp="1"/>
+              </p:cNvSpPr>
+              <p:nvPr>
+                <p:ph idx="1"/>
+              </p:nvPr>
+            </p:nvSpPr>
+            <p:spPr>
+              <a:xfrm>
+                <a:off x="467544" y="4814512"/>
+                <a:ext cx="8208912" cy="1422799"/>
+              </a:xfrm>
+            </p:spPr>
+            <p:txBody>
+              <a:bodyPr numCol="2"/>
+              <a:lstStyle/>
+              <a:p>
+                <a:r>
+                  <a:rPr lang="de-DE" dirty="0"/>
+                  <a:t>Single </a:t>
+                </a:r>
+                <a:r>
+                  <a:rPr lang="de-DE" dirty="0" err="1"/>
+                  <a:t>fixpoint</a:t>
+                </a:r>
+                <a:r>
+                  <a:rPr lang="de-DE" dirty="0"/>
+                  <a:t> </a:t>
+                </a:r>
+                <a:r>
+                  <a:rPr lang="de-DE" dirty="0" err="1"/>
+                  <a:t>for</a:t>
+                </a:r>
+                <a:r>
+                  <a:rPr lang="de-DE" dirty="0"/>
+                  <a:t> </a:t>
+                </a:r>
+                <a14:m>
+                  <m:oMath xmlns:m="http://schemas.openxmlformats.org/officeDocument/2006/math">
+                    <m:r>
+                      <a:rPr lang="de-DE" i="1" dirty="0" smtClean="0">
+                        <a:latin typeface="Cambria Math" panose="02040503050406030204" pitchFamily="18" charset="0"/>
+                      </a:rPr>
+                      <m:t>𝑅</m:t>
+                    </m:r>
+                    <m:r>
+                      <a:rPr lang="de-DE" i="1" dirty="0" smtClean="0">
+                        <a:latin typeface="Cambria Math" panose="02040503050406030204" pitchFamily="18" charset="0"/>
+                      </a:rPr>
+                      <m:t>&lt;3</m:t>
+                    </m:r>
+                  </m:oMath>
+                </a14:m>
+                <a:endParaRPr lang="de-DE" dirty="0"/>
+              </a:p>
+              <a:p>
+                <a:pPr lvl="1"/>
+                <a14:m>
+                  <m:oMath xmlns:m="http://schemas.openxmlformats.org/officeDocument/2006/math">
+                    <m:sSub>
+                      <m:sSubPr>
+                        <m:ctrlPr>
+                          <a:rPr lang="en-US" b="0" i="1" dirty="0" smtClean="0">
+                            <a:latin typeface="Cambria Math" panose="02040503050406030204" pitchFamily="18" charset="0"/>
+                          </a:rPr>
+                        </m:ctrlPr>
+                      </m:sSubPr>
+                      <m:e>
+                        <m:r>
+                          <a:rPr lang="en-US" b="0" i="1" dirty="0" smtClean="0">
+                            <a:latin typeface="Cambria Math" panose="02040503050406030204" pitchFamily="18" charset="0"/>
+                          </a:rPr>
+                          <m:t>𝑓</m:t>
+                        </m:r>
+                      </m:e>
+                      <m:sub>
+                        <m:r>
+                          <a:rPr lang="en-US" b="0" i="1" dirty="0" smtClean="0">
+                            <a:latin typeface="Cambria Math" panose="02040503050406030204" pitchFamily="18" charset="0"/>
+                          </a:rPr>
+                          <m:t>𝑦</m:t>
+                        </m:r>
+                      </m:sub>
+                    </m:sSub>
+                    <m:r>
+                      <a:rPr lang="en-US" b="0" i="1" dirty="0" smtClean="0">
+                        <a:latin typeface="Cambria Math" panose="02040503050406030204" pitchFamily="18" charset="0"/>
+                      </a:rPr>
+                      <m:t>=</m:t>
+                    </m:r>
+                    <m:r>
+                      <a:rPr lang="de-DE" i="1" dirty="0" smtClean="0">
+                        <a:latin typeface="Cambria Math" panose="02040503050406030204" pitchFamily="18" charset="0"/>
+                      </a:rPr>
+                      <m:t>0</m:t>
+                    </m:r>
+                  </m:oMath>
+                </a14:m>
+                <a:r>
+                  <a:rPr lang="de-DE" dirty="0"/>
+                  <a:t> </a:t>
+                </a:r>
+                <a:r>
+                  <a:rPr lang="de-DE" dirty="0" err="1"/>
+                  <a:t>for</a:t>
+                </a:r>
+                <a:r>
+                  <a:rPr lang="de-DE" dirty="0"/>
+                  <a:t> </a:t>
+                </a:r>
+                <a14:m>
+                  <m:oMath xmlns:m="http://schemas.openxmlformats.org/officeDocument/2006/math">
+                    <m:r>
+                      <a:rPr lang="de-DE" i="1" dirty="0" smtClean="0">
+                        <a:latin typeface="Cambria Math" panose="02040503050406030204" pitchFamily="18" charset="0"/>
+                      </a:rPr>
+                      <m:t>𝑅</m:t>
+                    </m:r>
+                    <m:r>
+                      <a:rPr lang="de-DE" i="1" dirty="0" smtClean="0">
+                        <a:latin typeface="Cambria Math" panose="02040503050406030204" pitchFamily="18" charset="0"/>
+                      </a:rPr>
+                      <m:t>&lt;1</m:t>
+                    </m:r>
+                  </m:oMath>
+                </a14:m>
+                <a:r>
+                  <a:rPr lang="de-DE" dirty="0"/>
+                  <a:t> </a:t>
+                </a:r>
+              </a:p>
+              <a:p>
+                <a:pPr lvl="1"/>
+                <a:endParaRPr lang="de-DE" dirty="0"/>
+              </a:p>
+              <a:p>
+                <a:pPr lvl="1"/>
+                <a:endParaRPr lang="de-DE" dirty="0"/>
+              </a:p>
+              <a:p>
+                <a:r>
+                  <a:rPr lang="de-DE" dirty="0"/>
+                  <a:t>Speed </a:t>
+                </a:r>
+                <a:r>
+                  <a:rPr lang="de-DE" dirty="0" err="1"/>
+                  <a:t>of</a:t>
+                </a:r>
+                <a:r>
+                  <a:rPr lang="de-DE" dirty="0"/>
+                  <a:t> </a:t>
+                </a:r>
+                <a:r>
+                  <a:rPr lang="de-DE" dirty="0" err="1"/>
+                  <a:t>convergence</a:t>
+                </a:r>
+                <a:endParaRPr lang="de-DE" dirty="0"/>
+              </a:p>
+              <a:p>
+                <a:pPr lvl="1"/>
+                <a:r>
+                  <a:rPr lang="de-DE" dirty="0"/>
+                  <a:t>Quick </a:t>
+                </a:r>
+                <a:r>
+                  <a:rPr lang="de-DE" dirty="0" err="1"/>
+                  <a:t>for</a:t>
+                </a:r>
+                <a:r>
+                  <a:rPr lang="de-DE" dirty="0"/>
+                  <a:t> </a:t>
+                </a:r>
+                <a14:m>
+                  <m:oMath xmlns:m="http://schemas.openxmlformats.org/officeDocument/2006/math">
+                    <m:r>
+                      <a:rPr lang="de-DE" i="1" dirty="0" smtClean="0">
+                        <a:latin typeface="Cambria Math" panose="02040503050406030204" pitchFamily="18" charset="0"/>
+                      </a:rPr>
+                      <m:t>0&lt;</m:t>
+                    </m:r>
+                    <m:r>
+                      <a:rPr lang="de-DE" i="1" dirty="0" smtClean="0">
+                        <a:latin typeface="Cambria Math" panose="02040503050406030204" pitchFamily="18" charset="0"/>
+                      </a:rPr>
+                      <m:t>𝑅</m:t>
+                    </m:r>
+                    <m:r>
+                      <a:rPr lang="de-DE" i="1" dirty="0" smtClean="0">
+                        <a:latin typeface="Cambria Math" panose="02040503050406030204" pitchFamily="18" charset="0"/>
+                      </a:rPr>
+                      <m:t>&lt;2 </m:t>
+                    </m:r>
+                  </m:oMath>
+                </a14:m>
+                <a:endParaRPr lang="de-DE" dirty="0"/>
+              </a:p>
+              <a:p>
+                <a:pPr lvl="1"/>
+                <a:r>
+                  <a:rPr lang="de-DE" dirty="0"/>
+                  <a:t>Quick </a:t>
+                </a:r>
+                <a:r>
+                  <a:rPr lang="de-DE" dirty="0" err="1"/>
+                  <a:t>with</a:t>
+                </a:r>
+                <a:r>
+                  <a:rPr lang="de-DE" dirty="0"/>
+                  <a:t> </a:t>
+                </a:r>
+                <a:r>
+                  <a:rPr lang="de-DE" dirty="0" err="1"/>
+                  <a:t>slight</a:t>
+                </a:r>
+                <a:r>
+                  <a:rPr lang="de-DE" dirty="0"/>
+                  <a:t> </a:t>
+                </a:r>
+                <a:r>
+                  <a:rPr lang="de-DE" dirty="0" err="1"/>
+                  <a:t>fluctuation</a:t>
+                </a:r>
+                <a:r>
+                  <a:rPr lang="de-DE" dirty="0"/>
+                  <a:t> </a:t>
+                </a:r>
+                <a:r>
+                  <a:rPr lang="de-DE" dirty="0" err="1"/>
+                  <a:t>for</a:t>
+                </a:r>
+                <a:r>
+                  <a:rPr lang="de-DE" dirty="0"/>
+                  <a:t> </a:t>
+                </a:r>
+                <a14:m>
+                  <m:oMath xmlns:m="http://schemas.openxmlformats.org/officeDocument/2006/math">
+                    <m:r>
+                      <a:rPr lang="de-DE" i="1" dirty="0" smtClean="0">
+                        <a:latin typeface="Cambria Math" panose="02040503050406030204" pitchFamily="18" charset="0"/>
+                      </a:rPr>
+                      <m:t>2&lt;</m:t>
+                    </m:r>
+                    <m:r>
+                      <a:rPr lang="en-US" b="0" i="1" dirty="0" smtClean="0">
+                        <a:latin typeface="Cambria Math" panose="02040503050406030204" pitchFamily="18" charset="0"/>
+                      </a:rPr>
+                      <m:t>𝑅</m:t>
+                    </m:r>
+                    <m:r>
+                      <a:rPr lang="de-DE" i="1" dirty="0" smtClean="0">
+                        <a:latin typeface="Cambria Math" panose="02040503050406030204" pitchFamily="18" charset="0"/>
+                      </a:rPr>
+                      <m:t>&lt;</m:t>
+                    </m:r>
+                    <m:r>
+                      <a:rPr lang="en-US" b="0" i="1" dirty="0" smtClean="0">
+                        <a:latin typeface="Cambria Math" panose="02040503050406030204" pitchFamily="18" charset="0"/>
+                      </a:rPr>
+                      <m:t>3</m:t>
+                    </m:r>
+                    <m:r>
+                      <a:rPr lang="de-DE" i="1" dirty="0" smtClean="0">
+                        <a:latin typeface="Cambria Math" panose="02040503050406030204" pitchFamily="18" charset="0"/>
+                      </a:rPr>
+                      <m:t> </m:t>
+                    </m:r>
+                  </m:oMath>
+                </a14:m>
+                <a:endParaRPr lang="de-DE" dirty="0"/>
+              </a:p>
+            </p:txBody>
+          </p:sp>
+        </mc:Choice>
+        <mc:Fallback xmlns="">
+          <p:sp>
+            <p:nvSpPr>
+              <p:cNvPr id="2" name="Inhaltsplatzhalter 1"/>
+              <p:cNvSpPr>
+                <a:spLocks noGrp="1" noRot="1" noChangeAspect="1" noMove="1" noResize="1" noEditPoints="1" noAdjustHandles="1" noChangeArrowheads="1" noChangeShapeType="1" noTextEdit="1"/>
+              </p:cNvSpPr>
+              <p:nvPr>
+                <p:ph idx="1"/>
+              </p:nvPr>
+            </p:nvSpPr>
+            <p:spPr>
+              <a:xfrm>
+                <a:off x="467544" y="4814512"/>
+                <a:ext cx="8208912" cy="1422799"/>
+              </a:xfrm>
+              <a:blipFill>
+                <a:blip r:embed="rId2"/>
+                <a:stretch>
+                  <a:fillRect l="-669" t="-2146" b="-9013"/>
+                </a:stretch>
+              </a:blipFill>
+            </p:spPr>
+            <p:txBody>
+              <a:bodyPr/>
+              <a:lstStyle/>
+              <a:p>
+                <a:r>
+                  <a:rPr lang="en-US">
+                    <a:noFill/>
+                  </a:rPr>
+                  <a:t> </a:t>
+                </a:r>
+              </a:p>
+            </p:txBody>
+          </p:sp>
+        </mc:Fallback>
+      </mc:AlternateContent>
+      <mc:AlternateContent xmlns:mc="http://schemas.openxmlformats.org/markup-compatibility/2006" xmlns:a14="http://schemas.microsoft.com/office/drawing/2010/main">
+        <mc:Choice Requires="a14">
+          <p:sp>
+            <p:nvSpPr>
+              <p:cNvPr id="3" name="Titel 2"/>
+              <p:cNvSpPr>
+                <a:spLocks noGrp="1"/>
+              </p:cNvSpPr>
+              <p:nvPr>
+                <p:ph type="title"/>
+              </p:nvPr>
+            </p:nvSpPr>
+            <p:spPr/>
+            <p:txBody>
+              <a:bodyPr/>
+              <a:lstStyle/>
+              <a:p>
+                <a:r>
+                  <a:rPr lang="de-DE" dirty="0"/>
+                  <a:t>Behavior </a:t>
+                </a:r>
+                <a:r>
+                  <a:rPr lang="de-DE" dirty="0" err="1"/>
+                  <a:t>for</a:t>
+                </a:r>
+                <a:r>
+                  <a:rPr lang="de-DE" dirty="0"/>
+                  <a:t> Different Values </a:t>
+                </a:r>
+                <a:r>
+                  <a:rPr lang="de-DE" dirty="0" err="1"/>
+                  <a:t>of</a:t>
+                </a:r>
+                <a:r>
+                  <a:rPr lang="de-DE" dirty="0"/>
+                  <a:t> </a:t>
+                </a:r>
+                <a14:m>
+                  <m:oMath xmlns:m="http://schemas.openxmlformats.org/officeDocument/2006/math">
+                    <m:r>
+                      <a:rPr lang="de-DE" i="1" dirty="0">
+                        <a:latin typeface="Cambria Math" panose="02040503050406030204" pitchFamily="18" charset="0"/>
+                      </a:rPr>
+                      <m:t>𝑅</m:t>
+                    </m:r>
+                    <m:r>
+                      <a:rPr lang="de-DE" i="1" dirty="0">
+                        <a:latin typeface="Cambria Math" panose="02040503050406030204" pitchFamily="18" charset="0"/>
+                      </a:rPr>
+                      <m:t> </m:t>
+                    </m:r>
+                  </m:oMath>
+                </a14:m>
+                <a:endParaRPr lang="en-US" dirty="0"/>
+              </a:p>
+            </p:txBody>
+          </p:sp>
+        </mc:Choice>
+        <mc:Fallback xmlns="">
+          <p:sp>
+            <p:nvSpPr>
+              <p:cNvPr id="3" name="Titel 2"/>
+              <p:cNvSpPr>
+                <a:spLocks noGrp="1" noRot="1" noChangeAspect="1" noMove="1" noResize="1" noEditPoints="1" noAdjustHandles="1" noChangeArrowheads="1" noChangeShapeType="1" noTextEdit="1"/>
+              </p:cNvSpPr>
+              <p:nvPr>
+                <p:ph type="title"/>
+              </p:nvPr>
+            </p:nvSpPr>
+            <p:spPr>
+              <a:blipFill>
+                <a:blip r:embed="rId3"/>
+                <a:stretch>
+                  <a:fillRect l="-837"/>
+                </a:stretch>
+              </a:blipFill>
+            </p:spPr>
+            <p:txBody>
+              <a:bodyPr/>
+              <a:lstStyle/>
+              <a:p>
+                <a:r>
+                  <a:rPr lang="en-US">
+                    <a:noFill/>
+                  </a:rPr>
+                  <a:t> </a:t>
+                </a:r>
+              </a:p>
+            </p:txBody>
+          </p:sp>
+        </mc:Fallback>
+      </mc:AlternateContent>
+      <p:sp>
+        <p:nvSpPr>
+          <p:cNvPr id="4" name="Datumsplatzhalter 3"/>
+          <p:cNvSpPr>
+            <a:spLocks noGrp="1"/>
+          </p:cNvSpPr>
+          <p:nvPr>
+            <p:ph type="dt" sz="half" idx="10"/>
+          </p:nvPr>
+        </p:nvSpPr>
+        <p:spPr/>
+        <p:txBody>
+          <a:bodyPr/>
+          <a:lstStyle/>
+          <a:p>
+            <a:pPr>
+              <a:defRPr/>
+            </a:pPr>
+            <a:fld id="{972A6A5B-77CB-4D42-9DB4-CC6D207310B8}" type="datetime1">
+              <a:rPr lang="de-DE" smtClean="0"/>
+              <a:pPr>
+                <a:defRPr/>
+              </a:pPr>
+              <a:t>03.11.2016</a:t>
+            </a:fld>
+            <a:endParaRPr lang="en-GB" dirty="0"/>
+          </a:p>
+        </p:txBody>
+      </p:sp>
+      <p:sp>
+        <p:nvSpPr>
+          <p:cNvPr id="5" name="Fußzeilenplatzhalter 4"/>
+          <p:cNvSpPr>
+            <a:spLocks noGrp="1"/>
+          </p:cNvSpPr>
+          <p:nvPr>
+            <p:ph type="ftr" sz="quarter" idx="11"/>
+          </p:nvPr>
+        </p:nvSpPr>
+        <p:spPr/>
+        <p:txBody>
+          <a:bodyPr/>
+          <a:lstStyle/>
+          <a:p>
+            <a:pPr>
+              <a:defRPr/>
+            </a:pPr>
+            <a:r>
+              <a:rPr lang="en-GB" dirty="0"/>
+              <a:t>https://en.wikipedia.org/wiki/Logistic_map</a:t>
+            </a:r>
+          </a:p>
+        </p:txBody>
+      </p:sp>
+      <p:sp>
+        <p:nvSpPr>
+          <p:cNvPr id="6" name="Foliennummernplatzhalter 5"/>
+          <p:cNvSpPr>
+            <a:spLocks noGrp="1"/>
+          </p:cNvSpPr>
+          <p:nvPr>
+            <p:ph type="sldNum" sz="quarter" idx="12"/>
+          </p:nvPr>
+        </p:nvSpPr>
+        <p:spPr/>
+        <p:txBody>
+          <a:bodyPr/>
+          <a:lstStyle/>
+          <a:p>
+            <a:pPr>
+              <a:defRPr/>
+            </a:pPr>
+            <a:fld id="{E85D1952-A6FC-4ACE-AEE4-EFAF5C32DAC6}" type="slidenum">
+              <a:rPr lang="en-GB" smtClean="0"/>
+              <a:pPr>
+                <a:defRPr/>
+              </a:pPr>
+              <a:t>10</a:t>
+            </a:fld>
+            <a:endParaRPr lang="en-GB" dirty="0"/>
+          </a:p>
+        </p:txBody>
+      </p:sp>
+      <p:pic>
+        <p:nvPicPr>
+          <p:cNvPr id="13" name="Grafik 12"/>
+          <p:cNvPicPr>
+            <a:picLocks noChangeAspect="1"/>
+          </p:cNvPicPr>
+          <p:nvPr/>
+        </p:nvPicPr>
+        <p:blipFill>
+          <a:blip r:embed="rId4"/>
+          <a:stretch>
+            <a:fillRect/>
+          </a:stretch>
+        </p:blipFill>
+        <p:spPr>
+          <a:xfrm>
+            <a:off x="2339752" y="1124744"/>
+            <a:ext cx="4464496" cy="3473745"/>
+          </a:xfrm>
+          <a:prstGeom prst="rect">
+            <a:avLst/>
+          </a:prstGeom>
+        </p:spPr>
+      </p:pic>
+    </p:spTree>
+    <p:extLst>
+      <p:ext uri="{BB962C8B-B14F-4D97-AF65-F5344CB8AC3E}">
+        <p14:creationId xmlns:p14="http://schemas.microsoft.com/office/powerpoint/2010/main" val="189323410"/>
+      </p:ext>
+    </p:extLst>
+  </p:cSld>
+  <p:clrMapOvr>
+    <a:masterClrMapping/>
+  </p:clrMapOvr>
+</p:sld>
+</file>
+
+<file path=ppt/slides/slide11.xml><?xml version="1.0" encoding="utf-8"?>
 <p:sld xmlns:a="http://schemas.openxmlformats.org/drawingml/2006/main" xmlns:r="http://schemas.openxmlformats.org/officeDocument/2006/relationships" xmlns:p="http://schemas.openxmlformats.org/presentationml/2006/main">
   <p:cSld>
     <p:spTree>
@@ -2840,10 +3375,6 @@
                     </m:r>
                   </m:oMath>
                 </a14:m>
-                <a:r>
-                  <a:rPr lang="en-US" dirty="0"/>
-                  <a:t/>
-                </a:r>
                 <a:br>
                   <a:rPr lang="en-US" dirty="0"/>
                 </a:br>
@@ -2965,7 +3496,7 @@
               <a:pPr>
                 <a:defRPr/>
               </a:pPr>
-              <a:t>10</a:t>
+              <a:t>11</a:t>
             </a:fld>
             <a:endParaRPr lang="en-GB" dirty="0"/>
           </a:p>
@@ -3184,17 +3715,10 @@
   <p:clrMapOvr>
     <a:masterClrMapping/>
   </p:clrMapOvr>
-  <p:timing>
-    <p:tnLst>
-      <p:par>
-        <p:cTn id="1" dur="indefinite" restart="never" nodeType="tmRoot"/>
-      </p:par>
-    </p:tnLst>
-  </p:timing>
 </p:sld>
 </file>
 
-<file path=ppt/slides/slide11.xml><?xml version="1.0" encoding="utf-8"?>
+<file path=ppt/slides/slide12.xml><?xml version="1.0" encoding="utf-8"?>
 <p:sld xmlns:a="http://schemas.openxmlformats.org/drawingml/2006/main" xmlns:r="http://schemas.openxmlformats.org/officeDocument/2006/relationships" xmlns:p="http://schemas.openxmlformats.org/presentationml/2006/main">
   <p:cSld>
     <p:spTree>
@@ -3289,10 +3813,6 @@
                     </m:r>
                   </m:oMath>
                 </a14:m>
-                <a:r>
-                  <a:rPr lang="en-US" dirty="0"/>
-                  <a:t/>
-                </a:r>
                 <a:br>
                   <a:rPr lang="en-US" dirty="0"/>
                 </a:br>
@@ -3426,7 +3946,7 @@
               <a:pPr>
                 <a:defRPr/>
               </a:pPr>
-              <a:t>11</a:t>
+              <a:t>12</a:t>
             </a:fld>
             <a:endParaRPr lang="en-GB" dirty="0"/>
           </a:p>
@@ -3659,17 +4179,10 @@
   <p:clrMapOvr>
     <a:masterClrMapping/>
   </p:clrMapOvr>
-  <p:timing>
-    <p:tnLst>
-      <p:par>
-        <p:cTn id="1" dur="indefinite" restart="never" nodeType="tmRoot"/>
-      </p:par>
-    </p:tnLst>
-  </p:timing>
 </p:sld>
 </file>
 
-<file path=ppt/slides/slide12.xml><?xml version="1.0" encoding="utf-8"?>
+<file path=ppt/slides/slide13.xml><?xml version="1.0" encoding="utf-8"?>
 <p:sld xmlns:a="http://schemas.openxmlformats.org/drawingml/2006/main" xmlns:r="http://schemas.openxmlformats.org/officeDocument/2006/relationships" xmlns:p="http://schemas.openxmlformats.org/presentationml/2006/main">
   <p:cSld>
     <p:spTree>
@@ -3740,10 +4253,6 @@
                     </m:r>
                   </m:oMath>
                 </a14:m>
-                <a:r>
-                  <a:rPr lang="en-US" dirty="0"/>
-                  <a:t/>
-                </a:r>
                 <a:br>
                   <a:rPr lang="en-US" dirty="0"/>
                 </a:br>
@@ -3877,7 +4386,7 @@
               <a:pPr>
                 <a:defRPr/>
               </a:pPr>
-              <a:t>12</a:t>
+              <a:t>13</a:t>
             </a:fld>
             <a:endParaRPr lang="en-GB" dirty="0"/>
           </a:p>
@@ -4006,17 +4515,10 @@
   <p:clrMapOvr>
     <a:masterClrMapping/>
   </p:clrMapOvr>
-  <p:timing>
-    <p:tnLst>
-      <p:par>
-        <p:cTn id="1" dur="indefinite" restart="never" nodeType="tmRoot"/>
-      </p:par>
-    </p:tnLst>
-  </p:timing>
 </p:sld>
 </file>
 
-<file path=ppt/slides/slide13.xml><?xml version="1.0" encoding="utf-8"?>
+<file path=ppt/slides/slide14.xml><?xml version="1.0" encoding="utf-8"?>
 <p:sld xmlns:a="http://schemas.openxmlformats.org/drawingml/2006/main" xmlns:r="http://schemas.openxmlformats.org/officeDocument/2006/relationships" xmlns:p="http://schemas.openxmlformats.org/presentationml/2006/main">
   <p:cSld>
     <p:spTree>
@@ -4229,10 +4731,6 @@
                     </m:r>
                   </m:oMath>
                 </a14:m>
-                <a:r>
-                  <a:rPr lang="en-US" dirty="0"/>
-                  <a:t/>
-                </a:r>
                 <a:br>
                   <a:rPr lang="en-US" dirty="0"/>
                 </a:br>
@@ -4373,7 +4871,7 @@
               <a:pPr>
                 <a:defRPr/>
               </a:pPr>
-              <a:t>13</a:t>
+              <a:t>14</a:t>
             </a:fld>
             <a:endParaRPr lang="en-GB" dirty="0"/>
           </a:p>
@@ -4389,13 +4887,6 @@
   <p:clrMapOvr>
     <a:masterClrMapping/>
   </p:clrMapOvr>
-  <p:timing>
-    <p:tnLst>
-      <p:par>
-        <p:cTn id="1" dur="indefinite" restart="never" nodeType="tmRoot"/>
-      </p:par>
-    </p:tnLst>
-  </p:timing>
 </p:sld>
 </file>
 
@@ -4418,12 +4909,12 @@
       </p:grpSpPr>
       <p:sp>
         <p:nvSpPr>
-          <p:cNvPr id="2" name="Titel 1"/>
+          <p:cNvPr id="7" name="Inhaltsplatzhalter 6"/>
           <p:cNvSpPr>
             <a:spLocks noGrp="1"/>
           </p:cNvSpPr>
           <p:nvPr>
-            <p:ph type="title"/>
+            <p:ph idx="1"/>
           </p:nvPr>
         </p:nvSpPr>
         <p:spPr/>
@@ -4431,14 +4922,206 @@
           <a:bodyPr/>
           <a:lstStyle/>
           <a:p>
+            <a:pPr marL="0" indent="0">
+              <a:buNone/>
+            </a:pPr>
+            <a:r>
+              <a:rPr lang="de-DE" dirty="0"/>
+              <a:t>Veranschaulichen Sie sich das Verhalten von chaotischen Systemen am</a:t>
+            </a:r>
+            <a:r>
+              <a:rPr lang="de-DE" b="1" dirty="0"/>
+              <a:t> Beispiel des logistischen Modells </a:t>
+            </a:r>
+            <a:r>
+              <a:rPr lang="de-DE" dirty="0"/>
+              <a:t>bzw. der logistischen Abbildung. </a:t>
+            </a:r>
+            <a:r>
+              <a:rPr lang="de-DE" i="1" dirty="0"/>
+              <a:t>[…]</a:t>
+            </a:r>
+          </a:p>
+          <a:p>
+            <a:pPr marL="457200" indent="-457200">
+              <a:buFont typeface="+mj-lt"/>
+              <a:buAutoNum type="alphaLcParenR"/>
+            </a:pPr>
+            <a:r>
+              <a:rPr lang="de-DE" dirty="0"/>
+              <a:t>Vervollständigen Sie dazu das </a:t>
+            </a:r>
+            <a:r>
+              <a:rPr lang="de-DE" b="1" dirty="0"/>
+              <a:t>User-Interface</a:t>
+            </a:r>
+            <a:r>
+              <a:rPr lang="de-DE" i="1" dirty="0"/>
+              <a:t> </a:t>
+            </a:r>
+            <a:r>
+              <a:rPr lang="en-US" i="1" dirty="0"/>
+              <a:t>[</a:t>
+            </a:r>
+            <a:r>
+              <a:rPr lang="en-US" i="1" dirty="0" err="1"/>
+              <a:t>mit</a:t>
+            </a:r>
+            <a:r>
+              <a:rPr lang="en-US" i="1" dirty="0"/>
+              <a:t> </a:t>
+            </a:r>
+            <a:r>
+              <a:rPr lang="en-US" b="1" i="1" dirty="0" err="1"/>
+              <a:t>Slidern</a:t>
+            </a:r>
+            <a:r>
+              <a:rPr lang="en-US" i="1" dirty="0"/>
+              <a:t> f</a:t>
+            </a:r>
+            <a:r>
+              <a:rPr lang="de-DE" i="1" dirty="0" err="1"/>
+              <a:t>ür</a:t>
+            </a:r>
+            <a:r>
+              <a:rPr lang="de-DE" i="1" dirty="0"/>
+              <a:t> </a:t>
+            </a:r>
+            <a:r>
+              <a:rPr lang="de-DE" b="1" i="1" dirty="0"/>
+              <a:t>y0</a:t>
+            </a:r>
+            <a:r>
+              <a:rPr lang="de-DE" i="1" dirty="0"/>
+              <a:t> und </a:t>
+            </a:r>
+            <a:r>
+              <a:rPr lang="de-DE" b="1" i="1" dirty="0"/>
+              <a:t>R</a:t>
+            </a:r>
+            <a:r>
+              <a:rPr lang="en-US" i="1" dirty="0"/>
+              <a:t>]</a:t>
+            </a:r>
+            <a:endParaRPr lang="de-DE" i="1" dirty="0"/>
+          </a:p>
+          <a:p>
+            <a:pPr marL="457200" indent="-457200">
+              <a:buFont typeface="+mj-lt"/>
+              <a:buAutoNum type="alphaLcParenR"/>
+            </a:pPr>
+            <a:r>
+              <a:rPr lang="de-DE" dirty="0"/>
+              <a:t>Platzieren Sie </a:t>
+            </a:r>
+            <a:r>
+              <a:rPr lang="de-DE" b="1" dirty="0"/>
+              <a:t>Monitore</a:t>
+            </a:r>
+            <a:r>
+              <a:rPr lang="de-DE" dirty="0"/>
+              <a:t> </a:t>
+            </a:r>
+            <a:r>
+              <a:rPr lang="de-DE" i="1" dirty="0"/>
+              <a:t>[für </a:t>
+            </a:r>
+            <a:r>
+              <a:rPr lang="de-DE" b="1" i="1" dirty="0"/>
+              <a:t>y-</a:t>
+            </a:r>
+            <a:r>
+              <a:rPr lang="de-DE" b="1" i="1" dirty="0" err="1"/>
+              <a:t>current</a:t>
+            </a:r>
+            <a:r>
+              <a:rPr lang="de-DE" i="1" dirty="0"/>
+              <a:t> und </a:t>
+            </a:r>
+            <a:r>
+              <a:rPr lang="de-DE" b="1" i="1" dirty="0"/>
+              <a:t>y-</a:t>
+            </a:r>
+            <a:r>
+              <a:rPr lang="de-DE" b="1" i="1" dirty="0" err="1"/>
+              <a:t>new</a:t>
+            </a:r>
+            <a:r>
+              <a:rPr lang="de-DE" i="1" dirty="0"/>
+              <a:t>]</a:t>
+            </a:r>
+          </a:p>
+          <a:p>
+            <a:pPr marL="457200" indent="-457200">
+              <a:buFont typeface="+mj-lt"/>
+              <a:buAutoNum type="alphaLcParenR"/>
+            </a:pPr>
+            <a:r>
+              <a:rPr lang="de-DE" dirty="0"/>
+              <a:t>Vervollständigen Sie den </a:t>
+            </a:r>
+            <a:r>
+              <a:rPr lang="de-DE" b="1" dirty="0"/>
+              <a:t>Code</a:t>
+            </a:r>
+            <a:r>
+              <a:rPr lang="de-DE" dirty="0"/>
+              <a:t> </a:t>
+            </a:r>
+            <a:r>
+              <a:rPr lang="en-US" i="1" dirty="0"/>
+              <a:t>[…]</a:t>
+            </a:r>
+            <a:endParaRPr lang="de-DE" i="1" dirty="0"/>
+          </a:p>
+          <a:p>
+            <a:pPr marL="457200" indent="-457200">
+              <a:buFont typeface="+mj-lt"/>
+              <a:buAutoNum type="alphaLcParenR"/>
+            </a:pPr>
+            <a:r>
+              <a:rPr lang="de-DE" dirty="0"/>
+              <a:t>Testen Sie Ihre Implementierung mit verschiedenen Parametern von R. Können Sie </a:t>
+            </a:r>
+            <a:r>
+              <a:rPr lang="de-DE" b="1" dirty="0"/>
+              <a:t>Bifurkationen</a:t>
+            </a:r>
+            <a:r>
+              <a:rPr lang="de-DE" dirty="0"/>
+              <a:t> beobachten?</a:t>
+            </a:r>
+            <a:r>
+              <a:rPr lang="en-US" dirty="0"/>
+              <a:t> </a:t>
+            </a:r>
+            <a:r>
+              <a:rPr lang="en-US" i="1" dirty="0"/>
+              <a:t>[…]</a:t>
+            </a:r>
+          </a:p>
+        </p:txBody>
+      </p:sp>
+      <p:sp>
+        <p:nvSpPr>
+          <p:cNvPr id="6" name="Titel 5"/>
+          <p:cNvSpPr>
+            <a:spLocks noGrp="1"/>
+          </p:cNvSpPr>
+          <p:nvPr>
+            <p:ph type="title"/>
+          </p:nvPr>
+        </p:nvSpPr>
+        <p:spPr/>
+        <p:txBody>
+          <a:bodyPr/>
+          <a:lstStyle/>
+          <a:p>
             <a:r>
               <a:rPr lang="en-US" dirty="0" err="1"/>
-              <a:t>Netlogo</a:t>
-            </a:r>
-            <a:r>
-              <a:rPr lang="en-US" dirty="0"/>
-              <a:t> Code</a:t>
-            </a:r>
+              <a:t>Aufgabenstellung</a:t>
+            </a:r>
+            <a:endParaRPr lang="en-US" dirty="0"/>
           </a:p>
         </p:txBody>
       </p:sp>
@@ -4525,20 +5208,13 @@
     </p:spTree>
     <p:extLst>
       <p:ext uri="{BB962C8B-B14F-4D97-AF65-F5344CB8AC3E}">
-        <p14:creationId xmlns:p14="http://schemas.microsoft.com/office/powerpoint/2010/main" val="4174642701"/>
+        <p14:creationId xmlns:p14="http://schemas.microsoft.com/office/powerpoint/2010/main" val="2315597151"/>
       </p:ext>
     </p:extLst>
   </p:cSld>
   <p:clrMapOvr>
     <a:masterClrMapping/>
   </p:clrMapOvr>
-  <p:timing>
-    <p:tnLst>
-      <p:par>
-        <p:cTn id="1" dur="indefinite" restart="never" nodeType="tmRoot"/>
-      </p:par>
-    </p:tnLst>
-  </p:timing>
 </p:sld>
 </file>
 
@@ -4561,172 +5237,26 @@
       </p:grpSpPr>
       <p:sp>
         <p:nvSpPr>
-          <p:cNvPr id="7" name="Inhaltsplatzhalter 6"/>
+          <p:cNvPr id="2" name="Titel 1"/>
           <p:cNvSpPr>
             <a:spLocks noGrp="1"/>
           </p:cNvSpPr>
           <p:nvPr>
-            <p:ph idx="1"/>
-          </p:nvPr>
-        </p:nvSpPr>
-        <p:spPr>
-          <a:solidFill>
-            <a:schemeClr val="tx1"/>
-          </a:solidFill>
-        </p:spPr>
+            <p:ph type="title"/>
+          </p:nvPr>
+        </p:nvSpPr>
+        <p:spPr/>
         <p:txBody>
           <a:bodyPr/>
           <a:lstStyle/>
           <a:p>
-            <a:pPr marL="0" indent="0">
-              <a:buNone/>
-            </a:pPr>
-            <a:r>
-              <a:rPr lang="en-US" dirty="0">
-                <a:solidFill>
-                  <a:schemeClr val="bg1"/>
-                </a:solidFill>
-                <a:latin typeface="Consolas" panose="020B0609020204030204" pitchFamily="49" charset="0"/>
-              </a:rPr>
-              <a:t>;; the initialization makes sure y-current and y-new are</a:t>
-            </a:r>
-          </a:p>
-          <a:p>
-            <a:pPr marL="0" indent="0">
-              <a:buNone/>
-            </a:pPr>
-            <a:r>
-              <a:rPr lang="en-US" dirty="0">
-                <a:solidFill>
-                  <a:schemeClr val="bg1"/>
-                </a:solidFill>
-                <a:latin typeface="Consolas" panose="020B0609020204030204" pitchFamily="49" charset="0"/>
-              </a:rPr>
-              <a:t>;; set to y(0) and y(1), respectively</a:t>
-            </a:r>
-          </a:p>
-          <a:p>
-            <a:pPr marL="0" indent="0">
-              <a:buNone/>
-            </a:pPr>
-            <a:r>
-              <a:rPr lang="en-US" dirty="0">
-                <a:solidFill>
-                  <a:schemeClr val="bg1"/>
-                </a:solidFill>
-                <a:latin typeface="Consolas" panose="020B0609020204030204" pitchFamily="49" charset="0"/>
-              </a:rPr>
-              <a:t>;; PRE: none</a:t>
-            </a:r>
-          </a:p>
-          <a:p>
-            <a:pPr marL="0" indent="0">
-              <a:buNone/>
-            </a:pPr>
-            <a:r>
-              <a:rPr lang="en-US" dirty="0">
-                <a:solidFill>
-                  <a:schemeClr val="bg1"/>
-                </a:solidFill>
-                <a:latin typeface="Consolas" panose="020B0609020204030204" pitchFamily="49" charset="0"/>
-              </a:rPr>
-              <a:t>;; POST: y-current equals y(0); y-new equals y(1)</a:t>
-            </a:r>
-          </a:p>
-          <a:p>
-            <a:pPr marL="0" indent="0">
-              <a:buNone/>
-            </a:pPr>
-            <a:r>
-              <a:rPr lang="en-US" dirty="0">
-                <a:solidFill>
-                  <a:schemeClr val="bg1"/>
-                </a:solidFill>
-                <a:latin typeface="Consolas" panose="020B0609020204030204" pitchFamily="49" charset="0"/>
-              </a:rPr>
-              <a:t>to initialize</a:t>
-            </a:r>
-          </a:p>
-          <a:p>
-            <a:pPr marL="0" indent="0">
-              <a:buNone/>
-            </a:pPr>
-            <a:r>
-              <a:rPr lang="en-US" dirty="0">
-                <a:solidFill>
-                  <a:schemeClr val="bg1"/>
-                </a:solidFill>
-                <a:latin typeface="Consolas" panose="020B0609020204030204" pitchFamily="49" charset="0"/>
-              </a:rPr>
-              <a:t>  set y-current y0</a:t>
-            </a:r>
-          </a:p>
-          <a:p>
-            <a:pPr marL="0" indent="0">
-              <a:buNone/>
-            </a:pPr>
-            <a:r>
-              <a:rPr lang="en-US" dirty="0">
-                <a:solidFill>
-                  <a:schemeClr val="bg1"/>
-                </a:solidFill>
-                <a:latin typeface="Consolas" panose="020B0609020204030204" pitchFamily="49" charset="0"/>
-              </a:rPr>
-              <a:t>  set y-new </a:t>
-            </a:r>
-            <a:r>
-              <a:rPr lang="en-US" dirty="0" err="1">
-                <a:solidFill>
-                  <a:schemeClr val="bg1"/>
-                </a:solidFill>
-                <a:latin typeface="Consolas" panose="020B0609020204030204" pitchFamily="49" charset="0"/>
-              </a:rPr>
-              <a:t>logisticMap</a:t>
-            </a:r>
-            <a:r>
-              <a:rPr lang="en-US" dirty="0">
-                <a:solidFill>
-                  <a:schemeClr val="bg1"/>
-                </a:solidFill>
-                <a:latin typeface="Consolas" panose="020B0609020204030204" pitchFamily="49" charset="0"/>
-              </a:rPr>
-              <a:t> R y-current</a:t>
-            </a:r>
-          </a:p>
-          <a:p>
-            <a:pPr marL="0" indent="0">
-              <a:buNone/>
-            </a:pPr>
-            <a:r>
-              <a:rPr lang="en-US" dirty="0">
-                <a:solidFill>
-                  <a:schemeClr val="bg1"/>
-                </a:solidFill>
-                <a:latin typeface="Consolas" panose="020B0609020204030204" pitchFamily="49" charset="0"/>
-              </a:rPr>
-              <a:t>end</a:t>
-            </a:r>
-          </a:p>
-        </p:txBody>
-      </p:sp>
-      <p:sp>
-        <p:nvSpPr>
-          <p:cNvPr id="6" name="Titel 5"/>
-          <p:cNvSpPr>
-            <a:spLocks noGrp="1"/>
-          </p:cNvSpPr>
-          <p:nvPr>
-            <p:ph type="title"/>
-          </p:nvPr>
-        </p:nvSpPr>
-        <p:spPr/>
-        <p:txBody>
-          <a:bodyPr/>
-          <a:lstStyle/>
-          <a:p>
+            <a:r>
+              <a:rPr lang="en-US" dirty="0" err="1"/>
+              <a:t>Netlogo</a:t>
+            </a:r>
             <a:r>
               <a:rPr lang="en-US" dirty="0"/>
-              <a:t>Initialization</a:t>
+              <a:t> Code</a:t>
             </a:r>
           </a:p>
         </p:txBody>
@@ -4814,20 +5344,13 @@
     </p:spTree>
     <p:extLst>
       <p:ext uri="{BB962C8B-B14F-4D97-AF65-F5344CB8AC3E}">
-        <p14:creationId xmlns:p14="http://schemas.microsoft.com/office/powerpoint/2010/main" val="2085110305"/>
+        <p14:creationId xmlns:p14="http://schemas.microsoft.com/office/powerpoint/2010/main" val="4174642701"/>
       </p:ext>
     </p:extLst>
   </p:cSld>
   <p:clrMapOvr>
     <a:masterClrMapping/>
   </p:clrMapOvr>
-  <p:timing>
-    <p:tnLst>
-      <p:par>
-        <p:cTn id="1" dur="indefinite" restart="never" nodeType="tmRoot"/>
-      </p:par>
-    </p:tnLst>
-  </p:timing>
 </p:sld>
 </file>
 
@@ -4877,7 +5400,7 @@
                 </a:solidFill>
                 <a:latin typeface="Consolas" panose="020B0609020204030204" pitchFamily="49" charset="0"/>
               </a:rPr>
-              <a:t>;; The transformation function performs exactly</a:t>
+              <a:t>;; the initialization makes sure y-current and y-new are</a:t>
             </a:r>
           </a:p>
           <a:p>
@@ -4891,7 +5414,7 @@
                 </a:solidFill>
                 <a:latin typeface="Consolas" panose="020B0609020204030204" pitchFamily="49" charset="0"/>
               </a:rPr>
-              <a:t>;; one step in the logistic map</a:t>
+              <a:t>;; set to y(0) and y(1), respectively</a:t>
             </a:r>
           </a:p>
           <a:p>
@@ -4905,7 +5428,7 @@
                 </a:solidFill>
                 <a:latin typeface="Consolas" panose="020B0609020204030204" pitchFamily="49" charset="0"/>
               </a:rPr>
-              <a:t>;; PRE: y-current equals y(t); y-new equals y(t+1)</a:t>
+              <a:t>;; PRE: none</a:t>
             </a:r>
           </a:p>
           <a:p>
@@ -4919,7 +5442,7 @@
                 </a:solidFill>
                 <a:latin typeface="Consolas" panose="020B0609020204030204" pitchFamily="49" charset="0"/>
               </a:rPr>
-              <a:t>;; POST: y-current equals y(t+1); y-new equals y(t+2)</a:t>
+              <a:t>;; POST: y-current equals y(0); y-new equals y(1)</a:t>
             </a:r>
           </a:p>
           <a:p>
@@ -4933,23 +5456,8 @@
                 </a:solidFill>
                 <a:latin typeface="Consolas" panose="020B0609020204030204" pitchFamily="49" charset="0"/>
               </a:rPr>
-              <a:t>to </a:t>
-            </a:r>
-            <a:r>
-              <a:rPr lang="en-US" dirty="0" err="1">
-                <a:solidFill>
-                  <a:schemeClr val="bg1"/>
-                </a:solidFill>
-                <a:latin typeface="Consolas" panose="020B0609020204030204" pitchFamily="49" charset="0"/>
-              </a:rPr>
-              <a:t>transformFunc</a:t>
-            </a:r>
-            <a:endParaRPr lang="en-US" dirty="0">
-              <a:solidFill>
-                <a:schemeClr val="bg1"/>
-              </a:solidFill>
-              <a:latin typeface="Consolas" panose="020B0609020204030204" pitchFamily="49" charset="0"/>
-            </a:endParaRPr>
+              <a:t>to initialize</a:t>
+            </a:r>
           </a:p>
           <a:p>
             <a:pPr marL="0" indent="0">
@@ -4962,7 +5470,7 @@
                 </a:solidFill>
                 <a:latin typeface="Consolas" panose="020B0609020204030204" pitchFamily="49" charset="0"/>
               </a:rPr>
-              <a:t>  set y-current y-new</a:t>
+              <a:t>  set y-current y0</a:t>
             </a:r>
           </a:p>
           <a:p>
@@ -5030,7 +5538,7 @@
           <a:p>
             <a:r>
               <a:rPr lang="en-US" dirty="0"/>
-              <a:t>Transform Function</a:t>
+              <a:t>Initialization</a:t>
             </a:r>
           </a:p>
         </p:txBody>
@@ -5118,20 +5626,13 @@
     </p:spTree>
     <p:extLst>
       <p:ext uri="{BB962C8B-B14F-4D97-AF65-F5344CB8AC3E}">
-        <p14:creationId xmlns:p14="http://schemas.microsoft.com/office/powerpoint/2010/main" val="582188984"/>
+        <p14:creationId xmlns:p14="http://schemas.microsoft.com/office/powerpoint/2010/main" val="2085110305"/>
       </p:ext>
     </p:extLst>
   </p:cSld>
   <p:clrMapOvr>
     <a:masterClrMapping/>
   </p:clrMapOvr>
-  <p:timing>
-    <p:tnLst>
-      <p:par>
-        <p:cTn id="1" dur="indefinite" restart="never" nodeType="tmRoot"/>
-      </p:par>
-    </p:tnLst>
-  </p:timing>
 </p:sld>
 </file>
 
@@ -5181,7 +5682,7 @@
                 </a:solidFill>
                 <a:latin typeface="Consolas" panose="020B0609020204030204" pitchFamily="49" charset="0"/>
               </a:rPr>
-              <a:t>;; PRE R_ in [0, 4.0), y in [0, 1]</a:t>
+              <a:t>;; The transformation function performs exactly</a:t>
             </a:r>
           </a:p>
           <a:p>
@@ -5195,7 +5696,7 @@
                 </a:solidFill>
                 <a:latin typeface="Consolas" panose="020B0609020204030204" pitchFamily="49" charset="0"/>
               </a:rPr>
-              <a:t>;; POST Result of logistic map</a:t>
+              <a:t>;; one step in the logistic map</a:t>
             </a:r>
           </a:p>
           <a:p>
@@ -5209,7 +5710,78 @@
                 </a:solidFill>
                 <a:latin typeface="Consolas" panose="020B0609020204030204" pitchFamily="49" charset="0"/>
               </a:rPr>
-              <a:t>to-report </a:t>
+              <a:t>;; PRE: y-current equals y(t); y-new equals y(t+1)</a:t>
+            </a:r>
+          </a:p>
+          <a:p>
+            <a:pPr marL="0" indent="0">
+              <a:buNone/>
+            </a:pPr>
+            <a:r>
+              <a:rPr lang="en-US" dirty="0">
+                <a:solidFill>
+                  <a:schemeClr val="bg1"/>
+                </a:solidFill>
+                <a:latin typeface="Consolas" panose="020B0609020204030204" pitchFamily="49" charset="0"/>
+              </a:rPr>
+              <a:t>;; POST: y-current equals y(t+1); y-new equals y(t+2)</a:t>
+            </a:r>
+          </a:p>
+          <a:p>
+            <a:pPr marL="0" indent="0">
+              <a:buNone/>
+            </a:pPr>
+            <a:r>
+              <a:rPr lang="en-US" dirty="0">
+                <a:solidFill>
+                  <a:schemeClr val="bg1"/>
+                </a:solidFill>
+                <a:latin typeface="Consolas" panose="020B0609020204030204" pitchFamily="49" charset="0"/>
+              </a:rPr>
+              <a:t>to </a:t>
+            </a:r>
+            <a:r>
+              <a:rPr lang="en-US" dirty="0" err="1">
+                <a:solidFill>
+                  <a:schemeClr val="bg1"/>
+                </a:solidFill>
+                <a:latin typeface="Consolas" panose="020B0609020204030204" pitchFamily="49" charset="0"/>
+              </a:rPr>
+              <a:t>transformFunc</a:t>
+            </a:r>
+            <a:endParaRPr lang="en-US" dirty="0">
+              <a:solidFill>
+                <a:schemeClr val="bg1"/>
+              </a:solidFill>
+              <a:latin typeface="Consolas" panose="020B0609020204030204" pitchFamily="49" charset="0"/>
+            </a:endParaRPr>
+          </a:p>
+          <a:p>
+            <a:pPr marL="0" indent="0">
+              <a:buNone/>
+            </a:pPr>
+            <a:r>
+              <a:rPr lang="en-US" dirty="0">
+                <a:solidFill>
+                  <a:schemeClr val="bg1"/>
+                </a:solidFill>
+                <a:latin typeface="Consolas" panose="020B0609020204030204" pitchFamily="49" charset="0"/>
+              </a:rPr>
+              <a:t>  set y-current y-new</a:t>
+            </a:r>
+          </a:p>
+          <a:p>
+            <a:pPr marL="0" indent="0">
+              <a:buNone/>
+            </a:pPr>
+            <a:r>
+              <a:rPr lang="en-US" dirty="0">
+                <a:solidFill>
+                  <a:schemeClr val="bg1"/>
+                </a:solidFill>
+                <a:latin typeface="Consolas" panose="020B0609020204030204" pitchFamily="49" charset="0"/>
+              </a:rPr>
+              <a:t>  set y-new </a:t>
             </a:r>
             <a:r>
               <a:rPr lang="en-US" dirty="0" err="1">
@@ -5227,21 +5799,7 @@
                 </a:solidFill>
                 <a:latin typeface="Consolas" panose="020B0609020204030204" pitchFamily="49" charset="0"/>
               </a:rPr>
-              <a:t> [R_ y]</a:t>
-            </a:r>
-          </a:p>
-          <a:p>
-            <a:pPr marL="0" indent="0">
-              <a:buNone/>
-            </a:pPr>
-            <a:r>
-              <a:rPr lang="en-US" dirty="0">
-                <a:solidFill>
-                  <a:schemeClr val="bg1"/>
-                </a:solidFill>
-                <a:latin typeface="Consolas" panose="020B0609020204030204" pitchFamily="49" charset="0"/>
-              </a:rPr>
-              <a:t> report R_ * y * (1 - y)</a:t>
+              <a:t> R y-current</a:t>
             </a:r>
           </a:p>
           <a:p>
@@ -5258,17 +5816,6 @@
               <a:t>end</a:t>
             </a:r>
           </a:p>
-          <a:p>
-            <a:pPr marL="0" indent="0">
-              <a:buNone/>
-            </a:pPr>
-            <a:endParaRPr lang="en-US" dirty="0">
-              <a:solidFill>
-                <a:schemeClr val="bg1"/>
-              </a:solidFill>
-              <a:latin typeface="Consolas" panose="020B0609020204030204" pitchFamily="49" charset="0"/>
-            </a:endParaRPr>
-          </a:p>
         </p:txBody>
       </p:sp>
       <p:sp>
@@ -5288,7 +5835,7 @@
           <a:p>
             <a:r>
               <a:rPr lang="en-US" dirty="0"/>
-              <a:t>Logistic Map Function</a:t>
+              <a:t>Transform Function</a:t>
             </a:r>
           </a:p>
         </p:txBody>
@@ -5376,20 +5923,13 @@
     </p:spTree>
     <p:extLst>
       <p:ext uri="{BB962C8B-B14F-4D97-AF65-F5344CB8AC3E}">
-        <p14:creationId xmlns:p14="http://schemas.microsoft.com/office/powerpoint/2010/main" val="1382463161"/>
+        <p14:creationId xmlns:p14="http://schemas.microsoft.com/office/powerpoint/2010/main" val="582188984"/>
       </p:ext>
     </p:extLst>
   </p:cSld>
   <p:clrMapOvr>
     <a:masterClrMapping/>
   </p:clrMapOvr>
-  <p:timing>
-    <p:tnLst>
-      <p:par>
-        <p:cTn id="1" dur="indefinite" restart="never" nodeType="tmRoot"/>
-      </p:par>
-    </p:tnLst>
-  </p:timing>
 </p:sld>
 </file>
 
@@ -5421,6 +5961,257 @@
           </p:nvPr>
         </p:nvSpPr>
         <p:spPr>
+          <a:solidFill>
+            <a:schemeClr val="tx1"/>
+          </a:solidFill>
+        </p:spPr>
+        <p:txBody>
+          <a:bodyPr/>
+          <a:lstStyle/>
+          <a:p>
+            <a:pPr marL="0" indent="0">
+              <a:buNone/>
+            </a:pPr>
+            <a:r>
+              <a:rPr lang="en-US" dirty="0">
+                <a:solidFill>
+                  <a:schemeClr val="bg1"/>
+                </a:solidFill>
+                <a:latin typeface="Consolas" panose="020B0609020204030204" pitchFamily="49" charset="0"/>
+              </a:rPr>
+              <a:t>;; PRE R_ in [0, 4.0), y in [0, 1]</a:t>
+            </a:r>
+          </a:p>
+          <a:p>
+            <a:pPr marL="0" indent="0">
+              <a:buNone/>
+            </a:pPr>
+            <a:r>
+              <a:rPr lang="en-US" dirty="0">
+                <a:solidFill>
+                  <a:schemeClr val="bg1"/>
+                </a:solidFill>
+                <a:latin typeface="Consolas" panose="020B0609020204030204" pitchFamily="49" charset="0"/>
+              </a:rPr>
+              <a:t>;; POST Result of logistic map</a:t>
+            </a:r>
+          </a:p>
+          <a:p>
+            <a:pPr marL="0" indent="0">
+              <a:buNone/>
+            </a:pPr>
+            <a:r>
+              <a:rPr lang="en-US" dirty="0">
+                <a:solidFill>
+                  <a:schemeClr val="bg1"/>
+                </a:solidFill>
+                <a:latin typeface="Consolas" panose="020B0609020204030204" pitchFamily="49" charset="0"/>
+              </a:rPr>
+              <a:t>to-report </a:t>
+            </a:r>
+            <a:r>
+              <a:rPr lang="en-US" dirty="0" err="1">
+                <a:solidFill>
+                  <a:schemeClr val="bg1"/>
+                </a:solidFill>
+                <a:latin typeface="Consolas" panose="020B0609020204030204" pitchFamily="49" charset="0"/>
+              </a:rPr>
+              <a:t>logisticMap</a:t>
+            </a:r>
+            <a:r>
+              <a:rPr lang="en-US" dirty="0">
+                <a:solidFill>
+                  <a:schemeClr val="bg1"/>
+                </a:solidFill>
+                <a:latin typeface="Consolas" panose="020B0609020204030204" pitchFamily="49" charset="0"/>
+              </a:rPr>
+              <a:t> [R_ y]</a:t>
+            </a:r>
+          </a:p>
+          <a:p>
+            <a:pPr marL="0" indent="0">
+              <a:buNone/>
+            </a:pPr>
+            <a:r>
+              <a:rPr lang="en-US" dirty="0">
+                <a:solidFill>
+                  <a:schemeClr val="bg1"/>
+                </a:solidFill>
+                <a:latin typeface="Consolas" panose="020B0609020204030204" pitchFamily="49" charset="0"/>
+              </a:rPr>
+              <a:t> report R_ * y * (1 - y)</a:t>
+            </a:r>
+          </a:p>
+          <a:p>
+            <a:pPr marL="0" indent="0">
+              <a:buNone/>
+            </a:pPr>
+            <a:r>
+              <a:rPr lang="en-US" dirty="0">
+                <a:solidFill>
+                  <a:schemeClr val="bg1"/>
+                </a:solidFill>
+                <a:latin typeface="Consolas" panose="020B0609020204030204" pitchFamily="49" charset="0"/>
+              </a:rPr>
+              <a:t>end</a:t>
+            </a:r>
+          </a:p>
+          <a:p>
+            <a:pPr marL="0" indent="0">
+              <a:buNone/>
+            </a:pPr>
+            <a:endParaRPr lang="en-US" dirty="0">
+              <a:solidFill>
+                <a:schemeClr val="bg1"/>
+              </a:solidFill>
+              <a:latin typeface="Consolas" panose="020B0609020204030204" pitchFamily="49" charset="0"/>
+            </a:endParaRPr>
+          </a:p>
+        </p:txBody>
+      </p:sp>
+      <p:sp>
+        <p:nvSpPr>
+          <p:cNvPr id="6" name="Titel 5"/>
+          <p:cNvSpPr>
+            <a:spLocks noGrp="1"/>
+          </p:cNvSpPr>
+          <p:nvPr>
+            <p:ph type="title"/>
+          </p:nvPr>
+        </p:nvSpPr>
+        <p:spPr/>
+        <p:txBody>
+          <a:bodyPr/>
+          <a:lstStyle/>
+          <a:p>
+            <a:r>
+              <a:rPr lang="en-US" dirty="0"/>
+              <a:t>Logistic Map Function</a:t>
+            </a:r>
+          </a:p>
+        </p:txBody>
+      </p:sp>
+      <p:sp>
+        <p:nvSpPr>
+          <p:cNvPr id="3" name="Datumsplatzhalter 2"/>
+          <p:cNvSpPr>
+            <a:spLocks noGrp="1"/>
+          </p:cNvSpPr>
+          <p:nvPr>
+            <p:ph type="dt" sz="half" idx="10"/>
+          </p:nvPr>
+        </p:nvSpPr>
+        <p:spPr/>
+        <p:txBody>
+          <a:bodyPr/>
+          <a:lstStyle/>
+          <a:p>
+            <a:pPr>
+              <a:defRPr/>
+            </a:pPr>
+            <a:fld id="{972A6A5B-77CB-4D42-9DB4-CC6D207310B8}" type="datetime1">
+              <a:rPr lang="de-DE" smtClean="0"/>
+              <a:pPr>
+                <a:defRPr/>
+              </a:pPr>
+              <a:t>03.11.2016</a:t>
+            </a:fld>
+            <a:endParaRPr lang="en-GB" dirty="0"/>
+          </a:p>
+        </p:txBody>
+      </p:sp>
+      <p:sp>
+        <p:nvSpPr>
+          <p:cNvPr id="4" name="Fußzeilenplatzhalter 3"/>
+          <p:cNvSpPr>
+            <a:spLocks noGrp="1"/>
+          </p:cNvSpPr>
+          <p:nvPr>
+            <p:ph type="ftr" sz="quarter" idx="11"/>
+          </p:nvPr>
+        </p:nvSpPr>
+        <p:spPr/>
+        <p:txBody>
+          <a:bodyPr/>
+          <a:lstStyle/>
+          <a:p>
+            <a:pPr>
+              <a:defRPr/>
+            </a:pPr>
+            <a:endParaRPr lang="en-GB" dirty="0"/>
+          </a:p>
+        </p:txBody>
+      </p:sp>
+      <p:sp>
+        <p:nvSpPr>
+          <p:cNvPr id="5" name="Foliennummernplatzhalter 4"/>
+          <p:cNvSpPr>
+            <a:spLocks noGrp="1"/>
+          </p:cNvSpPr>
+          <p:nvPr>
+            <p:ph type="sldNum" sz="quarter" idx="12"/>
+          </p:nvPr>
+        </p:nvSpPr>
+        <p:spPr/>
+        <p:txBody>
+          <a:bodyPr/>
+          <a:lstStyle/>
+          <a:p>
+            <a:pPr>
+              <a:defRPr/>
+            </a:pPr>
+            <a:fld id="{E85D1952-A6FC-4ACE-AEE4-EFAF5C32DAC6}" type="slidenum">
+              <a:rPr lang="en-GB" smtClean="0"/>
+              <a:pPr>
+                <a:defRPr/>
+              </a:pPr>
+              <a:t>6</a:t>
+            </a:fld>
+            <a:endParaRPr lang="en-GB" dirty="0"/>
+          </a:p>
+        </p:txBody>
+      </p:sp>
+    </p:spTree>
+    <p:extLst>
+      <p:ext uri="{BB962C8B-B14F-4D97-AF65-F5344CB8AC3E}">
+        <p14:creationId xmlns:p14="http://schemas.microsoft.com/office/powerpoint/2010/main" val="1382463161"/>
+      </p:ext>
+    </p:extLst>
+  </p:cSld>
+  <p:clrMapOvr>
+    <a:masterClrMapping/>
+  </p:clrMapOvr>
+</p:sld>
+</file>
+
+<file path=ppt/slides/slide7.xml><?xml version="1.0" encoding="utf-8"?>
+<p:sld xmlns:a="http://schemas.openxmlformats.org/drawingml/2006/main" xmlns:r="http://schemas.openxmlformats.org/officeDocument/2006/relationships" xmlns:p="http://schemas.openxmlformats.org/presentationml/2006/main">
+  <p:cSld>
+    <p:spTree>
+      <p:nvGrpSpPr>
+        <p:cNvPr id="1" name=""/>
+        <p:cNvGrpSpPr/>
+        <p:nvPr/>
+      </p:nvGrpSpPr>
+      <p:grpSpPr>
+        <a:xfrm>
+          <a:off x="0" y="0"/>
+          <a:ext cx="0" cy="0"/>
+          <a:chOff x="0" y="0"/>
+          <a:chExt cx="0" cy="0"/>
+        </a:xfrm>
+      </p:grpSpPr>
+      <p:sp>
+        <p:nvSpPr>
+          <p:cNvPr id="7" name="Inhaltsplatzhalter 6"/>
+          <p:cNvSpPr>
+            <a:spLocks noGrp="1"/>
+          </p:cNvSpPr>
+          <p:nvPr>
+            <p:ph idx="1"/>
+          </p:nvPr>
+        </p:nvSpPr>
+        <p:spPr>
           <a:xfrm>
             <a:off x="467545" y="1268760"/>
             <a:ext cx="8208912" cy="2160240"/>
@@ -5629,7 +6420,7 @@
               <a:pPr>
                 <a:defRPr/>
               </a:pPr>
-              <a:t>6</a:t>
+              <a:t>7</a:t>
             </a:fld>
             <a:endParaRPr lang="en-GB" dirty="0"/>
           </a:p>
@@ -5913,152 +6704,6 @@
   <p:clrMapOvr>
     <a:masterClrMapping/>
   </p:clrMapOvr>
-  <p:timing>
-    <p:tnLst>
-      <p:par>
-        <p:cTn id="1" dur="indefinite" restart="never" nodeType="tmRoot"/>
-      </p:par>
-    </p:tnLst>
-  </p:timing>
-</p:sld>
-</file>
-
-<file path=ppt/slides/slide7.xml><?xml version="1.0" encoding="utf-8"?>
-<p:sld xmlns:a="http://schemas.openxmlformats.org/drawingml/2006/main" xmlns:r="http://schemas.openxmlformats.org/officeDocument/2006/relationships" xmlns:p="http://schemas.openxmlformats.org/presentationml/2006/main">
-  <p:cSld>
-    <p:spTree>
-      <p:nvGrpSpPr>
-        <p:cNvPr id="1" name=""/>
-        <p:cNvGrpSpPr/>
-        <p:nvPr/>
-      </p:nvGrpSpPr>
-      <p:grpSpPr>
-        <a:xfrm>
-          <a:off x="0" y="0"/>
-          <a:ext cx="0" cy="0"/>
-          <a:chOff x="0" y="0"/>
-          <a:chExt cx="0" cy="0"/>
-        </a:xfrm>
-      </p:grpSpPr>
-      <p:sp>
-        <p:nvSpPr>
-          <p:cNvPr id="7" name="Titel 6"/>
-          <p:cNvSpPr>
-            <a:spLocks noGrp="1"/>
-          </p:cNvSpPr>
-          <p:nvPr>
-            <p:ph type="title"/>
-          </p:nvPr>
-        </p:nvSpPr>
-        <p:spPr/>
-        <p:txBody>
-          <a:bodyPr/>
-          <a:lstStyle/>
-          <a:p>
-            <a:r>
-              <a:rPr lang="en-US" dirty="0"/>
-              <a:t>Demonstration</a:t>
-            </a:r>
-          </a:p>
-        </p:txBody>
-      </p:sp>
-      <p:sp>
-        <p:nvSpPr>
-          <p:cNvPr id="4" name="Datumsplatzhalter 3"/>
-          <p:cNvSpPr>
-            <a:spLocks noGrp="1"/>
-          </p:cNvSpPr>
-          <p:nvPr>
-            <p:ph type="dt" sz="half" idx="10"/>
-          </p:nvPr>
-        </p:nvSpPr>
-        <p:spPr/>
-        <p:txBody>
-          <a:bodyPr/>
-          <a:lstStyle/>
-          <a:p>
-            <a:pPr>
-              <a:defRPr/>
-            </a:pPr>
-            <a:fld id="{972A6A5B-77CB-4D42-9DB4-CC6D207310B8}" type="datetime1">
-              <a:rPr lang="de-DE" smtClean="0"/>
-              <a:pPr>
-                <a:defRPr/>
-              </a:pPr>
-              <a:t>03.11.2016</a:t>
-            </a:fld>
-            <a:endParaRPr lang="en-GB" dirty="0"/>
-          </a:p>
-        </p:txBody>
-      </p:sp>
-      <p:sp>
-        <p:nvSpPr>
-          <p:cNvPr id="5" name="Fußzeilenplatzhalter 4"/>
-          <p:cNvSpPr>
-            <a:spLocks noGrp="1"/>
-          </p:cNvSpPr>
-          <p:nvPr>
-            <p:ph type="ftr" sz="quarter" idx="11"/>
-          </p:nvPr>
-        </p:nvSpPr>
-        <p:spPr/>
-        <p:txBody>
-          <a:bodyPr/>
-          <a:lstStyle/>
-          <a:p>
-            <a:pPr>
-              <a:defRPr/>
-            </a:pPr>
-            <a:endParaRPr lang="en-GB" dirty="0"/>
-          </a:p>
-        </p:txBody>
-      </p:sp>
-      <p:sp>
-        <p:nvSpPr>
-          <p:cNvPr id="6" name="Foliennummernplatzhalter 5"/>
-          <p:cNvSpPr>
-            <a:spLocks noGrp="1"/>
-          </p:cNvSpPr>
-          <p:nvPr>
-            <p:ph type="sldNum" sz="quarter" idx="12"/>
-          </p:nvPr>
-        </p:nvSpPr>
-        <p:spPr/>
-        <p:txBody>
-          <a:bodyPr/>
-          <a:lstStyle/>
-          <a:p>
-            <a:pPr>
-              <a:defRPr/>
-            </a:pPr>
-            <a:fld id="{E85D1952-A6FC-4ACE-AEE4-EFAF5C32DAC6}" type="slidenum">
-              <a:rPr lang="en-GB" smtClean="0"/>
-              <a:pPr>
-                <a:defRPr/>
-              </a:pPr>
-              <a:t>7</a:t>
-            </a:fld>
-            <a:endParaRPr lang="en-GB" dirty="0"/>
-          </a:p>
-        </p:txBody>
-      </p:sp>
-    </p:spTree>
-    <p:extLst>
-      <p:ext uri="{BB962C8B-B14F-4D97-AF65-F5344CB8AC3E}">
-        <p14:creationId xmlns:p14="http://schemas.microsoft.com/office/powerpoint/2010/main" val="990305081"/>
-      </p:ext>
-    </p:extLst>
-  </p:cSld>
-  <p:clrMapOvr>
-    <a:masterClrMapping/>
-  </p:clrMapOvr>
-  <p:timing>
-    <p:tnLst>
-      <p:par>
-        <p:cTn id="1" dur="indefinite" restart="never" nodeType="tmRoot"/>
-      </p:par>
-    </p:tnLst>
-  </p:timing>
 </p:sld>
 </file>
 
@@ -6081,7 +6726,7 @@
       </p:grpSpPr>
       <p:sp>
         <p:nvSpPr>
-          <p:cNvPr id="2" name="Titel 1"/>
+          <p:cNvPr id="7" name="Titel 6"/>
           <p:cNvSpPr>
             <a:spLocks noGrp="1"/>
           </p:cNvSpPr>
@@ -6096,37 +6741,14 @@
           <a:p>
             <a:r>
               <a:rPr lang="en-US" dirty="0"/>
-              <a:t>Behavior of </a:t>
-            </a:r>
-            <a:r>
-              <a:rPr lang="en-US" dirty="0" smtClean="0"/>
-              <a:t>Logistic Map </a:t>
-            </a:r>
-            <a:r>
-              <a:rPr lang="en-US" dirty="0"/>
-              <a:t/>
-            </a:r>
-            <a:br>
-              <a:rPr lang="en-US" dirty="0"/>
-            </a:br>
-            <a:r>
-              <a:rPr lang="en-US" dirty="0"/>
-              <a:t>for </a:t>
-            </a:r>
-            <a:r>
-              <a:rPr lang="en-US" dirty="0" smtClean="0"/>
-              <a:t>Different Values </a:t>
-            </a:r>
-            <a:r>
-              <a:rPr lang="en-US" dirty="0"/>
-              <a:t>of R</a:t>
-            </a:r>
-          </a:p>
-        </p:txBody>
-      </p:sp>
-      <p:sp>
-        <p:nvSpPr>
-          <p:cNvPr id="3" name="Datumsplatzhalter 2"/>
+              <a:t>Demonstration</a:t>
+            </a:r>
+          </a:p>
+        </p:txBody>
+      </p:sp>
+      <p:sp>
+        <p:nvSpPr>
+          <p:cNvPr id="4" name="Datumsplatzhalter 3"/>
           <p:cNvSpPr>
             <a:spLocks noGrp="1"/>
           </p:cNvSpPr>
@@ -6155,7 +6777,7 @@
       </p:sp>
       <p:sp>
         <p:nvSpPr>
-          <p:cNvPr id="4" name="Fußzeilenplatzhalter 3"/>
+          <p:cNvPr id="5" name="Fußzeilenplatzhalter 4"/>
           <p:cNvSpPr>
             <a:spLocks noGrp="1"/>
           </p:cNvSpPr>
@@ -6177,7 +6799,7 @@
       </p:sp>
       <p:sp>
         <p:nvSpPr>
-          <p:cNvPr id="5" name="Foliennummernplatzhalter 4"/>
+          <p:cNvPr id="6" name="Foliennummernplatzhalter 5"/>
           <p:cNvSpPr>
             <a:spLocks noGrp="1"/>
           </p:cNvSpPr>
@@ -6207,20 +6829,13 @@
     </p:spTree>
     <p:extLst>
       <p:ext uri="{BB962C8B-B14F-4D97-AF65-F5344CB8AC3E}">
-        <p14:creationId xmlns:p14="http://schemas.microsoft.com/office/powerpoint/2010/main" val="3771868445"/>
+        <p14:creationId xmlns:p14="http://schemas.microsoft.com/office/powerpoint/2010/main" val="990305081"/>
       </p:ext>
     </p:extLst>
   </p:cSld>
   <p:clrMapOvr>
     <a:masterClrMapping/>
   </p:clrMapOvr>
-  <p:timing>
-    <p:tnLst>
-      <p:par>
-        <p:cTn id="1" dur="indefinite" restart="never" nodeType="tmRoot"/>
-      </p:par>
-    </p:tnLst>
-  </p:timing>
 </p:sld>
 </file>
 
@@ -6241,417 +6856,38 @@
           <a:chExt cx="0" cy="0"/>
         </a:xfrm>
       </p:grpSpPr>
-      <mc:AlternateContent xmlns:mc="http://schemas.openxmlformats.org/markup-compatibility/2006" xmlns:a14="http://schemas.microsoft.com/office/drawing/2010/main">
-        <mc:Choice Requires="a14">
-          <p:sp>
-            <p:nvSpPr>
-              <p:cNvPr id="2" name="Inhaltsplatzhalter 1"/>
-              <p:cNvSpPr>
-                <a:spLocks noGrp="1"/>
-              </p:cNvSpPr>
-              <p:nvPr>
-                <p:ph idx="1"/>
-              </p:nvPr>
-            </p:nvSpPr>
-            <p:spPr>
-              <a:xfrm>
-                <a:off x="467544" y="4814512"/>
-                <a:ext cx="8208912" cy="1422799"/>
-              </a:xfrm>
-            </p:spPr>
-            <p:txBody>
-              <a:bodyPr numCol="2"/>
-              <a:lstStyle/>
-              <a:p>
-                <a:r>
-                  <a:rPr lang="de-DE" dirty="0"/>
-                  <a:t>Single </a:t>
-                </a:r>
-                <a:r>
-                  <a:rPr lang="de-DE" dirty="0" err="1"/>
-                  <a:t>fixpoint</a:t>
-                </a:r>
-                <a:r>
-                  <a:rPr lang="de-DE" dirty="0"/>
-                  <a:t> </a:t>
-                </a:r>
-                <a:r>
-                  <a:rPr lang="de-DE" dirty="0" err="1"/>
-                  <a:t>for</a:t>
-                </a:r>
-                <a:r>
-                  <a:rPr lang="de-DE" dirty="0"/>
-                  <a:t> </a:t>
-                </a:r>
-                <a14:m>
-                  <m:oMath xmlns:m="http://schemas.openxmlformats.org/officeDocument/2006/math">
-                    <m:r>
-                      <a:rPr lang="de-DE" i="1" dirty="0" smtClean="0">
-                        <a:latin typeface="Cambria Math" panose="02040503050406030204" pitchFamily="18" charset="0"/>
-                      </a:rPr>
-                      <m:t>𝑅</m:t>
-                    </m:r>
-                    <m:r>
-                      <a:rPr lang="de-DE" i="1" dirty="0" smtClean="0">
-                        <a:latin typeface="Cambria Math" panose="02040503050406030204" pitchFamily="18" charset="0"/>
-                      </a:rPr>
-                      <m:t>&lt;3</m:t>
-                    </m:r>
-                  </m:oMath>
-                </a14:m>
-                <a:endParaRPr lang="de-DE" dirty="0"/>
-              </a:p>
-              <a:p>
-                <a:pPr lvl="1"/>
-                <a14:m>
-                  <m:oMath xmlns:m="http://schemas.openxmlformats.org/officeDocument/2006/math">
-                    <m:sSub>
-                      <m:sSubPr>
-                        <m:ctrlPr>
-                          <a:rPr lang="en-US" b="0" i="1" dirty="0" smtClean="0">
-                            <a:latin typeface="Cambria Math" panose="02040503050406030204" pitchFamily="18" charset="0"/>
-                          </a:rPr>
-                        </m:ctrlPr>
-                      </m:sSubPr>
-                      <m:e>
-                        <m:r>
-                          <a:rPr lang="en-US" b="0" i="1" dirty="0" smtClean="0">
-                            <a:latin typeface="Cambria Math" panose="02040503050406030204" pitchFamily="18" charset="0"/>
-                          </a:rPr>
-                          <m:t>𝑓</m:t>
-                        </m:r>
-                      </m:e>
-                      <m:sub>
-                        <m:r>
-                          <a:rPr lang="en-US" b="0" i="1" dirty="0" smtClean="0">
-                            <a:latin typeface="Cambria Math" panose="02040503050406030204" pitchFamily="18" charset="0"/>
-                          </a:rPr>
-                          <m:t>𝑦</m:t>
-                        </m:r>
-                      </m:sub>
-                    </m:sSub>
-                    <m:r>
-                      <a:rPr lang="en-US" b="0" i="1" dirty="0" smtClean="0">
-                        <a:latin typeface="Cambria Math" panose="02040503050406030204" pitchFamily="18" charset="0"/>
-                      </a:rPr>
-                      <m:t>=</m:t>
-                    </m:r>
-                    <m:r>
-                      <a:rPr lang="de-DE" i="1" dirty="0" smtClean="0">
-                        <a:latin typeface="Cambria Math" panose="02040503050406030204" pitchFamily="18" charset="0"/>
-                      </a:rPr>
-                      <m:t>0</m:t>
-                    </m:r>
-                  </m:oMath>
-                </a14:m>
-                <a:r>
-                  <a:rPr lang="de-DE" dirty="0"/>
-                  <a:t> </a:t>
-                </a:r>
-                <a:r>
-                  <a:rPr lang="de-DE" dirty="0" err="1"/>
-                  <a:t>for</a:t>
-                </a:r>
-                <a:r>
-                  <a:rPr lang="de-DE" dirty="0"/>
-                  <a:t> </a:t>
-                </a:r>
-                <a14:m>
-                  <m:oMath xmlns:m="http://schemas.openxmlformats.org/officeDocument/2006/math">
-                    <m:r>
-                      <a:rPr lang="de-DE" i="1" dirty="0" smtClean="0">
-                        <a:latin typeface="Cambria Math" panose="02040503050406030204" pitchFamily="18" charset="0"/>
-                      </a:rPr>
-                      <m:t>𝑅</m:t>
-                    </m:r>
-                    <m:r>
-                      <a:rPr lang="de-DE" i="1" dirty="0" smtClean="0">
-                        <a:latin typeface="Cambria Math" panose="02040503050406030204" pitchFamily="18" charset="0"/>
-                      </a:rPr>
-                      <m:t>&lt;1</m:t>
-                    </m:r>
-                  </m:oMath>
-                </a14:m>
-                <a:r>
-                  <a:rPr lang="de-DE" dirty="0"/>
-                  <a:t> </a:t>
-                </a:r>
-              </a:p>
-              <a:p>
-                <a:pPr lvl="1"/>
-                <a:endParaRPr lang="de-DE" dirty="0"/>
-              </a:p>
-              <a:p>
-                <a:pPr lvl="1"/>
-                <a:endParaRPr lang="de-DE" dirty="0"/>
-              </a:p>
-              <a:p>
-                <a:r>
-                  <a:rPr lang="de-DE" dirty="0"/>
-                  <a:t>Speed </a:t>
-                </a:r>
-                <a:r>
-                  <a:rPr lang="de-DE" dirty="0" err="1"/>
-                  <a:t>of</a:t>
-                </a:r>
-                <a:r>
-                  <a:rPr lang="de-DE" dirty="0"/>
-                  <a:t> </a:t>
-                </a:r>
-                <a:r>
-                  <a:rPr lang="de-DE" dirty="0" err="1"/>
-                  <a:t>convergence</a:t>
-                </a:r>
-                <a:endParaRPr lang="de-DE" dirty="0"/>
-              </a:p>
-              <a:p>
-                <a:pPr lvl="1"/>
-                <a:r>
-                  <a:rPr lang="de-DE" dirty="0"/>
-                  <a:t>Quick </a:t>
-                </a:r>
-                <a:r>
-                  <a:rPr lang="de-DE" dirty="0" err="1"/>
-                  <a:t>for</a:t>
-                </a:r>
-                <a:r>
-                  <a:rPr lang="de-DE" dirty="0"/>
-                  <a:t> </a:t>
-                </a:r>
-                <a14:m>
-                  <m:oMath xmlns:m="http://schemas.openxmlformats.org/officeDocument/2006/math">
-                    <m:r>
-                      <a:rPr lang="de-DE" i="1" dirty="0" smtClean="0">
-                        <a:latin typeface="Cambria Math" panose="02040503050406030204" pitchFamily="18" charset="0"/>
-                      </a:rPr>
-                      <m:t>0&lt;</m:t>
-                    </m:r>
-                    <m:r>
-                      <a:rPr lang="de-DE" i="1" dirty="0" smtClean="0">
-                        <a:latin typeface="Cambria Math" panose="02040503050406030204" pitchFamily="18" charset="0"/>
-                      </a:rPr>
-                      <m:t>𝑅</m:t>
-                    </m:r>
-                    <m:r>
-                      <a:rPr lang="de-DE" i="1" dirty="0" smtClean="0">
-                        <a:latin typeface="Cambria Math" panose="02040503050406030204" pitchFamily="18" charset="0"/>
-                      </a:rPr>
-                      <m:t>&lt;2 </m:t>
-                    </m:r>
-                  </m:oMath>
-                </a14:m>
-                <a:endParaRPr lang="de-DE" dirty="0"/>
-              </a:p>
-              <a:p>
-                <a:pPr lvl="1"/>
-                <a:r>
-                  <a:rPr lang="de-DE" dirty="0"/>
-                  <a:t>Quick </a:t>
-                </a:r>
-                <a:r>
-                  <a:rPr lang="de-DE" dirty="0" err="1"/>
-                  <a:t>with</a:t>
-                </a:r>
-                <a:r>
-                  <a:rPr lang="de-DE" dirty="0"/>
-                  <a:t> </a:t>
-                </a:r>
-                <a:r>
-                  <a:rPr lang="de-DE" dirty="0" err="1"/>
-                  <a:t>slight</a:t>
-                </a:r>
-                <a:r>
-                  <a:rPr lang="de-DE" dirty="0"/>
-                  <a:t> </a:t>
-                </a:r>
-                <a:r>
-                  <a:rPr lang="de-DE" dirty="0" err="1"/>
-                  <a:t>fluctuation</a:t>
-                </a:r>
-                <a:r>
-                  <a:rPr lang="de-DE" dirty="0"/>
-                  <a:t> </a:t>
-                </a:r>
-                <a:r>
-                  <a:rPr lang="de-DE" dirty="0" err="1"/>
-                  <a:t>for</a:t>
-                </a:r>
-                <a:r>
-                  <a:rPr lang="de-DE" dirty="0"/>
-                  <a:t> </a:t>
-                </a:r>
-                <a14:m>
-                  <m:oMath xmlns:m="http://schemas.openxmlformats.org/officeDocument/2006/math">
-                    <m:r>
-                      <a:rPr lang="de-DE" i="1" dirty="0" smtClean="0">
-                        <a:latin typeface="Cambria Math" panose="02040503050406030204" pitchFamily="18" charset="0"/>
-                      </a:rPr>
-                      <m:t>2&lt;</m:t>
-                    </m:r>
-                    <m:r>
-                      <a:rPr lang="en-US" b="0" i="1" dirty="0" smtClean="0">
-                        <a:latin typeface="Cambria Math" panose="02040503050406030204" pitchFamily="18" charset="0"/>
-                      </a:rPr>
-                      <m:t>𝑅</m:t>
-                    </m:r>
-                    <m:r>
-                      <a:rPr lang="de-DE" i="1" dirty="0" smtClean="0">
-                        <a:latin typeface="Cambria Math" panose="02040503050406030204" pitchFamily="18" charset="0"/>
-                      </a:rPr>
-                      <m:t>&lt;</m:t>
-                    </m:r>
-                    <m:r>
-                      <a:rPr lang="en-US" b="0" i="1" dirty="0" smtClean="0">
-                        <a:latin typeface="Cambria Math" panose="02040503050406030204" pitchFamily="18" charset="0"/>
-                      </a:rPr>
-                      <m:t>3</m:t>
-                    </m:r>
-                    <m:r>
-                      <a:rPr lang="de-DE" i="1" dirty="0" smtClean="0">
-                        <a:latin typeface="Cambria Math" panose="02040503050406030204" pitchFamily="18" charset="0"/>
-                      </a:rPr>
-                      <m:t> </m:t>
-                    </m:r>
-                  </m:oMath>
-                </a14:m>
-                <a:endParaRPr lang="de-DE" dirty="0"/>
-              </a:p>
-            </p:txBody>
-          </p:sp>
-        </mc:Choice>
-        <mc:Fallback xmlns="">
-          <p:sp>
-            <p:nvSpPr>
-              <p:cNvPr id="2" name="Inhaltsplatzhalter 1"/>
-              <p:cNvSpPr>
-                <a:spLocks noGrp="1" noRot="1" noChangeAspect="1" noMove="1" noResize="1" noEditPoints="1" noAdjustHandles="1" noChangeArrowheads="1" noChangeShapeType="1" noTextEdit="1"/>
-              </p:cNvSpPr>
-              <p:nvPr>
-                <p:ph idx="1"/>
-              </p:nvPr>
-            </p:nvSpPr>
-            <p:spPr>
-              <a:xfrm>
-                <a:off x="467544" y="4814512"/>
-                <a:ext cx="8208912" cy="1422799"/>
-              </a:xfrm>
-              <a:blipFill>
-                <a:blip r:embed="rId2"/>
-                <a:stretch>
-                  <a:fillRect l="-669" t="-2146" b="-9013"/>
-                </a:stretch>
-              </a:blipFill>
-            </p:spPr>
-            <p:txBody>
-              <a:bodyPr/>
-              <a:lstStyle/>
-              <a:p>
-                <a:r>
-                  <a:rPr lang="en-US">
-                    <a:noFill/>
-                  </a:rPr>
-                  <a:t> </a:t>
-                </a:r>
-              </a:p>
-            </p:txBody>
-          </p:sp>
-        </mc:Fallback>
-      </mc:AlternateContent>
-      <mc:AlternateContent xmlns:mc="http://schemas.openxmlformats.org/markup-compatibility/2006" xmlns:a14="http://schemas.microsoft.com/office/drawing/2010/main">
-        <mc:Choice Requires="a14">
-          <p:sp>
-            <p:nvSpPr>
-              <p:cNvPr id="3" name="Titel 2"/>
-              <p:cNvSpPr>
-                <a:spLocks noGrp="1"/>
-              </p:cNvSpPr>
-              <p:nvPr>
-                <p:ph type="title"/>
-              </p:nvPr>
-            </p:nvSpPr>
-            <p:spPr/>
-            <p:txBody>
-              <a:bodyPr/>
-              <a:lstStyle/>
-              <a:p>
-                <a:r>
-                  <a:rPr lang="de-DE" dirty="0"/>
-                  <a:t>Behavior </a:t>
-                </a:r>
-                <a:r>
-                  <a:rPr lang="de-DE" dirty="0" err="1"/>
-                  <a:t>for</a:t>
-                </a:r>
-                <a:r>
-                  <a:rPr lang="de-DE" dirty="0"/>
-                  <a:t> Different Values </a:t>
-                </a:r>
-                <a:r>
-                  <a:rPr lang="de-DE" dirty="0" err="1"/>
-                  <a:t>of</a:t>
-                </a:r>
-                <a:r>
-                  <a:rPr lang="de-DE" dirty="0"/>
-                  <a:t> </a:t>
-                </a:r>
-                <a14:m>
-                  <m:oMath xmlns:m="http://schemas.openxmlformats.org/officeDocument/2006/math">
-                    <m:r>
-                      <a:rPr lang="de-DE" i="1" dirty="0">
-                        <a:latin typeface="Cambria Math" panose="02040503050406030204" pitchFamily="18" charset="0"/>
-                      </a:rPr>
-                      <m:t>𝑅</m:t>
-                    </m:r>
-                    <m:r>
-                      <a:rPr lang="de-DE" i="1" dirty="0">
-                        <a:latin typeface="Cambria Math" panose="02040503050406030204" pitchFamily="18" charset="0"/>
-                      </a:rPr>
-                      <m:t> </m:t>
-                    </m:r>
-                  </m:oMath>
-                </a14:m>
-                <a:endParaRPr lang="en-US" dirty="0"/>
-              </a:p>
-            </p:txBody>
-          </p:sp>
-        </mc:Choice>
-        <mc:Fallback xmlns="">
-          <p:sp>
-            <p:nvSpPr>
-              <p:cNvPr id="3" name="Titel 2"/>
-              <p:cNvSpPr>
-                <a:spLocks noGrp="1" noRot="1" noChangeAspect="1" noMove="1" noResize="1" noEditPoints="1" noAdjustHandles="1" noChangeArrowheads="1" noChangeShapeType="1" noTextEdit="1"/>
-              </p:cNvSpPr>
-              <p:nvPr>
-                <p:ph type="title"/>
-              </p:nvPr>
-            </p:nvSpPr>
-            <p:spPr>
-              <a:blipFill>
-                <a:blip r:embed="rId3"/>
-                <a:stretch>
-                  <a:fillRect l="-837"/>
-                </a:stretch>
-              </a:blipFill>
-            </p:spPr>
-            <p:txBody>
-              <a:bodyPr/>
-              <a:lstStyle/>
-              <a:p>
-                <a:r>
-                  <a:rPr lang="en-US">
-                    <a:noFill/>
-                  </a:rPr>
-                  <a:t> </a:t>
-                </a:r>
-              </a:p>
-            </p:txBody>
-          </p:sp>
-        </mc:Fallback>
-      </mc:AlternateContent>
-      <p:sp>
-        <p:nvSpPr>
-          <p:cNvPr id="4" name="Datumsplatzhalter 3"/>
+      <p:sp>
+        <p:nvSpPr>
+          <p:cNvPr id="2" name="Titel 1"/>
+          <p:cNvSpPr>
+            <a:spLocks noGrp="1"/>
+          </p:cNvSpPr>
+          <p:nvPr>
+            <p:ph type="title"/>
+          </p:nvPr>
+        </p:nvSpPr>
+        <p:spPr/>
+        <p:txBody>
+          <a:bodyPr/>
+          <a:lstStyle/>
+          <a:p>
+            <a:r>
+              <a:rPr lang="en-US" dirty="0"/>
+              <a:t>Behavior of Logistic Map </a:t>
+            </a:r>
+            <a:br>
+              <a:rPr lang="en-US" dirty="0"/>
+            </a:br>
+            <a:r>
+              <a:rPr lang="en-US" dirty="0"/>
+              <a:t>for Different Values of R</a:t>
+            </a:r>
+          </a:p>
+        </p:txBody>
+      </p:sp>
+      <p:sp>
+        <p:nvSpPr>
+          <p:cNvPr id="3" name="Datumsplatzhalter 2"/>
           <p:cNvSpPr>
             <a:spLocks noGrp="1"/>
           </p:cNvSpPr>
@@ -6680,7 +6916,7 @@
       </p:sp>
       <p:sp>
         <p:nvSpPr>
-          <p:cNvPr id="5" name="Fußzeilenplatzhalter 4"/>
+          <p:cNvPr id="4" name="Fußzeilenplatzhalter 3"/>
           <p:cNvSpPr>
             <a:spLocks noGrp="1"/>
           </p:cNvSpPr>
@@ -6696,16 +6932,13 @@
             <a:pPr>
               <a:defRPr/>
             </a:pPr>
-            <a:r>
-              <a:rPr lang="en-GB" dirty="0"/>
-              <a:t>https://en.wikipedia.org/wiki/Logistic_map</a:t>
-            </a:r>
-          </a:p>
-        </p:txBody>
-      </p:sp>
-      <p:sp>
-        <p:nvSpPr>
-          <p:cNvPr id="6" name="Foliennummernplatzhalter 5"/>
+            <a:endParaRPr lang="en-GB" dirty="0"/>
+          </a:p>
+        </p:txBody>
+      </p:sp>
+      <p:sp>
+        <p:nvSpPr>
+          <p:cNvPr id="5" name="Foliennummernplatzhalter 4"/>
           <p:cNvSpPr>
             <a:spLocks noGrp="1"/>
           </p:cNvSpPr>
@@ -6732,47 +6965,16 @@
           </a:p>
         </p:txBody>
       </p:sp>
-      <p:pic>
-        <p:nvPicPr>
-          <p:cNvPr id="13" name="Grafik 12"/>
-          <p:cNvPicPr>
-            <a:picLocks noChangeAspect="1"/>
-          </p:cNvPicPr>
-          <p:nvPr/>
-        </p:nvPicPr>
-        <p:blipFill>
-          <a:blip r:embed="rId4"/>
-          <a:stretch>
-            <a:fillRect/>
-          </a:stretch>
-        </p:blipFill>
-        <p:spPr>
-          <a:xfrm>
-            <a:off x="2339752" y="1124744"/>
-            <a:ext cx="4464496" cy="3473745"/>
-          </a:xfrm>
-          <a:prstGeom prst="rect">
-            <a:avLst/>
-          </a:prstGeom>
-        </p:spPr>
-      </p:pic>
     </p:spTree>
     <p:extLst>
       <p:ext uri="{BB962C8B-B14F-4D97-AF65-F5344CB8AC3E}">
-        <p14:creationId xmlns:p14="http://schemas.microsoft.com/office/powerpoint/2010/main" val="189323410"/>
+        <p14:creationId xmlns:p14="http://schemas.microsoft.com/office/powerpoint/2010/main" val="3771868445"/>
       </p:ext>
     </p:extLst>
   </p:cSld>
   <p:clrMapOvr>
     <a:masterClrMapping/>
   </p:clrMapOvr>
-  <p:timing>
-    <p:tnLst>
-      <p:par>
-        <p:cTn id="1" dur="indefinite" restart="never" nodeType="tmRoot"/>
-      </p:par>
-    </p:tnLst>
-  </p:timing>
 </p:sld>
 </file>
 

</xml_diff>